<commit_message>
Tablas y def Campos Listo
</commit_message>
<xml_diff>
--- a/Proyecto/diseñoTCR.pptx
+++ b/Proyecto/diseñoTCR.pptx
@@ -104,6 +104,11 @@
       </a:defRPr>
     </a:lvl9pPr>
   </p:defaultTextStyle>
+  <p:extLst>
+    <p:ext uri="{EFAFB233-063F-42B5-8137-9DF3F51BA10A}">
+      <p15:sldGuideLst xmlns:p15="http://schemas.microsoft.com/office/powerpoint/2012/main"/>
+    </p:ext>
+  </p:extLst>
 </p:presentation>
 </file>
 
@@ -238,7 +243,7 @@
           <a:p>
             <a:fld id="{2ED90B40-CE33-4CFC-B1B9-E881A0D2F4CD}" type="datetimeFigureOut">
               <a:rPr lang="es-HN" smtClean="0"/>
-              <a:t>24/10/2016</a:t>
+              <a:t>28/10/2016</a:t>
             </a:fld>
             <a:endParaRPr lang="es-HN"/>
           </a:p>
@@ -408,7 +413,7 @@
           <a:p>
             <a:fld id="{2ED90B40-CE33-4CFC-B1B9-E881A0D2F4CD}" type="datetimeFigureOut">
               <a:rPr lang="es-HN" smtClean="0"/>
-              <a:t>24/10/2016</a:t>
+              <a:t>28/10/2016</a:t>
             </a:fld>
             <a:endParaRPr lang="es-HN"/>
           </a:p>
@@ -588,7 +593,7 @@
           <a:p>
             <a:fld id="{2ED90B40-CE33-4CFC-B1B9-E881A0D2F4CD}" type="datetimeFigureOut">
               <a:rPr lang="es-HN" smtClean="0"/>
-              <a:t>24/10/2016</a:t>
+              <a:t>28/10/2016</a:t>
             </a:fld>
             <a:endParaRPr lang="es-HN"/>
           </a:p>
@@ -758,7 +763,7 @@
           <a:p>
             <a:fld id="{2ED90B40-CE33-4CFC-B1B9-E881A0D2F4CD}" type="datetimeFigureOut">
               <a:rPr lang="es-HN" smtClean="0"/>
-              <a:t>24/10/2016</a:t>
+              <a:t>28/10/2016</a:t>
             </a:fld>
             <a:endParaRPr lang="es-HN"/>
           </a:p>
@@ -1004,7 +1009,7 @@
           <a:p>
             <a:fld id="{2ED90B40-CE33-4CFC-B1B9-E881A0D2F4CD}" type="datetimeFigureOut">
               <a:rPr lang="es-HN" smtClean="0"/>
-              <a:t>24/10/2016</a:t>
+              <a:t>28/10/2016</a:t>
             </a:fld>
             <a:endParaRPr lang="es-HN"/>
           </a:p>
@@ -1236,7 +1241,7 @@
           <a:p>
             <a:fld id="{2ED90B40-CE33-4CFC-B1B9-E881A0D2F4CD}" type="datetimeFigureOut">
               <a:rPr lang="es-HN" smtClean="0"/>
-              <a:t>24/10/2016</a:t>
+              <a:t>28/10/2016</a:t>
             </a:fld>
             <a:endParaRPr lang="es-HN"/>
           </a:p>
@@ -1603,7 +1608,7 @@
           <a:p>
             <a:fld id="{2ED90B40-CE33-4CFC-B1B9-E881A0D2F4CD}" type="datetimeFigureOut">
               <a:rPr lang="es-HN" smtClean="0"/>
-              <a:t>24/10/2016</a:t>
+              <a:t>28/10/2016</a:t>
             </a:fld>
             <a:endParaRPr lang="es-HN"/>
           </a:p>
@@ -1721,7 +1726,7 @@
           <a:p>
             <a:fld id="{2ED90B40-CE33-4CFC-B1B9-E881A0D2F4CD}" type="datetimeFigureOut">
               <a:rPr lang="es-HN" smtClean="0"/>
-              <a:t>24/10/2016</a:t>
+              <a:t>28/10/2016</a:t>
             </a:fld>
             <a:endParaRPr lang="es-HN"/>
           </a:p>
@@ -1816,7 +1821,7 @@
           <a:p>
             <a:fld id="{2ED90B40-CE33-4CFC-B1B9-E881A0D2F4CD}" type="datetimeFigureOut">
               <a:rPr lang="es-HN" smtClean="0"/>
-              <a:t>24/10/2016</a:t>
+              <a:t>28/10/2016</a:t>
             </a:fld>
             <a:endParaRPr lang="es-HN"/>
           </a:p>
@@ -2093,7 +2098,7 @@
           <a:p>
             <a:fld id="{2ED90B40-CE33-4CFC-B1B9-E881A0D2F4CD}" type="datetimeFigureOut">
               <a:rPr lang="es-HN" smtClean="0"/>
-              <a:t>24/10/2016</a:t>
+              <a:t>28/10/2016</a:t>
             </a:fld>
             <a:endParaRPr lang="es-HN"/>
           </a:p>
@@ -2346,7 +2351,7 @@
           <a:p>
             <a:fld id="{2ED90B40-CE33-4CFC-B1B9-E881A0D2F4CD}" type="datetimeFigureOut">
               <a:rPr lang="es-HN" smtClean="0"/>
-              <a:t>24/10/2016</a:t>
+              <a:t>28/10/2016</a:t>
             </a:fld>
             <a:endParaRPr lang="es-HN"/>
           </a:p>
@@ -2559,7 +2564,7 @@
           <a:p>
             <a:fld id="{2ED90B40-CE33-4CFC-B1B9-E881A0D2F4CD}" type="datetimeFigureOut">
               <a:rPr lang="es-HN" smtClean="0"/>
-              <a:t>24/10/2016</a:t>
+              <a:t>28/10/2016</a:t>
             </a:fld>
             <a:endParaRPr lang="es-HN"/>
           </a:p>
@@ -2966,30 +2971,31 @@
       </p:grpSpPr>
       <p:sp>
         <p:nvSpPr>
-          <p:cNvPr id="2" name="Rectángulo 1"/>
+          <p:cNvPr id="3" name="Rectángulo 2"/>
           <p:cNvSpPr/>
           <p:nvPr/>
         </p:nvSpPr>
         <p:spPr>
           <a:xfrm>
-            <a:off x="190500" y="127000"/>
-            <a:ext cx="2400300" cy="1181100"/>
+            <a:off x="279400" y="203200"/>
+            <a:ext cx="1333500" cy="800100"/>
           </a:xfrm>
           <a:prstGeom prst="rect">
             <a:avLst/>
           </a:prstGeom>
+          <a:ln>
+            <a:noFill/>
+          </a:ln>
         </p:spPr>
         <p:style>
-          <a:lnRef idx="2">
-            <a:schemeClr val="accent1">
-              <a:shade val="50000"/>
-            </a:schemeClr>
+          <a:lnRef idx="0">
+            <a:schemeClr val="accent2"/>
           </a:lnRef>
-          <a:fillRef idx="1">
-            <a:schemeClr val="accent1"/>
+          <a:fillRef idx="3">
+            <a:schemeClr val="accent2"/>
           </a:fillRef>
-          <a:effectRef idx="0">
-            <a:schemeClr val="accent1"/>
+          <a:effectRef idx="3">
+            <a:schemeClr val="accent2"/>
           </a:effectRef>
           <a:fontRef idx="minor">
             <a:schemeClr val="lt1"/>
@@ -3000,539 +3006,179 @@
           <a:lstStyle/>
           <a:p>
             <a:pPr algn="ctr"/>
-            <a:r>
-              <a:rPr lang="es-HN" dirty="0" smtClean="0"/>
-              <a:t>MI TABLA</a:t>
-            </a:r>
-            <a:endParaRPr lang="es-HN" dirty="0"/>
+            <a:endParaRPr lang="es-HN"/>
+          </a:p>
+        </p:txBody>
+      </p:sp>
+      <p:sp>
+        <p:nvSpPr>
+          <p:cNvPr id="26" name="Rectángulo 25"/>
+          <p:cNvSpPr/>
+          <p:nvPr/>
+        </p:nvSpPr>
+        <p:spPr>
+          <a:xfrm>
+            <a:off x="2298700" y="203200"/>
+            <a:ext cx="1333500" cy="800100"/>
+          </a:xfrm>
+          <a:prstGeom prst="rect">
+            <a:avLst/>
+          </a:prstGeom>
+          <a:ln/>
+        </p:spPr>
+        <p:style>
+          <a:lnRef idx="0">
+            <a:schemeClr val="accent2"/>
+          </a:lnRef>
+          <a:fillRef idx="3">
+            <a:schemeClr val="accent2"/>
+          </a:fillRef>
+          <a:effectRef idx="3">
+            <a:schemeClr val="accent2"/>
+          </a:effectRef>
+          <a:fontRef idx="minor">
+            <a:schemeClr val="lt1"/>
+          </a:fontRef>
+        </p:style>
+        <p:txBody>
+          <a:bodyPr rtlCol="0" anchor="ctr"/>
+          <a:lstStyle/>
+          <a:p>
+            <a:pPr algn="ctr"/>
+            <a:endParaRPr lang="es-HN"/>
+          </a:p>
+        </p:txBody>
+      </p:sp>
+      <p:sp>
+        <p:nvSpPr>
+          <p:cNvPr id="38" name="Rectángulo 37"/>
+          <p:cNvSpPr/>
+          <p:nvPr/>
+        </p:nvSpPr>
+        <p:spPr>
+          <a:xfrm>
+            <a:off x="4203700" y="203200"/>
+            <a:ext cx="1333500" cy="800100"/>
+          </a:xfrm>
+          <a:prstGeom prst="rect">
+            <a:avLst/>
+          </a:prstGeom>
+          <a:ln/>
+        </p:spPr>
+        <p:style>
+          <a:lnRef idx="0">
+            <a:schemeClr val="accent2"/>
+          </a:lnRef>
+          <a:fillRef idx="3">
+            <a:schemeClr val="accent2"/>
+          </a:fillRef>
+          <a:effectRef idx="3">
+            <a:schemeClr val="accent2"/>
+          </a:effectRef>
+          <a:fontRef idx="minor">
+            <a:schemeClr val="lt1"/>
+          </a:fontRef>
+        </p:style>
+        <p:txBody>
+          <a:bodyPr rtlCol="0" anchor="ctr"/>
+          <a:lstStyle/>
+          <a:p>
+            <a:pPr algn="ctr"/>
+            <a:endParaRPr lang="es-HN"/>
+          </a:p>
+        </p:txBody>
+      </p:sp>
+      <p:sp>
+        <p:nvSpPr>
+          <p:cNvPr id="39" name="Rectángulo 38"/>
+          <p:cNvSpPr/>
+          <p:nvPr/>
+        </p:nvSpPr>
+        <p:spPr>
+          <a:xfrm>
+            <a:off x="6108700" y="203200"/>
+            <a:ext cx="1333500" cy="800100"/>
+          </a:xfrm>
+          <a:prstGeom prst="rect">
+            <a:avLst/>
+          </a:prstGeom>
+          <a:ln/>
+        </p:spPr>
+        <p:style>
+          <a:lnRef idx="0">
+            <a:schemeClr val="accent2"/>
+          </a:lnRef>
+          <a:fillRef idx="3">
+            <a:schemeClr val="accent2"/>
+          </a:fillRef>
+          <a:effectRef idx="3">
+            <a:schemeClr val="accent2"/>
+          </a:effectRef>
+          <a:fontRef idx="minor">
+            <a:schemeClr val="lt1"/>
+          </a:fontRef>
+        </p:style>
+        <p:txBody>
+          <a:bodyPr rtlCol="0" anchor="ctr"/>
+          <a:lstStyle/>
+          <a:p>
+            <a:pPr algn="ctr"/>
+            <a:endParaRPr lang="es-HN"/>
+          </a:p>
+        </p:txBody>
+      </p:sp>
+      <p:sp>
+        <p:nvSpPr>
+          <p:cNvPr id="40" name="Rectángulo 39"/>
+          <p:cNvSpPr/>
+          <p:nvPr/>
+        </p:nvSpPr>
+        <p:spPr>
+          <a:xfrm>
+            <a:off x="8013700" y="203200"/>
+            <a:ext cx="1333500" cy="800100"/>
+          </a:xfrm>
+          <a:prstGeom prst="rect">
+            <a:avLst/>
+          </a:prstGeom>
+          <a:ln/>
+        </p:spPr>
+        <p:style>
+          <a:lnRef idx="0">
+            <a:schemeClr val="accent2"/>
+          </a:lnRef>
+          <a:fillRef idx="3">
+            <a:schemeClr val="accent2"/>
+          </a:fillRef>
+          <a:effectRef idx="3">
+            <a:schemeClr val="accent2"/>
+          </a:effectRef>
+          <a:fontRef idx="minor">
+            <a:schemeClr val="lt1"/>
+          </a:fontRef>
+        </p:style>
+        <p:txBody>
+          <a:bodyPr rtlCol="0" anchor="ctr"/>
+          <a:lstStyle/>
+          <a:p>
+            <a:pPr algn="ctr"/>
+            <a:endParaRPr lang="es-HN"/>
           </a:p>
         </p:txBody>
       </p:sp>
       <p:cxnSp>
         <p:nvCxnSpPr>
-          <p:cNvPr id="4" name="Conector recto de flecha 3"/>
+          <p:cNvPr id="7" name="Conector recto de flecha 6"/>
           <p:cNvCxnSpPr>
-            <a:stCxn id="2" idx="3"/>
+            <a:stCxn id="3" idx="3"/>
+            <a:endCxn id="26" idx="1"/>
           </p:cNvCxnSpPr>
           <p:nvPr/>
         </p:nvCxnSpPr>
         <p:spPr>
           <a:xfrm>
-            <a:off x="2590800" y="717550"/>
-            <a:ext cx="1612900" cy="0"/>
-          </a:xfrm>
-          <a:prstGeom prst="straightConnector1">
-            <a:avLst/>
-          </a:prstGeom>
-          <a:ln>
-            <a:tailEnd type="triangle"/>
-          </a:ln>
-        </p:spPr>
-        <p:style>
-          <a:lnRef idx="1">
-            <a:schemeClr val="accent1"/>
-          </a:lnRef>
-          <a:fillRef idx="0">
-            <a:schemeClr val="accent1"/>
-          </a:fillRef>
-          <a:effectRef idx="0">
-            <a:schemeClr val="accent1"/>
-          </a:effectRef>
-          <a:fontRef idx="minor">
-            <a:schemeClr val="tx1"/>
-          </a:fontRef>
-        </p:style>
-      </p:cxnSp>
-      <p:sp>
-        <p:nvSpPr>
-          <p:cNvPr id="5" name="CuadroTexto 4"/>
-          <p:cNvSpPr txBox="1"/>
-          <p:nvPr/>
-        </p:nvSpPr>
-        <p:spPr>
-          <a:xfrm>
-            <a:off x="4203700" y="532884"/>
-            <a:ext cx="1346200" cy="369332"/>
-          </a:xfrm>
-          <a:prstGeom prst="rect">
-            <a:avLst/>
-          </a:prstGeom>
-          <a:noFill/>
-        </p:spPr>
-        <p:txBody>
-          <a:bodyPr wrap="square" rtlCol="0">
-            <a:spAutoFit/>
-          </a:bodyPr>
-          <a:lstStyle/>
-          <a:p>
-            <a:r>
-              <a:rPr lang="es-HN" dirty="0" smtClean="0"/>
-              <a:t>NULL</a:t>
-            </a:r>
-          </a:p>
-        </p:txBody>
-      </p:sp>
-      <p:cxnSp>
-        <p:nvCxnSpPr>
-          <p:cNvPr id="10" name="Conector angular 9"/>
-          <p:cNvCxnSpPr>
-            <a:stCxn id="2" idx="2"/>
-          </p:cNvCxnSpPr>
-          <p:nvPr/>
-        </p:nvCxnSpPr>
-        <p:spPr>
-          <a:xfrm rot="16200000" flipH="1">
-            <a:off x="1755775" y="942975"/>
-            <a:ext cx="990600" cy="1720850"/>
-          </a:xfrm>
-          <a:prstGeom prst="bentConnector2">
-            <a:avLst/>
-          </a:prstGeom>
-          <a:ln>
-            <a:tailEnd type="triangle"/>
-          </a:ln>
-        </p:spPr>
-        <p:style>
-          <a:lnRef idx="1">
-            <a:schemeClr val="accent1"/>
-          </a:lnRef>
-          <a:fillRef idx="0">
-            <a:schemeClr val="accent1"/>
-          </a:fillRef>
-          <a:effectRef idx="0">
-            <a:schemeClr val="accent1"/>
-          </a:effectRef>
-          <a:fontRef idx="minor">
-            <a:schemeClr val="tx1"/>
-          </a:fontRef>
-        </p:style>
-      </p:cxnSp>
-      <p:sp>
-        <p:nvSpPr>
-          <p:cNvPr id="11" name="Rectángulo redondeado 10"/>
-          <p:cNvSpPr/>
-          <p:nvPr/>
-        </p:nvSpPr>
-        <p:spPr>
-          <a:xfrm>
-            <a:off x="3111500" y="1898651"/>
-            <a:ext cx="1676400" cy="800100"/>
-          </a:xfrm>
-          <a:prstGeom prst="roundRect">
-            <a:avLst/>
-          </a:prstGeom>
-        </p:spPr>
-        <p:style>
-          <a:lnRef idx="2">
-            <a:schemeClr val="accent1">
-              <a:shade val="50000"/>
-            </a:schemeClr>
-          </a:lnRef>
-          <a:fillRef idx="1">
-            <a:schemeClr val="accent1"/>
-          </a:fillRef>
-          <a:effectRef idx="0">
-            <a:schemeClr val="accent1"/>
-          </a:effectRef>
-          <a:fontRef idx="minor">
-            <a:schemeClr val="lt1"/>
-          </a:fontRef>
-        </p:style>
-        <p:txBody>
-          <a:bodyPr rtlCol="0" anchor="ctr"/>
-          <a:lstStyle/>
-          <a:p>
-            <a:pPr algn="ctr"/>
-            <a:r>
-              <a:rPr lang="es-HN" dirty="0" smtClean="0"/>
-              <a:t>CAMPO 1</a:t>
-            </a:r>
-            <a:endParaRPr lang="es-HN" dirty="0"/>
-          </a:p>
-        </p:txBody>
-      </p:sp>
-      <p:cxnSp>
-        <p:nvCxnSpPr>
-          <p:cNvPr id="13" name="Conector recto de flecha 12"/>
-          <p:cNvCxnSpPr/>
-          <p:nvPr/>
-        </p:nvCxnSpPr>
-        <p:spPr>
-          <a:xfrm>
-            <a:off x="4800600" y="2298700"/>
-            <a:ext cx="914400" cy="0"/>
-          </a:xfrm>
-          <a:prstGeom prst="straightConnector1">
-            <a:avLst/>
-          </a:prstGeom>
-          <a:ln>
-            <a:tailEnd type="triangle"/>
-          </a:ln>
-        </p:spPr>
-        <p:style>
-          <a:lnRef idx="1">
-            <a:schemeClr val="accent1"/>
-          </a:lnRef>
-          <a:fillRef idx="0">
-            <a:schemeClr val="accent1"/>
-          </a:fillRef>
-          <a:effectRef idx="0">
-            <a:schemeClr val="accent1"/>
-          </a:effectRef>
-          <a:fontRef idx="minor">
-            <a:schemeClr val="tx1"/>
-          </a:fontRef>
-        </p:style>
-      </p:cxnSp>
-      <p:sp>
-        <p:nvSpPr>
-          <p:cNvPr id="16" name="Rectángulo redondeado 15"/>
-          <p:cNvSpPr/>
-          <p:nvPr/>
-        </p:nvSpPr>
-        <p:spPr>
-          <a:xfrm>
-            <a:off x="5715000" y="1898651"/>
-            <a:ext cx="1790700" cy="800100"/>
-          </a:xfrm>
-          <a:prstGeom prst="roundRect">
-            <a:avLst/>
-          </a:prstGeom>
-        </p:spPr>
-        <p:style>
-          <a:lnRef idx="2">
-            <a:schemeClr val="accent1">
-              <a:shade val="50000"/>
-            </a:schemeClr>
-          </a:lnRef>
-          <a:fillRef idx="1">
-            <a:schemeClr val="accent1"/>
-          </a:fillRef>
-          <a:effectRef idx="0">
-            <a:schemeClr val="accent1"/>
-          </a:effectRef>
-          <a:fontRef idx="minor">
-            <a:schemeClr val="lt1"/>
-          </a:fontRef>
-        </p:style>
-        <p:txBody>
-          <a:bodyPr rtlCol="0" anchor="ctr"/>
-          <a:lstStyle/>
-          <a:p>
-            <a:pPr algn="ctr"/>
-            <a:r>
-              <a:rPr lang="es-HN" dirty="0" smtClean="0"/>
-              <a:t>CAMPO 2</a:t>
-            </a:r>
-            <a:endParaRPr lang="es-HN" dirty="0"/>
-          </a:p>
-        </p:txBody>
-      </p:sp>
-      <p:cxnSp>
-        <p:nvCxnSpPr>
-          <p:cNvPr id="17" name="Conector recto de flecha 16"/>
-          <p:cNvCxnSpPr/>
-          <p:nvPr/>
-        </p:nvCxnSpPr>
-        <p:spPr>
-          <a:xfrm>
-            <a:off x="7505700" y="2298700"/>
-            <a:ext cx="914400" cy="0"/>
-          </a:xfrm>
-          <a:prstGeom prst="straightConnector1">
-            <a:avLst/>
-          </a:prstGeom>
-          <a:ln>
-            <a:tailEnd type="triangle"/>
-          </a:ln>
-        </p:spPr>
-        <p:style>
-          <a:lnRef idx="1">
-            <a:schemeClr val="accent1"/>
-          </a:lnRef>
-          <a:fillRef idx="0">
-            <a:schemeClr val="accent1"/>
-          </a:fillRef>
-          <a:effectRef idx="0">
-            <a:schemeClr val="accent1"/>
-          </a:effectRef>
-          <a:fontRef idx="minor">
-            <a:schemeClr val="tx1"/>
-          </a:fontRef>
-        </p:style>
-      </p:cxnSp>
-      <p:sp>
-        <p:nvSpPr>
-          <p:cNvPr id="18" name="Rectángulo redondeado 17"/>
-          <p:cNvSpPr/>
-          <p:nvPr/>
-        </p:nvSpPr>
-        <p:spPr>
-          <a:xfrm>
-            <a:off x="8439150" y="1898650"/>
-            <a:ext cx="1790700" cy="800100"/>
-          </a:xfrm>
-          <a:prstGeom prst="roundRect">
-            <a:avLst/>
-          </a:prstGeom>
-        </p:spPr>
-        <p:style>
-          <a:lnRef idx="2">
-            <a:schemeClr val="accent1">
-              <a:shade val="50000"/>
-            </a:schemeClr>
-          </a:lnRef>
-          <a:fillRef idx="1">
-            <a:schemeClr val="accent1"/>
-          </a:fillRef>
-          <a:effectRef idx="0">
-            <a:schemeClr val="accent1"/>
-          </a:effectRef>
-          <a:fontRef idx="minor">
-            <a:schemeClr val="lt1"/>
-          </a:fontRef>
-        </p:style>
-        <p:txBody>
-          <a:bodyPr rtlCol="0" anchor="ctr"/>
-          <a:lstStyle/>
-          <a:p>
-            <a:pPr algn="ctr"/>
-            <a:r>
-              <a:rPr lang="es-HN" dirty="0" smtClean="0"/>
-              <a:t>CAMPO 3</a:t>
-            </a:r>
-            <a:endParaRPr lang="es-HN" dirty="0"/>
-          </a:p>
-        </p:txBody>
-      </p:sp>
-      <p:cxnSp>
-        <p:nvCxnSpPr>
-          <p:cNvPr id="19" name="Conector recto de flecha 18"/>
-          <p:cNvCxnSpPr/>
-          <p:nvPr/>
-        </p:nvCxnSpPr>
-        <p:spPr>
-          <a:xfrm>
-            <a:off x="10229850" y="2273300"/>
-            <a:ext cx="914400" cy="0"/>
-          </a:xfrm>
-          <a:prstGeom prst="straightConnector1">
-            <a:avLst/>
-          </a:prstGeom>
-          <a:ln>
-            <a:tailEnd type="triangle"/>
-          </a:ln>
-        </p:spPr>
-        <p:style>
-          <a:lnRef idx="1">
-            <a:schemeClr val="accent1"/>
-          </a:lnRef>
-          <a:fillRef idx="0">
-            <a:schemeClr val="accent1"/>
-          </a:fillRef>
-          <a:effectRef idx="0">
-            <a:schemeClr val="accent1"/>
-          </a:effectRef>
-          <a:fontRef idx="minor">
-            <a:schemeClr val="tx1"/>
-          </a:fontRef>
-        </p:style>
-      </p:cxnSp>
-      <p:sp>
-        <p:nvSpPr>
-          <p:cNvPr id="20" name="CuadroTexto 19"/>
-          <p:cNvSpPr txBox="1"/>
-          <p:nvPr/>
-        </p:nvSpPr>
-        <p:spPr>
-          <a:xfrm>
-            <a:off x="11144250" y="2088634"/>
-            <a:ext cx="1346200" cy="369332"/>
-          </a:xfrm>
-          <a:prstGeom prst="rect">
-            <a:avLst/>
-          </a:prstGeom>
-          <a:noFill/>
-        </p:spPr>
-        <p:txBody>
-          <a:bodyPr wrap="square" rtlCol="0">
-            <a:spAutoFit/>
-          </a:bodyPr>
-          <a:lstStyle/>
-          <a:p>
-            <a:r>
-              <a:rPr lang="es-HN" dirty="0" smtClean="0"/>
-              <a:t>NULL</a:t>
-            </a:r>
-          </a:p>
-        </p:txBody>
-      </p:sp>
-      <p:sp>
-        <p:nvSpPr>
-          <p:cNvPr id="22" name="CuadroTexto 21"/>
-          <p:cNvSpPr txBox="1"/>
-          <p:nvPr/>
-        </p:nvSpPr>
-        <p:spPr>
-          <a:xfrm>
-            <a:off x="1377950" y="1529317"/>
-            <a:ext cx="1003300" cy="369332"/>
-          </a:xfrm>
-          <a:prstGeom prst="rect">
-            <a:avLst/>
-          </a:prstGeom>
-          <a:noFill/>
-        </p:spPr>
-        <p:txBody>
-          <a:bodyPr wrap="square" rtlCol="0">
-            <a:spAutoFit/>
-          </a:bodyPr>
-          <a:lstStyle/>
-          <a:p>
-            <a:r>
-              <a:rPr lang="es-HN" dirty="0" smtClean="0"/>
-              <a:t>Ptr* </a:t>
-            </a:r>
-            <a:endParaRPr lang="es-HN" dirty="0"/>
-          </a:p>
-        </p:txBody>
-      </p:sp>
-      <p:cxnSp>
-        <p:nvCxnSpPr>
-          <p:cNvPr id="24" name="Conector recto de flecha 23"/>
-          <p:cNvCxnSpPr>
-            <a:stCxn id="11" idx="2"/>
-          </p:cNvCxnSpPr>
-          <p:nvPr/>
-        </p:nvCxnSpPr>
-        <p:spPr>
-          <a:xfrm>
-            <a:off x="3949700" y="2698751"/>
-            <a:ext cx="0" cy="463549"/>
-          </a:xfrm>
-          <a:prstGeom prst="straightConnector1">
-            <a:avLst/>
-          </a:prstGeom>
-          <a:ln>
-            <a:tailEnd type="triangle"/>
-          </a:ln>
-        </p:spPr>
-        <p:style>
-          <a:lnRef idx="1">
-            <a:schemeClr val="accent1"/>
-          </a:lnRef>
-          <a:fillRef idx="0">
-            <a:schemeClr val="accent1"/>
-          </a:fillRef>
-          <a:effectRef idx="0">
-            <a:schemeClr val="accent1"/>
-          </a:effectRef>
-          <a:fontRef idx="minor">
-            <a:schemeClr val="tx1"/>
-          </a:fontRef>
-        </p:style>
-      </p:cxnSp>
-      <p:graphicFrame>
-        <p:nvGraphicFramePr>
-          <p:cNvPr id="27" name="Tabla 26"/>
-          <p:cNvGraphicFramePr>
-            <a:graphicFrameLocks noGrp="1"/>
-          </p:cNvGraphicFramePr>
-          <p:nvPr>
-            <p:extLst>
-              <p:ext uri="{D42A27DB-BD31-4B8C-83A1-F6EECF244321}">
-                <p14:modId xmlns:p14="http://schemas.microsoft.com/office/powerpoint/2010/main" val="1095074346"/>
-              </p:ext>
-            </p:extLst>
-          </p:nvPr>
-        </p:nvGraphicFramePr>
-        <p:xfrm>
-          <a:off x="3073400" y="3162300"/>
-          <a:ext cx="1758950" cy="1854200"/>
-        </p:xfrm>
-        <a:graphic>
-          <a:graphicData uri="http://schemas.openxmlformats.org/drawingml/2006/table">
-            <a:tbl>
-              <a:tblPr firstRow="1" bandRow="1">
-                <a:tableStyleId>{5940675A-B579-460E-94D1-54222C63F5DA}</a:tableStyleId>
-              </a:tblPr>
-              <a:tblGrid>
-                <a:gridCol w="1758950"/>
-              </a:tblGrid>
-              <a:tr h="370840">
-                <a:tc>
-                  <a:txBody>
-                    <a:bodyPr/>
-                    <a:lstStyle/>
-                    <a:p>
-                      <a:endParaRPr lang="es-HN" dirty="0"/>
-                    </a:p>
-                  </a:txBody>
-                  <a:tcPr/>
-                </a:tc>
-              </a:tr>
-              <a:tr h="370840">
-                <a:tc>
-                  <a:txBody>
-                    <a:bodyPr/>
-                    <a:lstStyle/>
-                    <a:p>
-                      <a:endParaRPr lang="es-HN"/>
-                    </a:p>
-                  </a:txBody>
-                  <a:tcPr/>
-                </a:tc>
-              </a:tr>
-              <a:tr h="370840">
-                <a:tc>
-                  <a:txBody>
-                    <a:bodyPr/>
-                    <a:lstStyle/>
-                    <a:p>
-                      <a:endParaRPr lang="es-HN" dirty="0"/>
-                    </a:p>
-                  </a:txBody>
-                  <a:tcPr/>
-                </a:tc>
-              </a:tr>
-              <a:tr h="370840">
-                <a:tc>
-                  <a:txBody>
-                    <a:bodyPr/>
-                    <a:lstStyle/>
-                    <a:p>
-                      <a:endParaRPr lang="es-HN"/>
-                    </a:p>
-                  </a:txBody>
-                  <a:tcPr/>
-                </a:tc>
-              </a:tr>
-              <a:tr h="370840">
-                <a:tc>
-                  <a:txBody>
-                    <a:bodyPr/>
-                    <a:lstStyle/>
-                    <a:p>
-                      <a:endParaRPr lang="es-HN" dirty="0"/>
-                    </a:p>
-                  </a:txBody>
-                  <a:tcPr/>
-                </a:tc>
-              </a:tr>
-            </a:tbl>
-          </a:graphicData>
-        </a:graphic>
-      </p:graphicFrame>
-      <p:cxnSp>
-        <p:nvCxnSpPr>
-          <p:cNvPr id="28" name="Conector recto de flecha 27"/>
-          <p:cNvCxnSpPr/>
-          <p:nvPr/>
-        </p:nvCxnSpPr>
-        <p:spPr>
-          <a:xfrm>
-            <a:off x="6648450" y="2698750"/>
-            <a:ext cx="0" cy="463549"/>
+            <a:off x="1612900" y="603250"/>
+            <a:ext cx="685800" cy="0"/>
           </a:xfrm>
           <a:prstGeom prst="straightConnector1">
             <a:avLst/>
@@ -3558,14 +3204,14 @@
       </p:cxnSp>
       <p:cxnSp>
         <p:nvCxnSpPr>
-          <p:cNvPr id="29" name="Conector recto de flecha 28"/>
+          <p:cNvPr id="41" name="Conector recto de flecha 40"/>
           <p:cNvCxnSpPr/>
           <p:nvPr/>
         </p:nvCxnSpPr>
         <p:spPr>
           <a:xfrm>
-            <a:off x="9334500" y="2670175"/>
-            <a:ext cx="0" cy="463549"/>
+            <a:off x="3517900" y="603250"/>
+            <a:ext cx="685800" cy="0"/>
           </a:xfrm>
           <a:prstGeom prst="straightConnector1">
             <a:avLst/>
@@ -3589,350 +3235,72 @@
           </a:fontRef>
         </p:style>
       </p:cxnSp>
-      <p:graphicFrame>
-        <p:nvGraphicFramePr>
-          <p:cNvPr id="30" name="Tabla 29"/>
-          <p:cNvGraphicFramePr>
-            <a:graphicFrameLocks noGrp="1"/>
-          </p:cNvGraphicFramePr>
-          <p:nvPr>
-            <p:extLst>
-              <p:ext uri="{D42A27DB-BD31-4B8C-83A1-F6EECF244321}">
-                <p14:modId xmlns:p14="http://schemas.microsoft.com/office/powerpoint/2010/main" val="3471780625"/>
-              </p:ext>
-            </p:extLst>
-          </p:nvPr>
-        </p:nvGraphicFramePr>
-        <p:xfrm>
-          <a:off x="5768975" y="3168135"/>
-          <a:ext cx="1758950" cy="1854200"/>
-        </p:xfrm>
-        <a:graphic>
-          <a:graphicData uri="http://schemas.openxmlformats.org/drawingml/2006/table">
-            <a:tbl>
-              <a:tblPr firstRow="1" bandRow="1">
-                <a:tableStyleId>{5940675A-B579-460E-94D1-54222C63F5DA}</a:tableStyleId>
-              </a:tblPr>
-              <a:tblGrid>
-                <a:gridCol w="1758950"/>
-              </a:tblGrid>
-              <a:tr h="370840">
-                <a:tc>
-                  <a:txBody>
-                    <a:bodyPr/>
-                    <a:lstStyle/>
-                    <a:p>
-                      <a:endParaRPr lang="es-HN" dirty="0"/>
-                    </a:p>
-                  </a:txBody>
-                  <a:tcPr/>
-                </a:tc>
-              </a:tr>
-              <a:tr h="370840">
-                <a:tc>
-                  <a:txBody>
-                    <a:bodyPr/>
-                    <a:lstStyle/>
-                    <a:p>
-                      <a:endParaRPr lang="es-HN"/>
-                    </a:p>
-                  </a:txBody>
-                  <a:tcPr/>
-                </a:tc>
-              </a:tr>
-              <a:tr h="370840">
-                <a:tc>
-                  <a:txBody>
-                    <a:bodyPr/>
-                    <a:lstStyle/>
-                    <a:p>
-                      <a:endParaRPr lang="es-HN" dirty="0"/>
-                    </a:p>
-                  </a:txBody>
-                  <a:tcPr/>
-                </a:tc>
-              </a:tr>
-              <a:tr h="370840">
-                <a:tc>
-                  <a:txBody>
-                    <a:bodyPr/>
-                    <a:lstStyle/>
-                    <a:p>
-                      <a:endParaRPr lang="es-HN"/>
-                    </a:p>
-                  </a:txBody>
-                  <a:tcPr/>
-                </a:tc>
-              </a:tr>
-              <a:tr h="370840">
-                <a:tc>
-                  <a:txBody>
-                    <a:bodyPr/>
-                    <a:lstStyle/>
-                    <a:p>
-                      <a:endParaRPr lang="es-HN" dirty="0"/>
-                    </a:p>
-                  </a:txBody>
-                  <a:tcPr/>
-                </a:tc>
-              </a:tr>
-            </a:tbl>
-          </a:graphicData>
-        </a:graphic>
-      </p:graphicFrame>
-      <p:graphicFrame>
-        <p:nvGraphicFramePr>
-          <p:cNvPr id="31" name="Tabla 30"/>
-          <p:cNvGraphicFramePr>
-            <a:graphicFrameLocks noGrp="1"/>
-          </p:cNvGraphicFramePr>
-          <p:nvPr>
-            <p:extLst>
-              <p:ext uri="{D42A27DB-BD31-4B8C-83A1-F6EECF244321}">
-                <p14:modId xmlns:p14="http://schemas.microsoft.com/office/powerpoint/2010/main" val="3759088143"/>
-              </p:ext>
-            </p:extLst>
-          </p:nvPr>
-        </p:nvGraphicFramePr>
-        <p:xfrm>
-          <a:off x="8455025" y="3162299"/>
-          <a:ext cx="1758950" cy="1854200"/>
-        </p:xfrm>
-        <a:graphic>
-          <a:graphicData uri="http://schemas.openxmlformats.org/drawingml/2006/table">
-            <a:tbl>
-              <a:tblPr firstRow="1" bandRow="1">
-                <a:tableStyleId>{5940675A-B579-460E-94D1-54222C63F5DA}</a:tableStyleId>
-              </a:tblPr>
-              <a:tblGrid>
-                <a:gridCol w="1758950"/>
-              </a:tblGrid>
-              <a:tr h="370840">
-                <a:tc>
-                  <a:txBody>
-                    <a:bodyPr/>
-                    <a:lstStyle/>
-                    <a:p>
-                      <a:endParaRPr lang="es-HN" dirty="0"/>
-                    </a:p>
-                  </a:txBody>
-                  <a:tcPr/>
-                </a:tc>
-              </a:tr>
-              <a:tr h="370840">
-                <a:tc>
-                  <a:txBody>
-                    <a:bodyPr/>
-                    <a:lstStyle/>
-                    <a:p>
-                      <a:endParaRPr lang="es-HN"/>
-                    </a:p>
-                  </a:txBody>
-                  <a:tcPr/>
-                </a:tc>
-              </a:tr>
-              <a:tr h="370840">
-                <a:tc>
-                  <a:txBody>
-                    <a:bodyPr/>
-                    <a:lstStyle/>
-                    <a:p>
-                      <a:endParaRPr lang="es-HN" dirty="0"/>
-                    </a:p>
-                  </a:txBody>
-                  <a:tcPr/>
-                </a:tc>
-              </a:tr>
-              <a:tr h="370840">
-                <a:tc>
-                  <a:txBody>
-                    <a:bodyPr/>
-                    <a:lstStyle/>
-                    <a:p>
-                      <a:endParaRPr lang="es-HN"/>
-                    </a:p>
-                  </a:txBody>
-                  <a:tcPr/>
-                </a:tc>
-              </a:tr>
-              <a:tr h="370840">
-                <a:tc>
-                  <a:txBody>
-                    <a:bodyPr/>
-                    <a:lstStyle/>
-                    <a:p>
-                      <a:endParaRPr lang="es-HN" dirty="0"/>
-                    </a:p>
-                  </a:txBody>
-                  <a:tcPr/>
-                </a:tc>
-              </a:tr>
-            </a:tbl>
-          </a:graphicData>
-        </a:graphic>
-      </p:graphicFrame>
-      <p:sp>
-        <p:nvSpPr>
-          <p:cNvPr id="32" name="CuadroTexto 31"/>
-          <p:cNvSpPr txBox="1"/>
+      <p:cxnSp>
+        <p:nvCxnSpPr>
+          <p:cNvPr id="42" name="Conector recto de flecha 41"/>
+          <p:cNvCxnSpPr/>
           <p:nvPr/>
-        </p:nvSpPr>
+        </p:nvCxnSpPr>
         <p:spPr>
           <a:xfrm>
-            <a:off x="2705100" y="964684"/>
-            <a:ext cx="2171700" cy="923330"/>
+            <a:off x="5422900" y="603250"/>
+            <a:ext cx="685800" cy="0"/>
           </a:xfrm>
-          <a:prstGeom prst="rect">
+          <a:prstGeom prst="straightConnector1">
             <a:avLst/>
           </a:prstGeom>
-          <a:noFill/>
+          <a:ln>
+            <a:tailEnd type="triangle"/>
+          </a:ln>
         </p:spPr>
-        <p:txBody>
-          <a:bodyPr wrap="square" rtlCol="0">
-            <a:spAutoFit/>
-          </a:bodyPr>
-          <a:lstStyle/>
-          <a:p>
-            <a:r>
-              <a:rPr lang="es-HN" dirty="0" smtClean="0"/>
-              <a:t>Para cada tabla crear campos </a:t>
-            </a:r>
-          </a:p>
-          <a:p>
-            <a:r>
-              <a:rPr lang="es-HN" dirty="0" smtClean="0"/>
-              <a:t>*Obligatorio</a:t>
-            </a:r>
-            <a:endParaRPr lang="es-HN" dirty="0"/>
-          </a:p>
-        </p:txBody>
-      </p:sp>
-      <p:sp>
-        <p:nvSpPr>
-          <p:cNvPr id="33" name="CuadroTexto 32"/>
-          <p:cNvSpPr txBox="1"/>
+        <p:style>
+          <a:lnRef idx="1">
+            <a:schemeClr val="accent1"/>
+          </a:lnRef>
+          <a:fillRef idx="0">
+            <a:schemeClr val="accent1"/>
+          </a:fillRef>
+          <a:effectRef idx="0">
+            <a:schemeClr val="accent1"/>
+          </a:effectRef>
+          <a:fontRef idx="minor">
+            <a:schemeClr val="tx1"/>
+          </a:fontRef>
+        </p:style>
+      </p:cxnSp>
+      <p:cxnSp>
+        <p:nvCxnSpPr>
+          <p:cNvPr id="43" name="Conector recto de flecha 42"/>
+          <p:cNvCxnSpPr/>
           <p:nvPr/>
-        </p:nvSpPr>
+        </p:nvCxnSpPr>
         <p:spPr>
           <a:xfrm>
-            <a:off x="793750" y="3288784"/>
-            <a:ext cx="2171700" cy="923330"/>
+            <a:off x="7327900" y="584200"/>
+            <a:ext cx="685800" cy="0"/>
           </a:xfrm>
-          <a:prstGeom prst="rect">
+          <a:prstGeom prst="straightConnector1">
             <a:avLst/>
           </a:prstGeom>
-          <a:noFill/>
+          <a:ln>
+            <a:tailEnd type="triangle"/>
+          </a:ln>
         </p:spPr>
-        <p:txBody>
-          <a:bodyPr wrap="square" rtlCol="0">
-            <a:spAutoFit/>
-          </a:bodyPr>
-          <a:lstStyle/>
-          <a:p>
-            <a:r>
-              <a:rPr lang="es-HN" dirty="0" smtClean="0"/>
-              <a:t>Para cada campo crear registros </a:t>
-            </a:r>
-          </a:p>
-          <a:p>
-            <a:r>
-              <a:rPr lang="es-HN" dirty="0" smtClean="0"/>
-              <a:t>*Opcional</a:t>
-            </a:r>
-            <a:endParaRPr lang="es-HN" dirty="0"/>
-          </a:p>
-        </p:txBody>
-      </p:sp>
-      <p:sp>
-        <p:nvSpPr>
-          <p:cNvPr id="34" name="CuadroTexto 33"/>
-          <p:cNvSpPr txBox="1"/>
-          <p:nvPr/>
-        </p:nvSpPr>
-        <p:spPr>
-          <a:xfrm>
-            <a:off x="3940175" y="2726809"/>
-            <a:ext cx="1003300" cy="369332"/>
-          </a:xfrm>
-          <a:prstGeom prst="rect">
-            <a:avLst/>
-          </a:prstGeom>
-          <a:noFill/>
-        </p:spPr>
-        <p:txBody>
-          <a:bodyPr wrap="square" rtlCol="0">
-            <a:spAutoFit/>
-          </a:bodyPr>
-          <a:lstStyle/>
-          <a:p>
-            <a:r>
-              <a:rPr lang="es-HN" dirty="0" smtClean="0"/>
-              <a:t>Ptr* </a:t>
-            </a:r>
-            <a:endParaRPr lang="es-HN" dirty="0"/>
-          </a:p>
-        </p:txBody>
-      </p:sp>
-      <p:sp>
-        <p:nvSpPr>
-          <p:cNvPr id="35" name="CuadroTexto 34"/>
-          <p:cNvSpPr txBox="1"/>
-          <p:nvPr/>
-        </p:nvSpPr>
-        <p:spPr>
-          <a:xfrm>
-            <a:off x="6772275" y="2747408"/>
-            <a:ext cx="1003300" cy="369332"/>
-          </a:xfrm>
-          <a:prstGeom prst="rect">
-            <a:avLst/>
-          </a:prstGeom>
-          <a:noFill/>
-        </p:spPr>
-        <p:txBody>
-          <a:bodyPr wrap="square" rtlCol="0">
-            <a:spAutoFit/>
-          </a:bodyPr>
-          <a:lstStyle/>
-          <a:p>
-            <a:r>
-              <a:rPr lang="es-HN" dirty="0" smtClean="0"/>
-              <a:t>Ptr* </a:t>
-            </a:r>
-            <a:endParaRPr lang="es-HN" dirty="0"/>
-          </a:p>
-        </p:txBody>
-      </p:sp>
-      <p:sp>
-        <p:nvSpPr>
-          <p:cNvPr id="36" name="CuadroTexto 35"/>
-          <p:cNvSpPr txBox="1"/>
-          <p:nvPr/>
-        </p:nvSpPr>
-        <p:spPr>
-          <a:xfrm>
-            <a:off x="9458324" y="2717283"/>
-            <a:ext cx="1003300" cy="369332"/>
-          </a:xfrm>
-          <a:prstGeom prst="rect">
-            <a:avLst/>
-          </a:prstGeom>
-          <a:noFill/>
-        </p:spPr>
-        <p:txBody>
-          <a:bodyPr wrap="square" rtlCol="0">
-            <a:spAutoFit/>
-          </a:bodyPr>
-          <a:lstStyle/>
-          <a:p>
-            <a:r>
-              <a:rPr lang="es-HN" dirty="0" smtClean="0"/>
-              <a:t>Ptr* </a:t>
-            </a:r>
-            <a:endParaRPr lang="es-HN" dirty="0"/>
-          </a:p>
-        </p:txBody>
-      </p:sp>
+        <p:style>
+          <a:lnRef idx="1">
+            <a:schemeClr val="accent1"/>
+          </a:lnRef>
+          <a:fillRef idx="0">
+            <a:schemeClr val="accent1"/>
+          </a:fillRef>
+          <a:effectRef idx="0">
+            <a:schemeClr val="accent1"/>
+          </a:effectRef>
+          <a:fontRef idx="minor">
+            <a:schemeClr val="tx1"/>
+          </a:fontRef>
+        </p:style>
+      </p:cxnSp>
     </p:spTree>
     <p:extLst>
       <p:ext uri="{BB962C8B-B14F-4D97-AF65-F5344CB8AC3E}">

</xml_diff>

<commit_message>
lidiando con consultas a otras structs
</commit_message>
<xml_diff>
--- a/Proyecto/diseñoTCR.pptx
+++ b/Proyecto/diseñoTCR.pptx
@@ -243,7 +243,7 @@
           <a:p>
             <a:fld id="{2ED90B40-CE33-4CFC-B1B9-E881A0D2F4CD}" type="datetimeFigureOut">
               <a:rPr lang="es-HN" smtClean="0"/>
-              <a:t>28/10/2016</a:t>
+              <a:t>30/10/2016</a:t>
             </a:fld>
             <a:endParaRPr lang="es-HN"/>
           </a:p>
@@ -413,7 +413,7 @@
           <a:p>
             <a:fld id="{2ED90B40-CE33-4CFC-B1B9-E881A0D2F4CD}" type="datetimeFigureOut">
               <a:rPr lang="es-HN" smtClean="0"/>
-              <a:t>28/10/2016</a:t>
+              <a:t>30/10/2016</a:t>
             </a:fld>
             <a:endParaRPr lang="es-HN"/>
           </a:p>
@@ -593,7 +593,7 @@
           <a:p>
             <a:fld id="{2ED90B40-CE33-4CFC-B1B9-E881A0D2F4CD}" type="datetimeFigureOut">
               <a:rPr lang="es-HN" smtClean="0"/>
-              <a:t>28/10/2016</a:t>
+              <a:t>30/10/2016</a:t>
             </a:fld>
             <a:endParaRPr lang="es-HN"/>
           </a:p>
@@ -763,7 +763,7 @@
           <a:p>
             <a:fld id="{2ED90B40-CE33-4CFC-B1B9-E881A0D2F4CD}" type="datetimeFigureOut">
               <a:rPr lang="es-HN" smtClean="0"/>
-              <a:t>28/10/2016</a:t>
+              <a:t>30/10/2016</a:t>
             </a:fld>
             <a:endParaRPr lang="es-HN"/>
           </a:p>
@@ -1009,7 +1009,7 @@
           <a:p>
             <a:fld id="{2ED90B40-CE33-4CFC-B1B9-E881A0D2F4CD}" type="datetimeFigureOut">
               <a:rPr lang="es-HN" smtClean="0"/>
-              <a:t>28/10/2016</a:t>
+              <a:t>30/10/2016</a:t>
             </a:fld>
             <a:endParaRPr lang="es-HN"/>
           </a:p>
@@ -1241,7 +1241,7 @@
           <a:p>
             <a:fld id="{2ED90B40-CE33-4CFC-B1B9-E881A0D2F4CD}" type="datetimeFigureOut">
               <a:rPr lang="es-HN" smtClean="0"/>
-              <a:t>28/10/2016</a:t>
+              <a:t>30/10/2016</a:t>
             </a:fld>
             <a:endParaRPr lang="es-HN"/>
           </a:p>
@@ -1608,7 +1608,7 @@
           <a:p>
             <a:fld id="{2ED90B40-CE33-4CFC-B1B9-E881A0D2F4CD}" type="datetimeFigureOut">
               <a:rPr lang="es-HN" smtClean="0"/>
-              <a:t>28/10/2016</a:t>
+              <a:t>30/10/2016</a:t>
             </a:fld>
             <a:endParaRPr lang="es-HN"/>
           </a:p>
@@ -1726,7 +1726,7 @@
           <a:p>
             <a:fld id="{2ED90B40-CE33-4CFC-B1B9-E881A0D2F4CD}" type="datetimeFigureOut">
               <a:rPr lang="es-HN" smtClean="0"/>
-              <a:t>28/10/2016</a:t>
+              <a:t>30/10/2016</a:t>
             </a:fld>
             <a:endParaRPr lang="es-HN"/>
           </a:p>
@@ -1821,7 +1821,7 @@
           <a:p>
             <a:fld id="{2ED90B40-CE33-4CFC-B1B9-E881A0D2F4CD}" type="datetimeFigureOut">
               <a:rPr lang="es-HN" smtClean="0"/>
-              <a:t>28/10/2016</a:t>
+              <a:t>30/10/2016</a:t>
             </a:fld>
             <a:endParaRPr lang="es-HN"/>
           </a:p>
@@ -2098,7 +2098,7 @@
           <a:p>
             <a:fld id="{2ED90B40-CE33-4CFC-B1B9-E881A0D2F4CD}" type="datetimeFigureOut">
               <a:rPr lang="es-HN" smtClean="0"/>
-              <a:t>28/10/2016</a:t>
+              <a:t>30/10/2016</a:t>
             </a:fld>
             <a:endParaRPr lang="es-HN"/>
           </a:p>
@@ -2351,7 +2351,7 @@
           <a:p>
             <a:fld id="{2ED90B40-CE33-4CFC-B1B9-E881A0D2F4CD}" type="datetimeFigureOut">
               <a:rPr lang="es-HN" smtClean="0"/>
-              <a:t>28/10/2016</a:t>
+              <a:t>30/10/2016</a:t>
             </a:fld>
             <a:endParaRPr lang="es-HN"/>
           </a:p>
@@ -2564,7 +2564,7 @@
           <a:p>
             <a:fld id="{2ED90B40-CE33-4CFC-B1B9-E881A0D2F4CD}" type="datetimeFigureOut">
               <a:rPr lang="es-HN" smtClean="0"/>
-              <a:t>28/10/2016</a:t>
+              <a:t>30/10/2016</a:t>
             </a:fld>
             <a:endParaRPr lang="es-HN"/>
           </a:p>
@@ -2971,13 +2971,91 @@
       </p:grpSpPr>
       <p:sp>
         <p:nvSpPr>
+          <p:cNvPr id="60" name="Rectángulo 59"/>
+          <p:cNvSpPr/>
+          <p:nvPr/>
+        </p:nvSpPr>
+        <p:spPr>
+          <a:xfrm>
+            <a:off x="1714500" y="254000"/>
+            <a:ext cx="2222500" cy="1282700"/>
+          </a:xfrm>
+          <a:prstGeom prst="rect">
+            <a:avLst/>
+          </a:prstGeom>
+          <a:ln/>
+        </p:spPr>
+        <p:style>
+          <a:lnRef idx="1">
+            <a:schemeClr val="accent3"/>
+          </a:lnRef>
+          <a:fillRef idx="2">
+            <a:schemeClr val="accent3"/>
+          </a:fillRef>
+          <a:effectRef idx="1">
+            <a:schemeClr val="accent3"/>
+          </a:effectRef>
+          <a:fontRef idx="minor">
+            <a:schemeClr val="dk1"/>
+          </a:fontRef>
+        </p:style>
+        <p:txBody>
+          <a:bodyPr rtlCol="0" anchor="ctr"/>
+          <a:lstStyle/>
+          <a:p>
+            <a:pPr algn="ctr"/>
+            <a:endParaRPr lang="es-HN"/>
+          </a:p>
+        </p:txBody>
+      </p:sp>
+      <p:sp>
+        <p:nvSpPr>
+          <p:cNvPr id="59" name="Rectángulo 58"/>
+          <p:cNvSpPr/>
+          <p:nvPr/>
+        </p:nvSpPr>
+        <p:spPr>
+          <a:xfrm>
+            <a:off x="1714500" y="1536700"/>
+            <a:ext cx="8013700" cy="4470400"/>
+          </a:xfrm>
+          <a:prstGeom prst="rect">
+            <a:avLst/>
+          </a:prstGeom>
+          <a:ln/>
+        </p:spPr>
+        <p:style>
+          <a:lnRef idx="1">
+            <a:schemeClr val="accent3"/>
+          </a:lnRef>
+          <a:fillRef idx="2">
+            <a:schemeClr val="accent3"/>
+          </a:fillRef>
+          <a:effectRef idx="1">
+            <a:schemeClr val="accent3"/>
+          </a:effectRef>
+          <a:fontRef idx="minor">
+            <a:schemeClr val="dk1"/>
+          </a:fontRef>
+        </p:style>
+        <p:txBody>
+          <a:bodyPr rtlCol="0" anchor="ctr"/>
+          <a:lstStyle/>
+          <a:p>
+            <a:pPr algn="ctr"/>
+            <a:endParaRPr lang="es-HN"/>
+          </a:p>
+        </p:txBody>
+      </p:sp>
+      <p:sp>
+        <p:nvSpPr>
           <p:cNvPr id="3" name="Rectángulo 2"/>
           <p:cNvSpPr/>
           <p:nvPr/>
         </p:nvSpPr>
         <p:spPr>
           <a:xfrm>
-            <a:off x="279400" y="203200"/>
+            <a:off x="2108200" y="444500"/>
             <a:ext cx="1333500" cy="800100"/>
           </a:xfrm>
           <a:prstGeom prst="rect">
@@ -3006,7 +3084,11 @@
           <a:lstStyle/>
           <a:p>
             <a:pPr algn="ctr"/>
-            <a:endParaRPr lang="es-HN"/>
+            <a:r>
+              <a:rPr lang="es-HN" dirty="0" smtClean="0"/>
+              <a:t>TABLA 1</a:t>
+            </a:r>
+            <a:endParaRPr lang="es-HN" dirty="0"/>
           </a:p>
         </p:txBody>
       </p:sp>
@@ -3018,7 +3100,7 @@
         </p:nvSpPr>
         <p:spPr>
           <a:xfrm>
-            <a:off x="2298700" y="203200"/>
+            <a:off x="4127500" y="444500"/>
             <a:ext cx="1333500" cy="800100"/>
           </a:xfrm>
           <a:prstGeom prst="rect">
@@ -3045,7 +3127,11 @@
           <a:lstStyle/>
           <a:p>
             <a:pPr algn="ctr"/>
-            <a:endParaRPr lang="es-HN"/>
+            <a:r>
+              <a:rPr lang="es-HN" dirty="0" smtClean="0"/>
+              <a:t>TABLA 2</a:t>
+            </a:r>
+            <a:endParaRPr lang="es-HN" dirty="0"/>
           </a:p>
         </p:txBody>
       </p:sp>
@@ -3057,7 +3143,7 @@
         </p:nvSpPr>
         <p:spPr>
           <a:xfrm>
-            <a:off x="4203700" y="203200"/>
+            <a:off x="6032500" y="444500"/>
             <a:ext cx="1333500" cy="800100"/>
           </a:xfrm>
           <a:prstGeom prst="rect">
@@ -3084,85 +3170,11 @@
           <a:lstStyle/>
           <a:p>
             <a:pPr algn="ctr"/>
-            <a:endParaRPr lang="es-HN"/>
-          </a:p>
-        </p:txBody>
-      </p:sp>
-      <p:sp>
-        <p:nvSpPr>
-          <p:cNvPr id="39" name="Rectángulo 38"/>
-          <p:cNvSpPr/>
-          <p:nvPr/>
-        </p:nvSpPr>
-        <p:spPr>
-          <a:xfrm>
-            <a:off x="6108700" y="203200"/>
-            <a:ext cx="1333500" cy="800100"/>
-          </a:xfrm>
-          <a:prstGeom prst="rect">
-            <a:avLst/>
-          </a:prstGeom>
-          <a:ln/>
-        </p:spPr>
-        <p:style>
-          <a:lnRef idx="0">
-            <a:schemeClr val="accent2"/>
-          </a:lnRef>
-          <a:fillRef idx="3">
-            <a:schemeClr val="accent2"/>
-          </a:fillRef>
-          <a:effectRef idx="3">
-            <a:schemeClr val="accent2"/>
-          </a:effectRef>
-          <a:fontRef idx="minor">
-            <a:schemeClr val="lt1"/>
-          </a:fontRef>
-        </p:style>
-        <p:txBody>
-          <a:bodyPr rtlCol="0" anchor="ctr"/>
-          <a:lstStyle/>
-          <a:p>
-            <a:pPr algn="ctr"/>
-            <a:endParaRPr lang="es-HN"/>
-          </a:p>
-        </p:txBody>
-      </p:sp>
-      <p:sp>
-        <p:nvSpPr>
-          <p:cNvPr id="40" name="Rectángulo 39"/>
-          <p:cNvSpPr/>
-          <p:nvPr/>
-        </p:nvSpPr>
-        <p:spPr>
-          <a:xfrm>
-            <a:off x="8013700" y="203200"/>
-            <a:ext cx="1333500" cy="800100"/>
-          </a:xfrm>
-          <a:prstGeom prst="rect">
-            <a:avLst/>
-          </a:prstGeom>
-          <a:ln/>
-        </p:spPr>
-        <p:style>
-          <a:lnRef idx="0">
-            <a:schemeClr val="accent2"/>
-          </a:lnRef>
-          <a:fillRef idx="3">
-            <a:schemeClr val="accent2"/>
-          </a:fillRef>
-          <a:effectRef idx="3">
-            <a:schemeClr val="accent2"/>
-          </a:effectRef>
-          <a:fontRef idx="minor">
-            <a:schemeClr val="lt1"/>
-          </a:fontRef>
-        </p:style>
-        <p:txBody>
-          <a:bodyPr rtlCol="0" anchor="ctr"/>
-          <a:lstStyle/>
-          <a:p>
-            <a:pPr algn="ctr"/>
-            <a:endParaRPr lang="es-HN"/>
+            <a:r>
+              <a:rPr lang="es-HN" dirty="0" smtClean="0"/>
+              <a:t>TABLA 3</a:t>
+            </a:r>
+            <a:endParaRPr lang="es-HN" dirty="0"/>
           </a:p>
         </p:txBody>
       </p:sp>
@@ -3177,7 +3189,7 @@
         </p:nvCxnSpPr>
         <p:spPr>
           <a:xfrm>
-            <a:off x="1612900" y="603250"/>
+            <a:off x="3441700" y="844550"/>
             <a:ext cx="685800" cy="0"/>
           </a:xfrm>
           <a:prstGeom prst="straightConnector1">
@@ -3210,7 +3222,7 @@
         </p:nvCxnSpPr>
         <p:spPr>
           <a:xfrm>
-            <a:off x="3517900" y="603250"/>
+            <a:off x="5346700" y="844550"/>
             <a:ext cx="685800" cy="0"/>
           </a:xfrm>
           <a:prstGeom prst="straightConnector1">
@@ -3243,7 +3255,7 @@
         </p:nvCxnSpPr>
         <p:spPr>
           <a:xfrm>
-            <a:off x="5422900" y="603250"/>
+            <a:off x="7251700" y="844550"/>
             <a:ext cx="685800" cy="0"/>
           </a:xfrm>
           <a:prstGeom prst="straightConnector1">
@@ -3270,16 +3282,18 @@
       </p:cxnSp>
       <p:cxnSp>
         <p:nvCxnSpPr>
-          <p:cNvPr id="43" name="Conector recto de flecha 42"/>
-          <p:cNvCxnSpPr/>
+          <p:cNvPr id="28" name="Conector angular 27"/>
+          <p:cNvCxnSpPr>
+            <a:endCxn id="23" idx="1"/>
+          </p:cNvCxnSpPr>
           <p:nvPr/>
         </p:nvCxnSpPr>
         <p:spPr>
-          <a:xfrm>
-            <a:off x="7327900" y="584200"/>
-            <a:ext cx="685800" cy="0"/>
-          </a:xfrm>
-          <a:prstGeom prst="straightConnector1">
+          <a:xfrm rot="16200000" flipH="1">
+            <a:off x="2049460" y="1960562"/>
+            <a:ext cx="1828804" cy="396876"/>
+          </a:xfrm>
+          <a:prstGeom prst="bentConnector2">
             <a:avLst/>
           </a:prstGeom>
           <a:ln>
@@ -3301,6 +3315,899 @@
           </a:fontRef>
         </p:style>
       </p:cxnSp>
+      <p:sp>
+        <p:nvSpPr>
+          <p:cNvPr id="23" name="Rectángulo redondeado 22"/>
+          <p:cNvSpPr/>
+          <p:nvPr/>
+        </p:nvSpPr>
+        <p:spPr>
+          <a:xfrm>
+            <a:off x="3162300" y="2501903"/>
+            <a:ext cx="5765800" cy="1142997"/>
+          </a:xfrm>
+          <a:prstGeom prst="roundRect">
+            <a:avLst/>
+          </a:prstGeom>
+          <a:ln/>
+        </p:spPr>
+        <p:style>
+          <a:lnRef idx="1">
+            <a:schemeClr val="accent6"/>
+          </a:lnRef>
+          <a:fillRef idx="3">
+            <a:schemeClr val="accent6"/>
+          </a:fillRef>
+          <a:effectRef idx="2">
+            <a:schemeClr val="accent6"/>
+          </a:effectRef>
+          <a:fontRef idx="minor">
+            <a:schemeClr val="lt1"/>
+          </a:fontRef>
+        </p:style>
+        <p:txBody>
+          <a:bodyPr rtlCol="0" anchor="ctr"/>
+          <a:lstStyle/>
+          <a:p>
+            <a:pPr algn="ctr"/>
+            <a:endParaRPr lang="es-HN"/>
+          </a:p>
+        </p:txBody>
+      </p:sp>
+      <p:sp>
+        <p:nvSpPr>
+          <p:cNvPr id="44" name="Rectángulo redondeado 43"/>
+          <p:cNvSpPr/>
+          <p:nvPr/>
+        </p:nvSpPr>
+        <p:spPr>
+          <a:xfrm>
+            <a:off x="3441700" y="2832100"/>
+            <a:ext cx="1244600" cy="635000"/>
+          </a:xfrm>
+          <a:prstGeom prst="roundRect">
+            <a:avLst/>
+          </a:prstGeom>
+          <a:ln/>
+        </p:spPr>
+        <p:style>
+          <a:lnRef idx="0">
+            <a:schemeClr val="accent3"/>
+          </a:lnRef>
+          <a:fillRef idx="3">
+            <a:schemeClr val="accent3"/>
+          </a:fillRef>
+          <a:effectRef idx="3">
+            <a:schemeClr val="accent3"/>
+          </a:effectRef>
+          <a:fontRef idx="minor">
+            <a:schemeClr val="lt1"/>
+          </a:fontRef>
+        </p:style>
+        <p:txBody>
+          <a:bodyPr rtlCol="0" anchor="ctr"/>
+          <a:lstStyle/>
+          <a:p>
+            <a:pPr algn="ctr"/>
+            <a:r>
+              <a:rPr lang="es-HN" dirty="0" smtClean="0"/>
+              <a:t>DESC CAMPO 1</a:t>
+            </a:r>
+          </a:p>
+        </p:txBody>
+      </p:sp>
+      <p:sp>
+        <p:nvSpPr>
+          <p:cNvPr id="45" name="Rectángulo redondeado 44"/>
+          <p:cNvSpPr/>
+          <p:nvPr/>
+        </p:nvSpPr>
+        <p:spPr>
+          <a:xfrm>
+            <a:off x="5118100" y="2832100"/>
+            <a:ext cx="1244600" cy="635000"/>
+          </a:xfrm>
+          <a:prstGeom prst="roundRect">
+            <a:avLst/>
+          </a:prstGeom>
+          <a:ln/>
+        </p:spPr>
+        <p:style>
+          <a:lnRef idx="0">
+            <a:schemeClr val="accent3"/>
+          </a:lnRef>
+          <a:fillRef idx="3">
+            <a:schemeClr val="accent3"/>
+          </a:fillRef>
+          <a:effectRef idx="3">
+            <a:schemeClr val="accent3"/>
+          </a:effectRef>
+          <a:fontRef idx="minor">
+            <a:schemeClr val="lt1"/>
+          </a:fontRef>
+        </p:style>
+        <p:txBody>
+          <a:bodyPr rtlCol="0" anchor="ctr"/>
+          <a:lstStyle/>
+          <a:p>
+            <a:pPr algn="ctr"/>
+            <a:r>
+              <a:rPr lang="es-HN" dirty="0" smtClean="0"/>
+              <a:t>DESC CAMPO 1</a:t>
+            </a:r>
+          </a:p>
+        </p:txBody>
+      </p:sp>
+      <p:sp>
+        <p:nvSpPr>
+          <p:cNvPr id="46" name="Rectángulo redondeado 45"/>
+          <p:cNvSpPr/>
+          <p:nvPr/>
+        </p:nvSpPr>
+        <p:spPr>
+          <a:xfrm>
+            <a:off x="6794500" y="2832100"/>
+            <a:ext cx="1244600" cy="635000"/>
+          </a:xfrm>
+          <a:prstGeom prst="roundRect">
+            <a:avLst/>
+          </a:prstGeom>
+          <a:ln/>
+        </p:spPr>
+        <p:style>
+          <a:lnRef idx="0">
+            <a:schemeClr val="accent3"/>
+          </a:lnRef>
+          <a:fillRef idx="3">
+            <a:schemeClr val="accent3"/>
+          </a:fillRef>
+          <a:effectRef idx="3">
+            <a:schemeClr val="accent3"/>
+          </a:effectRef>
+          <a:fontRef idx="minor">
+            <a:schemeClr val="lt1"/>
+          </a:fontRef>
+        </p:style>
+        <p:txBody>
+          <a:bodyPr rtlCol="0" anchor="ctr"/>
+          <a:lstStyle/>
+          <a:p>
+            <a:pPr algn="ctr"/>
+            <a:r>
+              <a:rPr lang="es-HN" dirty="0" smtClean="0"/>
+              <a:t>DESC CAMPO 1</a:t>
+            </a:r>
+          </a:p>
+        </p:txBody>
+      </p:sp>
+      <p:cxnSp>
+        <p:nvCxnSpPr>
+          <p:cNvPr id="47" name="Conector recto de flecha 46"/>
+          <p:cNvCxnSpPr>
+            <a:endCxn id="45" idx="1"/>
+          </p:cNvCxnSpPr>
+          <p:nvPr/>
+        </p:nvCxnSpPr>
+        <p:spPr>
+          <a:xfrm>
+            <a:off x="4686300" y="3124200"/>
+            <a:ext cx="431800" cy="25400"/>
+          </a:xfrm>
+          <a:prstGeom prst="straightConnector1">
+            <a:avLst/>
+          </a:prstGeom>
+          <a:ln>
+            <a:tailEnd type="triangle"/>
+          </a:ln>
+        </p:spPr>
+        <p:style>
+          <a:lnRef idx="3">
+            <a:schemeClr val="accent2"/>
+          </a:lnRef>
+          <a:fillRef idx="0">
+            <a:schemeClr val="accent2"/>
+          </a:fillRef>
+          <a:effectRef idx="2">
+            <a:schemeClr val="accent2"/>
+          </a:effectRef>
+          <a:fontRef idx="minor">
+            <a:schemeClr val="tx1"/>
+          </a:fontRef>
+        </p:style>
+      </p:cxnSp>
+      <p:cxnSp>
+        <p:nvCxnSpPr>
+          <p:cNvPr id="48" name="Conector recto de flecha 47"/>
+          <p:cNvCxnSpPr/>
+          <p:nvPr/>
+        </p:nvCxnSpPr>
+        <p:spPr>
+          <a:xfrm>
+            <a:off x="6356350" y="3149600"/>
+            <a:ext cx="431800" cy="25400"/>
+          </a:xfrm>
+          <a:prstGeom prst="straightConnector1">
+            <a:avLst/>
+          </a:prstGeom>
+          <a:ln>
+            <a:tailEnd type="triangle"/>
+          </a:ln>
+        </p:spPr>
+        <p:style>
+          <a:lnRef idx="3">
+            <a:schemeClr val="accent2"/>
+          </a:lnRef>
+          <a:fillRef idx="0">
+            <a:schemeClr val="accent2"/>
+          </a:fillRef>
+          <a:effectRef idx="2">
+            <a:schemeClr val="accent2"/>
+          </a:effectRef>
+          <a:fontRef idx="minor">
+            <a:schemeClr val="tx1"/>
+          </a:fontRef>
+        </p:style>
+      </p:cxnSp>
+      <p:cxnSp>
+        <p:nvCxnSpPr>
+          <p:cNvPr id="49" name="Conector recto de flecha 48"/>
+          <p:cNvCxnSpPr/>
+          <p:nvPr/>
+        </p:nvCxnSpPr>
+        <p:spPr>
+          <a:xfrm>
+            <a:off x="8051800" y="3098800"/>
+            <a:ext cx="431800" cy="25400"/>
+          </a:xfrm>
+          <a:prstGeom prst="straightConnector1">
+            <a:avLst/>
+          </a:prstGeom>
+          <a:ln>
+            <a:tailEnd type="triangle"/>
+          </a:ln>
+        </p:spPr>
+        <p:style>
+          <a:lnRef idx="3">
+            <a:schemeClr val="accent2"/>
+          </a:lnRef>
+          <a:fillRef idx="0">
+            <a:schemeClr val="accent2"/>
+          </a:fillRef>
+          <a:effectRef idx="2">
+            <a:schemeClr val="accent2"/>
+          </a:effectRef>
+          <a:fontRef idx="minor">
+            <a:schemeClr val="tx1"/>
+          </a:fontRef>
+        </p:style>
+      </p:cxnSp>
+      <p:cxnSp>
+        <p:nvCxnSpPr>
+          <p:cNvPr id="50" name="Conector recto de flecha 49"/>
+          <p:cNvCxnSpPr>
+            <a:stCxn id="23" idx="2"/>
+          </p:cNvCxnSpPr>
+          <p:nvPr/>
+        </p:nvCxnSpPr>
+        <p:spPr>
+          <a:xfrm>
+            <a:off x="6045200" y="3644900"/>
+            <a:ext cx="0" cy="596897"/>
+          </a:xfrm>
+          <a:prstGeom prst="straightConnector1">
+            <a:avLst/>
+          </a:prstGeom>
+          <a:ln>
+            <a:tailEnd type="triangle"/>
+          </a:ln>
+        </p:spPr>
+        <p:style>
+          <a:lnRef idx="1">
+            <a:schemeClr val="accent1"/>
+          </a:lnRef>
+          <a:fillRef idx="0">
+            <a:schemeClr val="accent1"/>
+          </a:fillRef>
+          <a:effectRef idx="0">
+            <a:schemeClr val="accent1"/>
+          </a:effectRef>
+          <a:fontRef idx="minor">
+            <a:schemeClr val="tx1"/>
+          </a:fontRef>
+        </p:style>
+      </p:cxnSp>
+      <p:sp>
+        <p:nvSpPr>
+          <p:cNvPr id="52" name="Rectángulo redondeado 51"/>
+          <p:cNvSpPr/>
+          <p:nvPr/>
+        </p:nvSpPr>
+        <p:spPr>
+          <a:xfrm>
+            <a:off x="3162300" y="4038605"/>
+            <a:ext cx="5765800" cy="1212844"/>
+          </a:xfrm>
+          <a:prstGeom prst="roundRect">
+            <a:avLst/>
+          </a:prstGeom>
+          <a:ln/>
+        </p:spPr>
+        <p:style>
+          <a:lnRef idx="1">
+            <a:schemeClr val="accent6"/>
+          </a:lnRef>
+          <a:fillRef idx="3">
+            <a:schemeClr val="accent6"/>
+          </a:fillRef>
+          <a:effectRef idx="2">
+            <a:schemeClr val="accent6"/>
+          </a:effectRef>
+          <a:fontRef idx="minor">
+            <a:schemeClr val="lt1"/>
+          </a:fontRef>
+        </p:style>
+        <p:txBody>
+          <a:bodyPr rtlCol="0" anchor="ctr"/>
+          <a:lstStyle/>
+          <a:p>
+            <a:pPr algn="ctr"/>
+            <a:endParaRPr lang="es-HN"/>
+          </a:p>
+        </p:txBody>
+      </p:sp>
+      <p:sp>
+        <p:nvSpPr>
+          <p:cNvPr id="53" name="Rectángulo redondeado 52"/>
+          <p:cNvSpPr/>
+          <p:nvPr/>
+        </p:nvSpPr>
+        <p:spPr>
+          <a:xfrm>
+            <a:off x="3441700" y="4438649"/>
+            <a:ext cx="1244600" cy="635000"/>
+          </a:xfrm>
+          <a:prstGeom prst="roundRect">
+            <a:avLst/>
+          </a:prstGeom>
+          <a:ln/>
+        </p:spPr>
+        <p:style>
+          <a:lnRef idx="0">
+            <a:schemeClr val="accent3"/>
+          </a:lnRef>
+          <a:fillRef idx="3">
+            <a:schemeClr val="accent3"/>
+          </a:fillRef>
+          <a:effectRef idx="3">
+            <a:schemeClr val="accent3"/>
+          </a:effectRef>
+          <a:fontRef idx="minor">
+            <a:schemeClr val="lt1"/>
+          </a:fontRef>
+        </p:style>
+        <p:txBody>
+          <a:bodyPr rtlCol="0" anchor="ctr"/>
+          <a:lstStyle/>
+          <a:p>
+            <a:pPr algn="ctr"/>
+            <a:r>
+              <a:rPr lang="es-HN" dirty="0" smtClean="0"/>
+              <a:t>DESC CAMPO 1</a:t>
+            </a:r>
+          </a:p>
+        </p:txBody>
+      </p:sp>
+      <p:sp>
+        <p:nvSpPr>
+          <p:cNvPr id="54" name="Rectángulo redondeado 53"/>
+          <p:cNvSpPr/>
+          <p:nvPr/>
+        </p:nvSpPr>
+        <p:spPr>
+          <a:xfrm>
+            <a:off x="5118100" y="4438649"/>
+            <a:ext cx="1244600" cy="635000"/>
+          </a:xfrm>
+          <a:prstGeom prst="roundRect">
+            <a:avLst/>
+          </a:prstGeom>
+          <a:ln/>
+        </p:spPr>
+        <p:style>
+          <a:lnRef idx="0">
+            <a:schemeClr val="accent3"/>
+          </a:lnRef>
+          <a:fillRef idx="3">
+            <a:schemeClr val="accent3"/>
+          </a:fillRef>
+          <a:effectRef idx="3">
+            <a:schemeClr val="accent3"/>
+          </a:effectRef>
+          <a:fontRef idx="minor">
+            <a:schemeClr val="lt1"/>
+          </a:fontRef>
+        </p:style>
+        <p:txBody>
+          <a:bodyPr rtlCol="0" anchor="ctr"/>
+          <a:lstStyle/>
+          <a:p>
+            <a:pPr algn="ctr"/>
+            <a:r>
+              <a:rPr lang="es-HN" dirty="0" smtClean="0"/>
+              <a:t>DESC CAMPO 1</a:t>
+            </a:r>
+          </a:p>
+        </p:txBody>
+      </p:sp>
+      <p:sp>
+        <p:nvSpPr>
+          <p:cNvPr id="55" name="Rectángulo redondeado 54"/>
+          <p:cNvSpPr/>
+          <p:nvPr/>
+        </p:nvSpPr>
+        <p:spPr>
+          <a:xfrm>
+            <a:off x="6794500" y="4438649"/>
+            <a:ext cx="1244600" cy="635000"/>
+          </a:xfrm>
+          <a:prstGeom prst="roundRect">
+            <a:avLst/>
+          </a:prstGeom>
+          <a:ln/>
+        </p:spPr>
+        <p:style>
+          <a:lnRef idx="0">
+            <a:schemeClr val="accent3"/>
+          </a:lnRef>
+          <a:fillRef idx="3">
+            <a:schemeClr val="accent3"/>
+          </a:fillRef>
+          <a:effectRef idx="3">
+            <a:schemeClr val="accent3"/>
+          </a:effectRef>
+          <a:fontRef idx="minor">
+            <a:schemeClr val="lt1"/>
+          </a:fontRef>
+        </p:style>
+        <p:txBody>
+          <a:bodyPr rtlCol="0" anchor="ctr"/>
+          <a:lstStyle/>
+          <a:p>
+            <a:pPr algn="ctr"/>
+            <a:r>
+              <a:rPr lang="es-HN" dirty="0" smtClean="0"/>
+              <a:t>DESC CAMPO 1</a:t>
+            </a:r>
+          </a:p>
+        </p:txBody>
+      </p:sp>
+      <p:cxnSp>
+        <p:nvCxnSpPr>
+          <p:cNvPr id="56" name="Conector recto de flecha 55"/>
+          <p:cNvCxnSpPr>
+            <a:endCxn id="54" idx="1"/>
+          </p:cNvCxnSpPr>
+          <p:nvPr/>
+        </p:nvCxnSpPr>
+        <p:spPr>
+          <a:xfrm>
+            <a:off x="4686300" y="4730749"/>
+            <a:ext cx="431800" cy="25400"/>
+          </a:xfrm>
+          <a:prstGeom prst="straightConnector1">
+            <a:avLst/>
+          </a:prstGeom>
+          <a:ln>
+            <a:tailEnd type="triangle"/>
+          </a:ln>
+        </p:spPr>
+        <p:style>
+          <a:lnRef idx="3">
+            <a:schemeClr val="accent2"/>
+          </a:lnRef>
+          <a:fillRef idx="0">
+            <a:schemeClr val="accent2"/>
+          </a:fillRef>
+          <a:effectRef idx="2">
+            <a:schemeClr val="accent2"/>
+          </a:effectRef>
+          <a:fontRef idx="minor">
+            <a:schemeClr val="tx1"/>
+          </a:fontRef>
+        </p:style>
+      </p:cxnSp>
+      <p:cxnSp>
+        <p:nvCxnSpPr>
+          <p:cNvPr id="57" name="Conector recto de flecha 56"/>
+          <p:cNvCxnSpPr/>
+          <p:nvPr/>
+        </p:nvCxnSpPr>
+        <p:spPr>
+          <a:xfrm>
+            <a:off x="6356350" y="4756149"/>
+            <a:ext cx="431800" cy="25400"/>
+          </a:xfrm>
+          <a:prstGeom prst="straightConnector1">
+            <a:avLst/>
+          </a:prstGeom>
+          <a:ln>
+            <a:tailEnd type="triangle"/>
+          </a:ln>
+        </p:spPr>
+        <p:style>
+          <a:lnRef idx="3">
+            <a:schemeClr val="accent2"/>
+          </a:lnRef>
+          <a:fillRef idx="0">
+            <a:schemeClr val="accent2"/>
+          </a:fillRef>
+          <a:effectRef idx="2">
+            <a:schemeClr val="accent2"/>
+          </a:effectRef>
+          <a:fontRef idx="minor">
+            <a:schemeClr val="tx1"/>
+          </a:fontRef>
+        </p:style>
+      </p:cxnSp>
+      <p:cxnSp>
+        <p:nvCxnSpPr>
+          <p:cNvPr id="58" name="Conector recto de flecha 57"/>
+          <p:cNvCxnSpPr/>
+          <p:nvPr/>
+        </p:nvCxnSpPr>
+        <p:spPr>
+          <a:xfrm>
+            <a:off x="8051800" y="4705349"/>
+            <a:ext cx="431800" cy="25400"/>
+          </a:xfrm>
+          <a:prstGeom prst="straightConnector1">
+            <a:avLst/>
+          </a:prstGeom>
+          <a:ln>
+            <a:tailEnd type="triangle"/>
+          </a:ln>
+        </p:spPr>
+        <p:style>
+          <a:lnRef idx="3">
+            <a:schemeClr val="accent2"/>
+          </a:lnRef>
+          <a:fillRef idx="0">
+            <a:schemeClr val="accent2"/>
+          </a:fillRef>
+          <a:effectRef idx="2">
+            <a:schemeClr val="accent2"/>
+          </a:effectRef>
+          <a:fontRef idx="minor">
+            <a:schemeClr val="tx1"/>
+          </a:fontRef>
+        </p:style>
+      </p:cxnSp>
+      <p:cxnSp>
+        <p:nvCxnSpPr>
+          <p:cNvPr id="12" name="Conector angular 11"/>
+          <p:cNvCxnSpPr>
+            <a:stCxn id="3" idx="2"/>
+            <a:endCxn id="6" idx="1"/>
+          </p:cNvCxnSpPr>
+          <p:nvPr/>
+        </p:nvCxnSpPr>
+        <p:spPr>
+          <a:xfrm rot="16200000" flipH="1">
+            <a:off x="2563812" y="1455737"/>
+            <a:ext cx="793750" cy="371475"/>
+          </a:xfrm>
+          <a:prstGeom prst="bentConnector2">
+            <a:avLst/>
+          </a:prstGeom>
+          <a:ln>
+            <a:tailEnd type="triangle"/>
+          </a:ln>
+        </p:spPr>
+        <p:style>
+          <a:lnRef idx="1">
+            <a:schemeClr val="accent1"/>
+          </a:lnRef>
+          <a:fillRef idx="0">
+            <a:schemeClr val="accent1"/>
+          </a:fillRef>
+          <a:effectRef idx="0">
+            <a:schemeClr val="accent1"/>
+          </a:effectRef>
+          <a:fontRef idx="minor">
+            <a:schemeClr val="tx1"/>
+          </a:fontRef>
+        </p:style>
+      </p:cxnSp>
+      <p:sp>
+        <p:nvSpPr>
+          <p:cNvPr id="6" name="Rectángulo redondeado 5"/>
+          <p:cNvSpPr/>
+          <p:nvPr/>
+        </p:nvSpPr>
+        <p:spPr>
+          <a:xfrm>
+            <a:off x="3146425" y="1720850"/>
+            <a:ext cx="1244600" cy="635000"/>
+          </a:xfrm>
+          <a:prstGeom prst="roundRect">
+            <a:avLst/>
+          </a:prstGeom>
+          <a:ln/>
+        </p:spPr>
+        <p:style>
+          <a:lnRef idx="0">
+            <a:schemeClr val="accent5"/>
+          </a:lnRef>
+          <a:fillRef idx="3">
+            <a:schemeClr val="accent5"/>
+          </a:fillRef>
+          <a:effectRef idx="3">
+            <a:schemeClr val="accent5"/>
+          </a:effectRef>
+          <a:fontRef idx="minor">
+            <a:schemeClr val="lt1"/>
+          </a:fontRef>
+        </p:style>
+        <p:txBody>
+          <a:bodyPr rtlCol="0" anchor="ctr"/>
+          <a:lstStyle/>
+          <a:p>
+            <a:pPr algn="ctr"/>
+            <a:r>
+              <a:rPr lang="es-HN" dirty="0" smtClean="0"/>
+              <a:t>CAMPO 1</a:t>
+            </a:r>
+            <a:endParaRPr lang="es-HN" dirty="0"/>
+          </a:p>
+        </p:txBody>
+      </p:sp>
+      <p:sp>
+        <p:nvSpPr>
+          <p:cNvPr id="15" name="Rectángulo redondeado 14"/>
+          <p:cNvSpPr/>
+          <p:nvPr/>
+        </p:nvSpPr>
+        <p:spPr>
+          <a:xfrm>
+            <a:off x="4787900" y="1720850"/>
+            <a:ext cx="1244600" cy="635000"/>
+          </a:xfrm>
+          <a:prstGeom prst="roundRect">
+            <a:avLst/>
+          </a:prstGeom>
+          <a:ln/>
+        </p:spPr>
+        <p:style>
+          <a:lnRef idx="0">
+            <a:schemeClr val="accent5"/>
+          </a:lnRef>
+          <a:fillRef idx="3">
+            <a:schemeClr val="accent5"/>
+          </a:fillRef>
+          <a:effectRef idx="3">
+            <a:schemeClr val="accent5"/>
+          </a:effectRef>
+          <a:fontRef idx="minor">
+            <a:schemeClr val="lt1"/>
+          </a:fontRef>
+        </p:style>
+        <p:txBody>
+          <a:bodyPr rtlCol="0" anchor="ctr"/>
+          <a:lstStyle/>
+          <a:p>
+            <a:pPr algn="ctr"/>
+            <a:r>
+              <a:rPr lang="es-HN" dirty="0" smtClean="0"/>
+              <a:t>CAMPO 2</a:t>
+            </a:r>
+            <a:endParaRPr lang="es-HN" dirty="0"/>
+          </a:p>
+        </p:txBody>
+      </p:sp>
+      <p:sp>
+        <p:nvSpPr>
+          <p:cNvPr id="16" name="Rectángulo redondeado 15"/>
+          <p:cNvSpPr/>
+          <p:nvPr/>
+        </p:nvSpPr>
+        <p:spPr>
+          <a:xfrm>
+            <a:off x="6429375" y="1720850"/>
+            <a:ext cx="1244600" cy="635000"/>
+          </a:xfrm>
+          <a:prstGeom prst="roundRect">
+            <a:avLst/>
+          </a:prstGeom>
+          <a:ln/>
+        </p:spPr>
+        <p:style>
+          <a:lnRef idx="0">
+            <a:schemeClr val="accent5"/>
+          </a:lnRef>
+          <a:fillRef idx="3">
+            <a:schemeClr val="accent5"/>
+          </a:fillRef>
+          <a:effectRef idx="3">
+            <a:schemeClr val="accent5"/>
+          </a:effectRef>
+          <a:fontRef idx="minor">
+            <a:schemeClr val="lt1"/>
+          </a:fontRef>
+        </p:style>
+        <p:txBody>
+          <a:bodyPr rtlCol="0" anchor="ctr"/>
+          <a:lstStyle/>
+          <a:p>
+            <a:pPr algn="ctr"/>
+            <a:r>
+              <a:rPr lang="es-HN" dirty="0" smtClean="0"/>
+              <a:t>CAMPO 3</a:t>
+            </a:r>
+          </a:p>
+        </p:txBody>
+      </p:sp>
+      <p:cxnSp>
+        <p:nvCxnSpPr>
+          <p:cNvPr id="18" name="Conector recto de flecha 17"/>
+          <p:cNvCxnSpPr>
+            <a:stCxn id="6" idx="3"/>
+            <a:endCxn id="15" idx="1"/>
+          </p:cNvCxnSpPr>
+          <p:nvPr/>
+        </p:nvCxnSpPr>
+        <p:spPr>
+          <a:xfrm>
+            <a:off x="4391025" y="2038350"/>
+            <a:ext cx="396875" cy="0"/>
+          </a:xfrm>
+          <a:prstGeom prst="straightConnector1">
+            <a:avLst/>
+          </a:prstGeom>
+          <a:ln>
+            <a:tailEnd type="triangle"/>
+          </a:ln>
+        </p:spPr>
+        <p:style>
+          <a:lnRef idx="1">
+            <a:schemeClr val="accent1"/>
+          </a:lnRef>
+          <a:fillRef idx="0">
+            <a:schemeClr val="accent1"/>
+          </a:fillRef>
+          <a:effectRef idx="0">
+            <a:schemeClr val="accent1"/>
+          </a:effectRef>
+          <a:fontRef idx="minor">
+            <a:schemeClr val="tx1"/>
+          </a:fontRef>
+        </p:style>
+      </p:cxnSp>
+      <p:cxnSp>
+        <p:nvCxnSpPr>
+          <p:cNvPr id="27" name="Conector recto de flecha 26"/>
+          <p:cNvCxnSpPr/>
+          <p:nvPr/>
+        </p:nvCxnSpPr>
+        <p:spPr>
+          <a:xfrm>
+            <a:off x="6032500" y="2038350"/>
+            <a:ext cx="396875" cy="0"/>
+          </a:xfrm>
+          <a:prstGeom prst="straightConnector1">
+            <a:avLst/>
+          </a:prstGeom>
+          <a:ln>
+            <a:tailEnd type="triangle"/>
+          </a:ln>
+        </p:spPr>
+        <p:style>
+          <a:lnRef idx="1">
+            <a:schemeClr val="accent1"/>
+          </a:lnRef>
+          <a:fillRef idx="0">
+            <a:schemeClr val="accent1"/>
+          </a:fillRef>
+          <a:effectRef idx="0">
+            <a:schemeClr val="accent1"/>
+          </a:effectRef>
+          <a:fontRef idx="minor">
+            <a:schemeClr val="tx1"/>
+          </a:fontRef>
+        </p:style>
+      </p:cxnSp>
+      <p:cxnSp>
+        <p:nvCxnSpPr>
+          <p:cNvPr id="37" name="Conector recto de flecha 36"/>
+          <p:cNvCxnSpPr/>
+          <p:nvPr/>
+        </p:nvCxnSpPr>
+        <p:spPr>
+          <a:xfrm>
+            <a:off x="7673975" y="2057400"/>
+            <a:ext cx="542925" cy="25400"/>
+          </a:xfrm>
+          <a:prstGeom prst="straightConnector1">
+            <a:avLst/>
+          </a:prstGeom>
+          <a:ln>
+            <a:tailEnd type="triangle"/>
+          </a:ln>
+        </p:spPr>
+        <p:style>
+          <a:lnRef idx="1">
+            <a:schemeClr val="accent1"/>
+          </a:lnRef>
+          <a:fillRef idx="0">
+            <a:schemeClr val="accent1"/>
+          </a:fillRef>
+          <a:effectRef idx="0">
+            <a:schemeClr val="accent1"/>
+          </a:effectRef>
+          <a:fontRef idx="minor">
+            <a:schemeClr val="tx1"/>
+          </a:fontRef>
+        </p:style>
+      </p:cxnSp>
+      <p:sp>
+        <p:nvSpPr>
+          <p:cNvPr id="64" name="CuadroTexto 63"/>
+          <p:cNvSpPr txBox="1"/>
+          <p:nvPr/>
+        </p:nvSpPr>
+        <p:spPr>
+          <a:xfrm>
+            <a:off x="3340100" y="2501384"/>
+            <a:ext cx="1346200" cy="369332"/>
+          </a:xfrm>
+          <a:prstGeom prst="rect">
+            <a:avLst/>
+          </a:prstGeom>
+          <a:noFill/>
+        </p:spPr>
+        <p:txBody>
+          <a:bodyPr wrap="square" rtlCol="0">
+            <a:spAutoFit/>
+          </a:bodyPr>
+          <a:lstStyle/>
+          <a:p>
+            <a:r>
+              <a:rPr lang="es-HN" dirty="0" smtClean="0"/>
+              <a:t>REGISTRO 1</a:t>
+            </a:r>
+            <a:endParaRPr lang="es-HN" dirty="0"/>
+          </a:p>
+        </p:txBody>
+      </p:sp>
+      <p:sp>
+        <p:nvSpPr>
+          <p:cNvPr id="65" name="CuadroTexto 64"/>
+          <p:cNvSpPr txBox="1"/>
+          <p:nvPr/>
+        </p:nvSpPr>
+        <p:spPr>
+          <a:xfrm>
+            <a:off x="3486150" y="4015343"/>
+            <a:ext cx="1346200" cy="369332"/>
+          </a:xfrm>
+          <a:prstGeom prst="rect">
+            <a:avLst/>
+          </a:prstGeom>
+          <a:noFill/>
+        </p:spPr>
+        <p:txBody>
+          <a:bodyPr wrap="square" rtlCol="0">
+            <a:spAutoFit/>
+          </a:bodyPr>
+          <a:lstStyle/>
+          <a:p>
+            <a:r>
+              <a:rPr lang="es-HN" dirty="0" smtClean="0"/>
+              <a:t>REGISTRO 2</a:t>
+            </a:r>
+            <a:endParaRPr lang="es-HN" dirty="0"/>
+          </a:p>
+        </p:txBody>
+      </p:sp>
     </p:spTree>
     <p:extLst>
       <p:ext uri="{BB962C8B-B14F-4D97-AF65-F5344CB8AC3E}">

</xml_diff>

<commit_message>
delimitador y tamaño fijo
</commit_message>
<xml_diff>
--- a/Proyecto/diseñoTCR.pptx
+++ b/Proyecto/diseñoTCR.pptx
@@ -6,6 +6,7 @@
   </p:sldMasterIdLst>
   <p:sldIdLst>
     <p:sldId id="256" r:id="rId2"/>
+    <p:sldId id="257" r:id="rId3"/>
   </p:sldIdLst>
   <p:sldSz cx="12192000" cy="6858000"/>
   <p:notesSz cx="6858000" cy="9144000"/>
@@ -243,7 +244,7 @@
           <a:p>
             <a:fld id="{2ED90B40-CE33-4CFC-B1B9-E881A0D2F4CD}" type="datetimeFigureOut">
               <a:rPr lang="es-HN" smtClean="0"/>
-              <a:t>30/10/2016</a:t>
+              <a:t>5/11/2016</a:t>
             </a:fld>
             <a:endParaRPr lang="es-HN"/>
           </a:p>
@@ -413,7 +414,7 @@
           <a:p>
             <a:fld id="{2ED90B40-CE33-4CFC-B1B9-E881A0D2F4CD}" type="datetimeFigureOut">
               <a:rPr lang="es-HN" smtClean="0"/>
-              <a:t>30/10/2016</a:t>
+              <a:t>5/11/2016</a:t>
             </a:fld>
             <a:endParaRPr lang="es-HN"/>
           </a:p>
@@ -593,7 +594,7 @@
           <a:p>
             <a:fld id="{2ED90B40-CE33-4CFC-B1B9-E881A0D2F4CD}" type="datetimeFigureOut">
               <a:rPr lang="es-HN" smtClean="0"/>
-              <a:t>30/10/2016</a:t>
+              <a:t>5/11/2016</a:t>
             </a:fld>
             <a:endParaRPr lang="es-HN"/>
           </a:p>
@@ -763,7 +764,7 @@
           <a:p>
             <a:fld id="{2ED90B40-CE33-4CFC-B1B9-E881A0D2F4CD}" type="datetimeFigureOut">
               <a:rPr lang="es-HN" smtClean="0"/>
-              <a:t>30/10/2016</a:t>
+              <a:t>5/11/2016</a:t>
             </a:fld>
             <a:endParaRPr lang="es-HN"/>
           </a:p>
@@ -1009,7 +1010,7 @@
           <a:p>
             <a:fld id="{2ED90B40-CE33-4CFC-B1B9-E881A0D2F4CD}" type="datetimeFigureOut">
               <a:rPr lang="es-HN" smtClean="0"/>
-              <a:t>30/10/2016</a:t>
+              <a:t>5/11/2016</a:t>
             </a:fld>
             <a:endParaRPr lang="es-HN"/>
           </a:p>
@@ -1241,7 +1242,7 @@
           <a:p>
             <a:fld id="{2ED90B40-CE33-4CFC-B1B9-E881A0D2F4CD}" type="datetimeFigureOut">
               <a:rPr lang="es-HN" smtClean="0"/>
-              <a:t>30/10/2016</a:t>
+              <a:t>5/11/2016</a:t>
             </a:fld>
             <a:endParaRPr lang="es-HN"/>
           </a:p>
@@ -1608,7 +1609,7 @@
           <a:p>
             <a:fld id="{2ED90B40-CE33-4CFC-B1B9-E881A0D2F4CD}" type="datetimeFigureOut">
               <a:rPr lang="es-HN" smtClean="0"/>
-              <a:t>30/10/2016</a:t>
+              <a:t>5/11/2016</a:t>
             </a:fld>
             <a:endParaRPr lang="es-HN"/>
           </a:p>
@@ -1726,7 +1727,7 @@
           <a:p>
             <a:fld id="{2ED90B40-CE33-4CFC-B1B9-E881A0D2F4CD}" type="datetimeFigureOut">
               <a:rPr lang="es-HN" smtClean="0"/>
-              <a:t>30/10/2016</a:t>
+              <a:t>5/11/2016</a:t>
             </a:fld>
             <a:endParaRPr lang="es-HN"/>
           </a:p>
@@ -1821,7 +1822,7 @@
           <a:p>
             <a:fld id="{2ED90B40-CE33-4CFC-B1B9-E881A0D2F4CD}" type="datetimeFigureOut">
               <a:rPr lang="es-HN" smtClean="0"/>
-              <a:t>30/10/2016</a:t>
+              <a:t>5/11/2016</a:t>
             </a:fld>
             <a:endParaRPr lang="es-HN"/>
           </a:p>
@@ -2098,7 +2099,7 @@
           <a:p>
             <a:fld id="{2ED90B40-CE33-4CFC-B1B9-E881A0D2F4CD}" type="datetimeFigureOut">
               <a:rPr lang="es-HN" smtClean="0"/>
-              <a:t>30/10/2016</a:t>
+              <a:t>5/11/2016</a:t>
             </a:fld>
             <a:endParaRPr lang="es-HN"/>
           </a:p>
@@ -2351,7 +2352,7 @@
           <a:p>
             <a:fld id="{2ED90B40-CE33-4CFC-B1B9-E881A0D2F4CD}" type="datetimeFigureOut">
               <a:rPr lang="es-HN" smtClean="0"/>
-              <a:t>30/10/2016</a:t>
+              <a:t>5/11/2016</a:t>
             </a:fld>
             <a:endParaRPr lang="es-HN"/>
           </a:p>
@@ -2564,7 +2565,7 @@
           <a:p>
             <a:fld id="{2ED90B40-CE33-4CFC-B1B9-E881A0D2F4CD}" type="datetimeFigureOut">
               <a:rPr lang="es-HN" smtClean="0"/>
-              <a:t>30/10/2016</a:t>
+              <a:t>5/11/2016</a:t>
             </a:fld>
             <a:endParaRPr lang="es-HN"/>
           </a:p>
@@ -2977,7 +2978,7 @@
         </p:nvSpPr>
         <p:spPr>
           <a:xfrm>
-            <a:off x="1714500" y="254000"/>
+            <a:off x="2171700" y="901700"/>
             <a:ext cx="2222500" cy="1282700"/>
           </a:xfrm>
           <a:prstGeom prst="rect">
@@ -3016,7 +3017,7 @@
         </p:nvSpPr>
         <p:spPr>
           <a:xfrm>
-            <a:off x="1714500" y="1536700"/>
+            <a:off x="2171700" y="2184400"/>
             <a:ext cx="8013700" cy="4470400"/>
           </a:xfrm>
           <a:prstGeom prst="rect">
@@ -3055,7 +3056,7 @@
         </p:nvSpPr>
         <p:spPr>
           <a:xfrm>
-            <a:off x="2108200" y="444500"/>
+            <a:off x="2565400" y="1092200"/>
             <a:ext cx="1333500" cy="800100"/>
           </a:xfrm>
           <a:prstGeom prst="rect">
@@ -3100,7 +3101,7 @@
         </p:nvSpPr>
         <p:spPr>
           <a:xfrm>
-            <a:off x="4127500" y="444500"/>
+            <a:off x="4584700" y="1092200"/>
             <a:ext cx="1333500" cy="800100"/>
           </a:xfrm>
           <a:prstGeom prst="rect">
@@ -3143,7 +3144,7 @@
         </p:nvSpPr>
         <p:spPr>
           <a:xfrm>
-            <a:off x="6032500" y="444500"/>
+            <a:off x="6489700" y="1092200"/>
             <a:ext cx="1333500" cy="800100"/>
           </a:xfrm>
           <a:prstGeom prst="rect">
@@ -3189,7 +3190,7 @@
         </p:nvCxnSpPr>
         <p:spPr>
           <a:xfrm>
-            <a:off x="3441700" y="844550"/>
+            <a:off x="3898900" y="1492250"/>
             <a:ext cx="685800" cy="0"/>
           </a:xfrm>
           <a:prstGeom prst="straightConnector1">
@@ -3222,7 +3223,7 @@
         </p:nvCxnSpPr>
         <p:spPr>
           <a:xfrm>
-            <a:off x="5346700" y="844550"/>
+            <a:off x="5803900" y="1492250"/>
             <a:ext cx="685800" cy="0"/>
           </a:xfrm>
           <a:prstGeom prst="straightConnector1">
@@ -3255,7 +3256,7 @@
         </p:nvCxnSpPr>
         <p:spPr>
           <a:xfrm>
-            <a:off x="7251700" y="844550"/>
+            <a:off x="7708900" y="1492250"/>
             <a:ext cx="685800" cy="0"/>
           </a:xfrm>
           <a:prstGeom prst="straightConnector1">
@@ -3290,7 +3291,7 @@
         </p:nvCxnSpPr>
         <p:spPr>
           <a:xfrm rot="16200000" flipH="1">
-            <a:off x="2049460" y="1960562"/>
+            <a:off x="2506660" y="2608262"/>
             <a:ext cx="1828804" cy="396876"/>
           </a:xfrm>
           <a:prstGeom prst="bentConnector2">
@@ -3323,7 +3324,7 @@
         </p:nvSpPr>
         <p:spPr>
           <a:xfrm>
-            <a:off x="3162300" y="2501903"/>
+            <a:off x="3619500" y="3149603"/>
             <a:ext cx="5765800" cy="1142997"/>
           </a:xfrm>
           <a:prstGeom prst="roundRect">
@@ -3362,7 +3363,7 @@
         </p:nvSpPr>
         <p:spPr>
           <a:xfrm>
-            <a:off x="3441700" y="2832100"/>
+            <a:off x="3898900" y="3479800"/>
             <a:ext cx="1244600" cy="635000"/>
           </a:xfrm>
           <a:prstGeom prst="roundRect">
@@ -3404,7 +3405,7 @@
         </p:nvSpPr>
         <p:spPr>
           <a:xfrm>
-            <a:off x="5118100" y="2832100"/>
+            <a:off x="5575300" y="3479800"/>
             <a:ext cx="1244600" cy="635000"/>
           </a:xfrm>
           <a:prstGeom prst="roundRect">
@@ -3446,7 +3447,7 @@
         </p:nvSpPr>
         <p:spPr>
           <a:xfrm>
-            <a:off x="6794500" y="2832100"/>
+            <a:off x="7251700" y="3479800"/>
             <a:ext cx="1244600" cy="635000"/>
           </a:xfrm>
           <a:prstGeom prst="roundRect">
@@ -3490,7 +3491,7 @@
         </p:nvCxnSpPr>
         <p:spPr>
           <a:xfrm>
-            <a:off x="4686300" y="3124200"/>
+            <a:off x="5143500" y="3771900"/>
             <a:ext cx="431800" cy="25400"/>
           </a:xfrm>
           <a:prstGeom prst="straightConnector1">
@@ -3523,7 +3524,7 @@
         </p:nvCxnSpPr>
         <p:spPr>
           <a:xfrm>
-            <a:off x="6356350" y="3149600"/>
+            <a:off x="6813550" y="3797300"/>
             <a:ext cx="431800" cy="25400"/>
           </a:xfrm>
           <a:prstGeom prst="straightConnector1">
@@ -3556,7 +3557,7 @@
         </p:nvCxnSpPr>
         <p:spPr>
           <a:xfrm>
-            <a:off x="8051800" y="3098800"/>
+            <a:off x="8509000" y="3746500"/>
             <a:ext cx="431800" cy="25400"/>
           </a:xfrm>
           <a:prstGeom prst="straightConnector1">
@@ -3591,7 +3592,7 @@
         </p:nvCxnSpPr>
         <p:spPr>
           <a:xfrm>
-            <a:off x="6045200" y="3644900"/>
+            <a:off x="6502400" y="4292600"/>
             <a:ext cx="0" cy="596897"/>
           </a:xfrm>
           <a:prstGeom prst="straightConnector1">
@@ -3624,7 +3625,7 @@
         </p:nvSpPr>
         <p:spPr>
           <a:xfrm>
-            <a:off x="3162300" y="4038605"/>
+            <a:off x="3619500" y="4686305"/>
             <a:ext cx="5765800" cy="1212844"/>
           </a:xfrm>
           <a:prstGeom prst="roundRect">
@@ -3663,7 +3664,7 @@
         </p:nvSpPr>
         <p:spPr>
           <a:xfrm>
-            <a:off x="3441700" y="4438649"/>
+            <a:off x="3898900" y="5086349"/>
             <a:ext cx="1244600" cy="635000"/>
           </a:xfrm>
           <a:prstGeom prst="roundRect">
@@ -3705,7 +3706,7 @@
         </p:nvSpPr>
         <p:spPr>
           <a:xfrm>
-            <a:off x="5118100" y="4438649"/>
+            <a:off x="5575300" y="5086349"/>
             <a:ext cx="1244600" cy="635000"/>
           </a:xfrm>
           <a:prstGeom prst="roundRect">
@@ -3747,7 +3748,7 @@
         </p:nvSpPr>
         <p:spPr>
           <a:xfrm>
-            <a:off x="6794500" y="4438649"/>
+            <a:off x="7251700" y="5086349"/>
             <a:ext cx="1244600" cy="635000"/>
           </a:xfrm>
           <a:prstGeom prst="roundRect">
@@ -3791,7 +3792,7 @@
         </p:nvCxnSpPr>
         <p:spPr>
           <a:xfrm>
-            <a:off x="4686300" y="4730749"/>
+            <a:off x="5143500" y="5378449"/>
             <a:ext cx="431800" cy="25400"/>
           </a:xfrm>
           <a:prstGeom prst="straightConnector1">
@@ -3824,7 +3825,7 @@
         </p:nvCxnSpPr>
         <p:spPr>
           <a:xfrm>
-            <a:off x="6356350" y="4756149"/>
+            <a:off x="6813550" y="5403849"/>
             <a:ext cx="431800" cy="25400"/>
           </a:xfrm>
           <a:prstGeom prst="straightConnector1">
@@ -3857,7 +3858,7 @@
         </p:nvCxnSpPr>
         <p:spPr>
           <a:xfrm>
-            <a:off x="8051800" y="4705349"/>
+            <a:off x="8509000" y="5353049"/>
             <a:ext cx="431800" cy="25400"/>
           </a:xfrm>
           <a:prstGeom prst="straightConnector1">
@@ -3893,7 +3894,7 @@
         </p:nvCxnSpPr>
         <p:spPr>
           <a:xfrm rot="16200000" flipH="1">
-            <a:off x="2563812" y="1455737"/>
+            <a:off x="3021012" y="2103437"/>
             <a:ext cx="793750" cy="371475"/>
           </a:xfrm>
           <a:prstGeom prst="bentConnector2">
@@ -3926,7 +3927,7 @@
         </p:nvSpPr>
         <p:spPr>
           <a:xfrm>
-            <a:off x="3146425" y="1720850"/>
+            <a:off x="3603625" y="2368550"/>
             <a:ext cx="1244600" cy="635000"/>
           </a:xfrm>
           <a:prstGeom prst="roundRect">
@@ -3969,7 +3970,7 @@
         </p:nvSpPr>
         <p:spPr>
           <a:xfrm>
-            <a:off x="4787900" y="1720850"/>
+            <a:off x="5245100" y="2368550"/>
             <a:ext cx="1244600" cy="635000"/>
           </a:xfrm>
           <a:prstGeom prst="roundRect">
@@ -4012,7 +4013,7 @@
         </p:nvSpPr>
         <p:spPr>
           <a:xfrm>
-            <a:off x="6429375" y="1720850"/>
+            <a:off x="6886575" y="2368550"/>
             <a:ext cx="1244600" cy="635000"/>
           </a:xfrm>
           <a:prstGeom prst="roundRect">
@@ -4057,7 +4058,7 @@
         </p:nvCxnSpPr>
         <p:spPr>
           <a:xfrm>
-            <a:off x="4391025" y="2038350"/>
+            <a:off x="4848225" y="2686050"/>
             <a:ext cx="396875" cy="0"/>
           </a:xfrm>
           <a:prstGeom prst="straightConnector1">
@@ -4090,7 +4091,7 @@
         </p:nvCxnSpPr>
         <p:spPr>
           <a:xfrm>
-            <a:off x="6032500" y="2038350"/>
+            <a:off x="6489700" y="2686050"/>
             <a:ext cx="396875" cy="0"/>
           </a:xfrm>
           <a:prstGeom prst="straightConnector1">
@@ -4123,7 +4124,7 @@
         </p:nvCxnSpPr>
         <p:spPr>
           <a:xfrm>
-            <a:off x="7673975" y="2057400"/>
+            <a:off x="8131175" y="2705100"/>
             <a:ext cx="542925" cy="25400"/>
           </a:xfrm>
           <a:prstGeom prst="straightConnector1">
@@ -4156,7 +4157,7 @@
         </p:nvSpPr>
         <p:spPr>
           <a:xfrm>
-            <a:off x="3340100" y="2501384"/>
+            <a:off x="3797300" y="3149084"/>
             <a:ext cx="1346200" cy="369332"/>
           </a:xfrm>
           <a:prstGeom prst="rect">
@@ -4186,7 +4187,7 @@
         </p:nvSpPr>
         <p:spPr>
           <a:xfrm>
-            <a:off x="3486150" y="4015343"/>
+            <a:off x="3943350" y="4663043"/>
             <a:ext cx="1346200" cy="369332"/>
           </a:xfrm>
           <a:prstGeom prst="rect">
@@ -4208,10 +4209,397 @@
           </a:p>
         </p:txBody>
       </p:sp>
+      <p:sp>
+        <p:nvSpPr>
+          <p:cNvPr id="2" name="CuadroTexto 1"/>
+          <p:cNvSpPr txBox="1"/>
+          <p:nvPr/>
+        </p:nvSpPr>
+        <p:spPr>
+          <a:xfrm>
+            <a:off x="4616450" y="217210"/>
+            <a:ext cx="3721100" cy="523220"/>
+          </a:xfrm>
+          <a:prstGeom prst="rect">
+            <a:avLst/>
+          </a:prstGeom>
+          <a:noFill/>
+        </p:spPr>
+        <p:txBody>
+          <a:bodyPr wrap="square" rtlCol="0">
+            <a:spAutoFit/>
+          </a:bodyPr>
+          <a:lstStyle/>
+          <a:p>
+            <a:r>
+              <a:rPr lang="es-HN" sz="2800" b="1" dirty="0" smtClean="0"/>
+              <a:t>EN MEMORIA</a:t>
+            </a:r>
+          </a:p>
+        </p:txBody>
+      </p:sp>
     </p:spTree>
     <p:extLst>
       <p:ext uri="{BB962C8B-B14F-4D97-AF65-F5344CB8AC3E}">
         <p14:creationId xmlns:p14="http://schemas.microsoft.com/office/powerpoint/2010/main" val="756830560"/>
+      </p:ext>
+    </p:extLst>
+  </p:cSld>
+  <p:clrMapOvr>
+    <a:masterClrMapping/>
+  </p:clrMapOvr>
+</p:sld>
+</file>
+
+<file path=ppt/slides/slide2.xml><?xml version="1.0" encoding="utf-8"?>
+<p:sld xmlns:a="http://schemas.openxmlformats.org/drawingml/2006/main" xmlns:r="http://schemas.openxmlformats.org/officeDocument/2006/relationships" xmlns:p="http://schemas.openxmlformats.org/presentationml/2006/main">
+  <p:cSld>
+    <p:spTree>
+      <p:nvGrpSpPr>
+        <p:cNvPr id="1" name=""/>
+        <p:cNvGrpSpPr/>
+        <p:nvPr/>
+      </p:nvGrpSpPr>
+      <p:grpSpPr>
+        <a:xfrm>
+          <a:off x="0" y="0"/>
+          <a:ext cx="0" cy="0"/>
+          <a:chOff x="0" y="0"/>
+          <a:chExt cx="0" cy="0"/>
+        </a:xfrm>
+      </p:grpSpPr>
+      <p:sp>
+        <p:nvSpPr>
+          <p:cNvPr id="2" name="Rectángulo 1"/>
+          <p:cNvSpPr/>
+          <p:nvPr/>
+        </p:nvSpPr>
+        <p:spPr>
+          <a:xfrm>
+            <a:off x="0" y="2603500"/>
+            <a:ext cx="12103100" cy="1485900"/>
+          </a:xfrm>
+          <a:prstGeom prst="rect">
+            <a:avLst/>
+          </a:prstGeom>
+          <a:ln>
+            <a:noFill/>
+          </a:ln>
+        </p:spPr>
+        <p:style>
+          <a:lnRef idx="1">
+            <a:schemeClr val="accent3"/>
+          </a:lnRef>
+          <a:fillRef idx="2">
+            <a:schemeClr val="accent3"/>
+          </a:fillRef>
+          <a:effectRef idx="1">
+            <a:schemeClr val="accent3"/>
+          </a:effectRef>
+          <a:fontRef idx="minor">
+            <a:schemeClr val="dk1"/>
+          </a:fontRef>
+        </p:style>
+        <p:txBody>
+          <a:bodyPr rtlCol="0" anchor="ctr"/>
+          <a:lstStyle/>
+          <a:p>
+            <a:pPr algn="ctr"/>
+            <a:endParaRPr lang="es-HN"/>
+          </a:p>
+        </p:txBody>
+      </p:sp>
+      <p:sp>
+        <p:nvSpPr>
+          <p:cNvPr id="3" name="Rectángulo 2"/>
+          <p:cNvSpPr/>
+          <p:nvPr/>
+        </p:nvSpPr>
+        <p:spPr>
+          <a:xfrm>
+            <a:off x="406400" y="2324100"/>
+            <a:ext cx="2273300" cy="2044700"/>
+          </a:xfrm>
+          <a:prstGeom prst="rect">
+            <a:avLst/>
+          </a:prstGeom>
+          <a:ln>
+            <a:solidFill>
+              <a:schemeClr val="tx1"/>
+            </a:solidFill>
+          </a:ln>
+        </p:spPr>
+        <p:style>
+          <a:lnRef idx="1">
+            <a:schemeClr val="accent2"/>
+          </a:lnRef>
+          <a:fillRef idx="3">
+            <a:schemeClr val="accent2"/>
+          </a:fillRef>
+          <a:effectRef idx="2">
+            <a:schemeClr val="accent2"/>
+          </a:effectRef>
+          <a:fontRef idx="minor">
+            <a:schemeClr val="lt1"/>
+          </a:fontRef>
+        </p:style>
+        <p:txBody>
+          <a:bodyPr rtlCol="0" anchor="ctr"/>
+          <a:lstStyle/>
+          <a:p>
+            <a:pPr algn="ctr"/>
+            <a:endParaRPr lang="es-HN"/>
+          </a:p>
+        </p:txBody>
+      </p:sp>
+      <p:sp>
+        <p:nvSpPr>
+          <p:cNvPr id="4" name="Rectángulo 3"/>
+          <p:cNvSpPr/>
+          <p:nvPr/>
+        </p:nvSpPr>
+        <p:spPr>
+          <a:xfrm>
+            <a:off x="2679700" y="2324100"/>
+            <a:ext cx="2273300" cy="2044700"/>
+          </a:xfrm>
+          <a:prstGeom prst="rect">
+            <a:avLst/>
+          </a:prstGeom>
+          <a:ln>
+            <a:solidFill>
+              <a:schemeClr val="tx1"/>
+            </a:solidFill>
+          </a:ln>
+        </p:spPr>
+        <p:style>
+          <a:lnRef idx="1">
+            <a:schemeClr val="accent2"/>
+          </a:lnRef>
+          <a:fillRef idx="3">
+            <a:schemeClr val="accent2"/>
+          </a:fillRef>
+          <a:effectRef idx="2">
+            <a:schemeClr val="accent2"/>
+          </a:effectRef>
+          <a:fontRef idx="minor">
+            <a:schemeClr val="lt1"/>
+          </a:fontRef>
+        </p:style>
+        <p:txBody>
+          <a:bodyPr rtlCol="0" anchor="ctr"/>
+          <a:lstStyle/>
+          <a:p>
+            <a:pPr algn="ctr"/>
+            <a:endParaRPr lang="es-HN"/>
+          </a:p>
+        </p:txBody>
+      </p:sp>
+      <p:sp>
+        <p:nvSpPr>
+          <p:cNvPr id="5" name="Rectángulo 4"/>
+          <p:cNvSpPr/>
+          <p:nvPr/>
+        </p:nvSpPr>
+        <p:spPr>
+          <a:xfrm>
+            <a:off x="4953000" y="2324100"/>
+            <a:ext cx="2273300" cy="2044700"/>
+          </a:xfrm>
+          <a:prstGeom prst="rect">
+            <a:avLst/>
+          </a:prstGeom>
+          <a:ln>
+            <a:solidFill>
+              <a:schemeClr val="tx1"/>
+            </a:solidFill>
+          </a:ln>
+        </p:spPr>
+        <p:style>
+          <a:lnRef idx="1">
+            <a:schemeClr val="accent2"/>
+          </a:lnRef>
+          <a:fillRef idx="3">
+            <a:schemeClr val="accent2"/>
+          </a:fillRef>
+          <a:effectRef idx="2">
+            <a:schemeClr val="accent2"/>
+          </a:effectRef>
+          <a:fontRef idx="minor">
+            <a:schemeClr val="lt1"/>
+          </a:fontRef>
+        </p:style>
+        <p:txBody>
+          <a:bodyPr rtlCol="0" anchor="ctr"/>
+          <a:lstStyle/>
+          <a:p>
+            <a:pPr algn="ctr"/>
+            <a:endParaRPr lang="es-HN"/>
+          </a:p>
+        </p:txBody>
+      </p:sp>
+      <p:sp>
+        <p:nvSpPr>
+          <p:cNvPr id="6" name="Rectángulo 5"/>
+          <p:cNvSpPr/>
+          <p:nvPr/>
+        </p:nvSpPr>
+        <p:spPr>
+          <a:xfrm>
+            <a:off x="7226300" y="2324100"/>
+            <a:ext cx="2273300" cy="2044700"/>
+          </a:xfrm>
+          <a:prstGeom prst="rect">
+            <a:avLst/>
+          </a:prstGeom>
+          <a:ln>
+            <a:solidFill>
+              <a:schemeClr val="tx1"/>
+            </a:solidFill>
+          </a:ln>
+        </p:spPr>
+        <p:style>
+          <a:lnRef idx="1">
+            <a:schemeClr val="accent2"/>
+          </a:lnRef>
+          <a:fillRef idx="3">
+            <a:schemeClr val="accent2"/>
+          </a:fillRef>
+          <a:effectRef idx="2">
+            <a:schemeClr val="accent2"/>
+          </a:effectRef>
+          <a:fontRef idx="minor">
+            <a:schemeClr val="lt1"/>
+          </a:fontRef>
+        </p:style>
+        <p:txBody>
+          <a:bodyPr rtlCol="0" anchor="ctr"/>
+          <a:lstStyle/>
+          <a:p>
+            <a:pPr algn="ctr"/>
+            <a:endParaRPr lang="es-HN"/>
+          </a:p>
+        </p:txBody>
+      </p:sp>
+      <p:sp>
+        <p:nvSpPr>
+          <p:cNvPr id="7" name="Rectángulo 6"/>
+          <p:cNvSpPr/>
+          <p:nvPr/>
+        </p:nvSpPr>
+        <p:spPr>
+          <a:xfrm>
+            <a:off x="9499600" y="2324100"/>
+            <a:ext cx="2273300" cy="2044700"/>
+          </a:xfrm>
+          <a:prstGeom prst="rect">
+            <a:avLst/>
+          </a:prstGeom>
+          <a:ln>
+            <a:solidFill>
+              <a:schemeClr val="tx1"/>
+            </a:solidFill>
+          </a:ln>
+        </p:spPr>
+        <p:style>
+          <a:lnRef idx="1">
+            <a:schemeClr val="accent2"/>
+          </a:lnRef>
+          <a:fillRef idx="3">
+            <a:schemeClr val="accent2"/>
+          </a:fillRef>
+          <a:effectRef idx="2">
+            <a:schemeClr val="accent2"/>
+          </a:effectRef>
+          <a:fontRef idx="minor">
+            <a:schemeClr val="lt1"/>
+          </a:fontRef>
+        </p:style>
+        <p:txBody>
+          <a:bodyPr rtlCol="0" anchor="ctr"/>
+          <a:lstStyle/>
+          <a:p>
+            <a:pPr algn="ctr"/>
+            <a:endParaRPr lang="es-HN"/>
+          </a:p>
+        </p:txBody>
+      </p:sp>
+      <p:sp>
+        <p:nvSpPr>
+          <p:cNvPr id="8" name="CuadroTexto 7"/>
+          <p:cNvSpPr txBox="1"/>
+          <p:nvPr/>
+        </p:nvSpPr>
+        <p:spPr>
+          <a:xfrm>
+            <a:off x="717550" y="3048000"/>
+            <a:ext cx="1778000" cy="461665"/>
+          </a:xfrm>
+          <a:prstGeom prst="rect">
+            <a:avLst/>
+          </a:prstGeom>
+          <a:noFill/>
+        </p:spPr>
+        <p:txBody>
+          <a:bodyPr wrap="square" rtlCol="0">
+            <a:spAutoFit/>
+          </a:bodyPr>
+          <a:lstStyle/>
+          <a:p>
+            <a:r>
+              <a:rPr lang="es-HN" sz="2400" b="1" dirty="0" smtClean="0"/>
+              <a:t>BLOQUE MD</a:t>
+            </a:r>
+          </a:p>
+        </p:txBody>
+      </p:sp>
+      <p:sp>
+        <p:nvSpPr>
+          <p:cNvPr id="11" name="Rectángulo 10"/>
+          <p:cNvSpPr/>
+          <p:nvPr/>
+        </p:nvSpPr>
+        <p:spPr>
+          <a:xfrm>
+            <a:off x="2679700" y="2324100"/>
+            <a:ext cx="2273300" cy="469900"/>
+          </a:xfrm>
+          <a:prstGeom prst="rect">
+            <a:avLst/>
+          </a:prstGeom>
+          <a:ln>
+            <a:solidFill>
+              <a:schemeClr val="tx1"/>
+            </a:solidFill>
+          </a:ln>
+        </p:spPr>
+        <p:style>
+          <a:lnRef idx="1">
+            <a:schemeClr val="accent5"/>
+          </a:lnRef>
+          <a:fillRef idx="3">
+            <a:schemeClr val="accent5"/>
+          </a:fillRef>
+          <a:effectRef idx="2">
+            <a:schemeClr val="accent5"/>
+          </a:effectRef>
+          <a:fontRef idx="minor">
+            <a:schemeClr val="lt1"/>
+          </a:fontRef>
+        </p:style>
+        <p:txBody>
+          <a:bodyPr rtlCol="0" anchor="ctr"/>
+          <a:lstStyle/>
+          <a:p>
+            <a:pPr algn="ctr"/>
+            <a:endParaRPr lang="es-HN"/>
+          </a:p>
+        </p:txBody>
+      </p:sp>
+    </p:spTree>
+    <p:extLst>
+      <p:ext uri="{BB962C8B-B14F-4D97-AF65-F5344CB8AC3E}">
+        <p14:creationId xmlns:p14="http://schemas.microsoft.com/office/powerpoint/2010/main" val="3938377580"/>
       </p:ext>
     </p:extLst>
   </p:cSld>

</xml_diff>

<commit_message>
entregable 2 listo en 60%
</commit_message>
<xml_diff>
--- a/Proyecto/diseñoTCR.pptx
+++ b/Proyecto/diseñoTCR.pptx
@@ -4,9 +4,13 @@
   <p:sldMasterIdLst>
     <p:sldMasterId id="2147483648" r:id="rId1"/>
   </p:sldMasterIdLst>
+  <p:notesMasterIdLst>
+    <p:notesMasterId r:id="rId5"/>
+  </p:notesMasterIdLst>
   <p:sldIdLst>
     <p:sldId id="256" r:id="rId2"/>
     <p:sldId id="257" r:id="rId3"/>
+    <p:sldId id="258" r:id="rId4"/>
   </p:sldIdLst>
   <p:sldSz cx="12192000" cy="6858000"/>
   <p:notesSz cx="6858000" cy="9144000"/>
@@ -113,6 +117,440 @@
 </p:presentation>
 </file>
 
+<file path=ppt/notesMasters/notesMaster1.xml><?xml version="1.0" encoding="utf-8"?>
+<p:notesMaster xmlns:a="http://schemas.openxmlformats.org/drawingml/2006/main" xmlns:r="http://schemas.openxmlformats.org/officeDocument/2006/relationships" xmlns:p="http://schemas.openxmlformats.org/presentationml/2006/main">
+  <p:cSld>
+    <p:bg>
+      <p:bgRef idx="1001">
+        <a:schemeClr val="bg1"/>
+      </p:bgRef>
+    </p:bg>
+    <p:spTree>
+      <p:nvGrpSpPr>
+        <p:cNvPr id="1" name=""/>
+        <p:cNvGrpSpPr/>
+        <p:nvPr/>
+      </p:nvGrpSpPr>
+      <p:grpSpPr>
+        <a:xfrm>
+          <a:off x="0" y="0"/>
+          <a:ext cx="0" cy="0"/>
+          <a:chOff x="0" y="0"/>
+          <a:chExt cx="0" cy="0"/>
+        </a:xfrm>
+      </p:grpSpPr>
+      <p:sp>
+        <p:nvSpPr>
+          <p:cNvPr id="2" name="Marcador de encabezado 1"/>
+          <p:cNvSpPr>
+            <a:spLocks noGrp="1"/>
+          </p:cNvSpPr>
+          <p:nvPr>
+            <p:ph type="hdr" sz="quarter"/>
+          </p:nvPr>
+        </p:nvSpPr>
+        <p:spPr>
+          <a:xfrm>
+            <a:off x="0" y="0"/>
+            <a:ext cx="2971800" cy="458788"/>
+          </a:xfrm>
+          <a:prstGeom prst="rect">
+            <a:avLst/>
+          </a:prstGeom>
+        </p:spPr>
+        <p:txBody>
+          <a:bodyPr vert="horz" lIns="91440" tIns="45720" rIns="91440" bIns="45720" rtlCol="0"/>
+          <a:lstStyle>
+            <a:lvl1pPr algn="l">
+              <a:defRPr sz="1200"/>
+            </a:lvl1pPr>
+          </a:lstStyle>
+          <a:p>
+            <a:endParaRPr lang="es-HN"/>
+          </a:p>
+        </p:txBody>
+      </p:sp>
+      <p:sp>
+        <p:nvSpPr>
+          <p:cNvPr id="3" name="Marcador de fecha 2"/>
+          <p:cNvSpPr>
+            <a:spLocks noGrp="1"/>
+          </p:cNvSpPr>
+          <p:nvPr>
+            <p:ph type="dt" idx="1"/>
+          </p:nvPr>
+        </p:nvSpPr>
+        <p:spPr>
+          <a:xfrm>
+            <a:off x="3884613" y="0"/>
+            <a:ext cx="2971800" cy="458788"/>
+          </a:xfrm>
+          <a:prstGeom prst="rect">
+            <a:avLst/>
+          </a:prstGeom>
+        </p:spPr>
+        <p:txBody>
+          <a:bodyPr vert="horz" lIns="91440" tIns="45720" rIns="91440" bIns="45720" rtlCol="0"/>
+          <a:lstStyle>
+            <a:lvl1pPr algn="r">
+              <a:defRPr sz="1200"/>
+            </a:lvl1pPr>
+          </a:lstStyle>
+          <a:p>
+            <a:fld id="{D6F9704E-C5AE-4A67-AC7D-20B7F7D1E958}" type="datetimeFigureOut">
+              <a:rPr lang="es-HN" smtClean="0"/>
+              <a:t>8/11/2016</a:t>
+            </a:fld>
+            <a:endParaRPr lang="es-HN"/>
+          </a:p>
+        </p:txBody>
+      </p:sp>
+      <p:sp>
+        <p:nvSpPr>
+          <p:cNvPr id="4" name="Marcador de imagen de diapositiva 3"/>
+          <p:cNvSpPr>
+            <a:spLocks noGrp="1" noRot="1" noChangeAspect="1"/>
+          </p:cNvSpPr>
+          <p:nvPr>
+            <p:ph type="sldImg" idx="2"/>
+          </p:nvPr>
+        </p:nvSpPr>
+        <p:spPr>
+          <a:xfrm>
+            <a:off x="685800" y="1143000"/>
+            <a:ext cx="5486400" cy="3086100"/>
+          </a:xfrm>
+          <a:prstGeom prst="rect">
+            <a:avLst/>
+          </a:prstGeom>
+          <a:noFill/>
+          <a:ln w="12700">
+            <a:solidFill>
+              <a:prstClr val="black"/>
+            </a:solidFill>
+          </a:ln>
+        </p:spPr>
+        <p:txBody>
+          <a:bodyPr vert="horz" lIns="91440" tIns="45720" rIns="91440" bIns="45720" rtlCol="0" anchor="ctr"/>
+          <a:lstStyle/>
+          <a:p>
+            <a:endParaRPr lang="es-HN"/>
+          </a:p>
+        </p:txBody>
+      </p:sp>
+      <p:sp>
+        <p:nvSpPr>
+          <p:cNvPr id="5" name="Marcador de notas 4"/>
+          <p:cNvSpPr>
+            <a:spLocks noGrp="1"/>
+          </p:cNvSpPr>
+          <p:nvPr>
+            <p:ph type="body" sz="quarter" idx="3"/>
+          </p:nvPr>
+        </p:nvSpPr>
+        <p:spPr>
+          <a:xfrm>
+            <a:off x="685800" y="4400550"/>
+            <a:ext cx="5486400" cy="3600450"/>
+          </a:xfrm>
+          <a:prstGeom prst="rect">
+            <a:avLst/>
+          </a:prstGeom>
+        </p:spPr>
+        <p:txBody>
+          <a:bodyPr vert="horz" lIns="91440" tIns="45720" rIns="91440" bIns="45720" rtlCol="0"/>
+          <a:lstStyle/>
+          <a:p>
+            <a:pPr lvl="0"/>
+            <a:r>
+              <a:rPr lang="es-ES" smtClean="0"/>
+              <a:t>Haga clic para modificar el estilo de texto del patrón</a:t>
+            </a:r>
+          </a:p>
+          <a:p>
+            <a:pPr lvl="1"/>
+            <a:r>
+              <a:rPr lang="es-ES" smtClean="0"/>
+              <a:t>Segundo nivel</a:t>
+            </a:r>
+          </a:p>
+          <a:p>
+            <a:pPr lvl="2"/>
+            <a:r>
+              <a:rPr lang="es-ES" smtClean="0"/>
+              <a:t>Tercer nivel</a:t>
+            </a:r>
+          </a:p>
+          <a:p>
+            <a:pPr lvl="3"/>
+            <a:r>
+              <a:rPr lang="es-ES" smtClean="0"/>
+              <a:t>Cuarto nivel</a:t>
+            </a:r>
+          </a:p>
+          <a:p>
+            <a:pPr lvl="4"/>
+            <a:r>
+              <a:rPr lang="es-ES" smtClean="0"/>
+              <a:t>Quinto nivel</a:t>
+            </a:r>
+            <a:endParaRPr lang="es-HN"/>
+          </a:p>
+        </p:txBody>
+      </p:sp>
+      <p:sp>
+        <p:nvSpPr>
+          <p:cNvPr id="6" name="Marcador de pie de página 5"/>
+          <p:cNvSpPr>
+            <a:spLocks noGrp="1"/>
+          </p:cNvSpPr>
+          <p:nvPr>
+            <p:ph type="ftr" sz="quarter" idx="4"/>
+          </p:nvPr>
+        </p:nvSpPr>
+        <p:spPr>
+          <a:xfrm>
+            <a:off x="0" y="8685213"/>
+            <a:ext cx="2971800" cy="458787"/>
+          </a:xfrm>
+          <a:prstGeom prst="rect">
+            <a:avLst/>
+          </a:prstGeom>
+        </p:spPr>
+        <p:txBody>
+          <a:bodyPr vert="horz" lIns="91440" tIns="45720" rIns="91440" bIns="45720" rtlCol="0" anchor="b"/>
+          <a:lstStyle>
+            <a:lvl1pPr algn="l">
+              <a:defRPr sz="1200"/>
+            </a:lvl1pPr>
+          </a:lstStyle>
+          <a:p>
+            <a:endParaRPr lang="es-HN"/>
+          </a:p>
+        </p:txBody>
+      </p:sp>
+      <p:sp>
+        <p:nvSpPr>
+          <p:cNvPr id="7" name="Marcador de número de diapositiva 6"/>
+          <p:cNvSpPr>
+            <a:spLocks noGrp="1"/>
+          </p:cNvSpPr>
+          <p:nvPr>
+            <p:ph type="sldNum" sz="quarter" idx="5"/>
+          </p:nvPr>
+        </p:nvSpPr>
+        <p:spPr>
+          <a:xfrm>
+            <a:off x="3884613" y="8685213"/>
+            <a:ext cx="2971800" cy="458787"/>
+          </a:xfrm>
+          <a:prstGeom prst="rect">
+            <a:avLst/>
+          </a:prstGeom>
+        </p:spPr>
+        <p:txBody>
+          <a:bodyPr vert="horz" lIns="91440" tIns="45720" rIns="91440" bIns="45720" rtlCol="0" anchor="b"/>
+          <a:lstStyle>
+            <a:lvl1pPr algn="r">
+              <a:defRPr sz="1200"/>
+            </a:lvl1pPr>
+          </a:lstStyle>
+          <a:p>
+            <a:fld id="{B97EBEAD-A151-4A05-A417-8B48A96E63F3}" type="slidenum">
+              <a:rPr lang="es-HN" smtClean="0"/>
+              <a:t>‹Nº›</a:t>
+            </a:fld>
+            <a:endParaRPr lang="es-HN"/>
+          </a:p>
+        </p:txBody>
+      </p:sp>
+    </p:spTree>
+    <p:extLst>
+      <p:ext uri="{BB962C8B-B14F-4D97-AF65-F5344CB8AC3E}">
+        <p14:creationId xmlns:p14="http://schemas.microsoft.com/office/powerpoint/2010/main" val="275194280"/>
+      </p:ext>
+    </p:extLst>
+  </p:cSld>
+  <p:clrMap bg1="lt1" tx1="dk1" bg2="lt2" tx2="dk2" accent1="accent1" accent2="accent2" accent3="accent3" accent4="accent4" accent5="accent5" accent6="accent6" hlink="hlink" folHlink="folHlink"/>
+  <p:notesStyle>
+    <a:lvl1pPr marL="0" algn="l" defTabSz="914400" rtl="0" eaLnBrk="1" latinLnBrk="0" hangingPunct="1">
+      <a:defRPr sz="1200" kern="1200">
+        <a:solidFill>
+          <a:schemeClr val="tx1"/>
+        </a:solidFill>
+        <a:latin typeface="+mn-lt"/>
+        <a:ea typeface="+mn-ea"/>
+        <a:cs typeface="+mn-cs"/>
+      </a:defRPr>
+    </a:lvl1pPr>
+    <a:lvl2pPr marL="457200" algn="l" defTabSz="914400" rtl="0" eaLnBrk="1" latinLnBrk="0" hangingPunct="1">
+      <a:defRPr sz="1200" kern="1200">
+        <a:solidFill>
+          <a:schemeClr val="tx1"/>
+        </a:solidFill>
+        <a:latin typeface="+mn-lt"/>
+        <a:ea typeface="+mn-ea"/>
+        <a:cs typeface="+mn-cs"/>
+      </a:defRPr>
+    </a:lvl2pPr>
+    <a:lvl3pPr marL="914400" algn="l" defTabSz="914400" rtl="0" eaLnBrk="1" latinLnBrk="0" hangingPunct="1">
+      <a:defRPr sz="1200" kern="1200">
+        <a:solidFill>
+          <a:schemeClr val="tx1"/>
+        </a:solidFill>
+        <a:latin typeface="+mn-lt"/>
+        <a:ea typeface="+mn-ea"/>
+        <a:cs typeface="+mn-cs"/>
+      </a:defRPr>
+    </a:lvl3pPr>
+    <a:lvl4pPr marL="1371600" algn="l" defTabSz="914400" rtl="0" eaLnBrk="1" latinLnBrk="0" hangingPunct="1">
+      <a:defRPr sz="1200" kern="1200">
+        <a:solidFill>
+          <a:schemeClr val="tx1"/>
+        </a:solidFill>
+        <a:latin typeface="+mn-lt"/>
+        <a:ea typeface="+mn-ea"/>
+        <a:cs typeface="+mn-cs"/>
+      </a:defRPr>
+    </a:lvl4pPr>
+    <a:lvl5pPr marL="1828800" algn="l" defTabSz="914400" rtl="0" eaLnBrk="1" latinLnBrk="0" hangingPunct="1">
+      <a:defRPr sz="1200" kern="1200">
+        <a:solidFill>
+          <a:schemeClr val="tx1"/>
+        </a:solidFill>
+        <a:latin typeface="+mn-lt"/>
+        <a:ea typeface="+mn-ea"/>
+        <a:cs typeface="+mn-cs"/>
+      </a:defRPr>
+    </a:lvl5pPr>
+    <a:lvl6pPr marL="2286000" algn="l" defTabSz="914400" rtl="0" eaLnBrk="1" latinLnBrk="0" hangingPunct="1">
+      <a:defRPr sz="1200" kern="1200">
+        <a:solidFill>
+          <a:schemeClr val="tx1"/>
+        </a:solidFill>
+        <a:latin typeface="+mn-lt"/>
+        <a:ea typeface="+mn-ea"/>
+        <a:cs typeface="+mn-cs"/>
+      </a:defRPr>
+    </a:lvl6pPr>
+    <a:lvl7pPr marL="2743200" algn="l" defTabSz="914400" rtl="0" eaLnBrk="1" latinLnBrk="0" hangingPunct="1">
+      <a:defRPr sz="1200" kern="1200">
+        <a:solidFill>
+          <a:schemeClr val="tx1"/>
+        </a:solidFill>
+        <a:latin typeface="+mn-lt"/>
+        <a:ea typeface="+mn-ea"/>
+        <a:cs typeface="+mn-cs"/>
+      </a:defRPr>
+    </a:lvl7pPr>
+    <a:lvl8pPr marL="3200400" algn="l" defTabSz="914400" rtl="0" eaLnBrk="1" latinLnBrk="0" hangingPunct="1">
+      <a:defRPr sz="1200" kern="1200">
+        <a:solidFill>
+          <a:schemeClr val="tx1"/>
+        </a:solidFill>
+        <a:latin typeface="+mn-lt"/>
+        <a:ea typeface="+mn-ea"/>
+        <a:cs typeface="+mn-cs"/>
+      </a:defRPr>
+    </a:lvl8pPr>
+    <a:lvl9pPr marL="3657600" algn="l" defTabSz="914400" rtl="0" eaLnBrk="1" latinLnBrk="0" hangingPunct="1">
+      <a:defRPr sz="1200" kern="1200">
+        <a:solidFill>
+          <a:schemeClr val="tx1"/>
+        </a:solidFill>
+        <a:latin typeface="+mn-lt"/>
+        <a:ea typeface="+mn-ea"/>
+        <a:cs typeface="+mn-cs"/>
+      </a:defRPr>
+    </a:lvl9pPr>
+  </p:notesStyle>
+</p:notesMaster>
+</file>
+
+<file path=ppt/notesSlides/notesSlide1.xml><?xml version="1.0" encoding="utf-8"?>
+<p:notes xmlns:a="http://schemas.openxmlformats.org/drawingml/2006/main" xmlns:r="http://schemas.openxmlformats.org/officeDocument/2006/relationships" xmlns:p="http://schemas.openxmlformats.org/presentationml/2006/main">
+  <p:cSld>
+    <p:spTree>
+      <p:nvGrpSpPr>
+        <p:cNvPr id="1" name=""/>
+        <p:cNvGrpSpPr/>
+        <p:nvPr/>
+      </p:nvGrpSpPr>
+      <p:grpSpPr>
+        <a:xfrm>
+          <a:off x="0" y="0"/>
+          <a:ext cx="0" cy="0"/>
+          <a:chOff x="0" y="0"/>
+          <a:chExt cx="0" cy="0"/>
+        </a:xfrm>
+      </p:grpSpPr>
+      <p:sp>
+        <p:nvSpPr>
+          <p:cNvPr id="2" name="Marcador de imagen de diapositiva 1"/>
+          <p:cNvSpPr>
+            <a:spLocks noGrp="1" noRot="1" noChangeAspect="1"/>
+          </p:cNvSpPr>
+          <p:nvPr>
+            <p:ph type="sldImg"/>
+          </p:nvPr>
+        </p:nvSpPr>
+        <p:spPr/>
+      </p:sp>
+      <p:sp>
+        <p:nvSpPr>
+          <p:cNvPr id="3" name="Marcador de notas 2"/>
+          <p:cNvSpPr>
+            <a:spLocks noGrp="1"/>
+          </p:cNvSpPr>
+          <p:nvPr>
+            <p:ph type="body" idx="1"/>
+          </p:nvPr>
+        </p:nvSpPr>
+        <p:spPr/>
+        <p:txBody>
+          <a:bodyPr/>
+          <a:lstStyle/>
+          <a:p>
+            <a:endParaRPr lang="es-HN" dirty="0"/>
+          </a:p>
+        </p:txBody>
+      </p:sp>
+      <p:sp>
+        <p:nvSpPr>
+          <p:cNvPr id="4" name="Marcador de número de diapositiva 3"/>
+          <p:cNvSpPr>
+            <a:spLocks noGrp="1"/>
+          </p:cNvSpPr>
+          <p:nvPr>
+            <p:ph type="sldNum" sz="quarter" idx="10"/>
+          </p:nvPr>
+        </p:nvSpPr>
+        <p:spPr/>
+        <p:txBody>
+          <a:bodyPr/>
+          <a:lstStyle/>
+          <a:p>
+            <a:fld id="{B97EBEAD-A151-4A05-A417-8B48A96E63F3}" type="slidenum">
+              <a:rPr lang="es-HN" smtClean="0"/>
+              <a:t>2</a:t>
+            </a:fld>
+            <a:endParaRPr lang="es-HN"/>
+          </a:p>
+        </p:txBody>
+      </p:sp>
+    </p:spTree>
+    <p:extLst>
+      <p:ext uri="{BB962C8B-B14F-4D97-AF65-F5344CB8AC3E}">
+        <p14:creationId xmlns:p14="http://schemas.microsoft.com/office/powerpoint/2010/main" val="4142091151"/>
+      </p:ext>
+    </p:extLst>
+  </p:cSld>
+  <p:clrMapOvr>
+    <a:masterClrMapping/>
+  </p:clrMapOvr>
+</p:notes>
+</file>
+
 <file path=ppt/slideLayouts/slideLayout1.xml><?xml version="1.0" encoding="utf-8"?>
 <p:sldLayout xmlns:a="http://schemas.openxmlformats.org/drawingml/2006/main" xmlns:r="http://schemas.openxmlformats.org/officeDocument/2006/relationships" xmlns:p="http://schemas.openxmlformats.org/presentationml/2006/main" type="title" preserve="1">
   <p:cSld name="Diapositiva de título">
@@ -244,7 +682,7 @@
           <a:p>
             <a:fld id="{2ED90B40-CE33-4CFC-B1B9-E881A0D2F4CD}" type="datetimeFigureOut">
               <a:rPr lang="es-HN" smtClean="0"/>
-              <a:t>5/11/2016</a:t>
+              <a:t>8/11/2016</a:t>
             </a:fld>
             <a:endParaRPr lang="es-HN"/>
           </a:p>
@@ -414,7 +852,7 @@
           <a:p>
             <a:fld id="{2ED90B40-CE33-4CFC-B1B9-E881A0D2F4CD}" type="datetimeFigureOut">
               <a:rPr lang="es-HN" smtClean="0"/>
-              <a:t>5/11/2016</a:t>
+              <a:t>8/11/2016</a:t>
             </a:fld>
             <a:endParaRPr lang="es-HN"/>
           </a:p>
@@ -594,7 +1032,7 @@
           <a:p>
             <a:fld id="{2ED90B40-CE33-4CFC-B1B9-E881A0D2F4CD}" type="datetimeFigureOut">
               <a:rPr lang="es-HN" smtClean="0"/>
-              <a:t>5/11/2016</a:t>
+              <a:t>8/11/2016</a:t>
             </a:fld>
             <a:endParaRPr lang="es-HN"/>
           </a:p>
@@ -764,7 +1202,7 @@
           <a:p>
             <a:fld id="{2ED90B40-CE33-4CFC-B1B9-E881A0D2F4CD}" type="datetimeFigureOut">
               <a:rPr lang="es-HN" smtClean="0"/>
-              <a:t>5/11/2016</a:t>
+              <a:t>8/11/2016</a:t>
             </a:fld>
             <a:endParaRPr lang="es-HN"/>
           </a:p>
@@ -1010,7 +1448,7 @@
           <a:p>
             <a:fld id="{2ED90B40-CE33-4CFC-B1B9-E881A0D2F4CD}" type="datetimeFigureOut">
               <a:rPr lang="es-HN" smtClean="0"/>
-              <a:t>5/11/2016</a:t>
+              <a:t>8/11/2016</a:t>
             </a:fld>
             <a:endParaRPr lang="es-HN"/>
           </a:p>
@@ -1242,7 +1680,7 @@
           <a:p>
             <a:fld id="{2ED90B40-CE33-4CFC-B1B9-E881A0D2F4CD}" type="datetimeFigureOut">
               <a:rPr lang="es-HN" smtClean="0"/>
-              <a:t>5/11/2016</a:t>
+              <a:t>8/11/2016</a:t>
             </a:fld>
             <a:endParaRPr lang="es-HN"/>
           </a:p>
@@ -1609,7 +2047,7 @@
           <a:p>
             <a:fld id="{2ED90B40-CE33-4CFC-B1B9-E881A0D2F4CD}" type="datetimeFigureOut">
               <a:rPr lang="es-HN" smtClean="0"/>
-              <a:t>5/11/2016</a:t>
+              <a:t>8/11/2016</a:t>
             </a:fld>
             <a:endParaRPr lang="es-HN"/>
           </a:p>
@@ -1727,7 +2165,7 @@
           <a:p>
             <a:fld id="{2ED90B40-CE33-4CFC-B1B9-E881A0D2F4CD}" type="datetimeFigureOut">
               <a:rPr lang="es-HN" smtClean="0"/>
-              <a:t>5/11/2016</a:t>
+              <a:t>8/11/2016</a:t>
             </a:fld>
             <a:endParaRPr lang="es-HN"/>
           </a:p>
@@ -1822,7 +2260,7 @@
           <a:p>
             <a:fld id="{2ED90B40-CE33-4CFC-B1B9-E881A0D2F4CD}" type="datetimeFigureOut">
               <a:rPr lang="es-HN" smtClean="0"/>
-              <a:t>5/11/2016</a:t>
+              <a:t>8/11/2016</a:t>
             </a:fld>
             <a:endParaRPr lang="es-HN"/>
           </a:p>
@@ -2099,7 +2537,7 @@
           <a:p>
             <a:fld id="{2ED90B40-CE33-4CFC-B1B9-E881A0D2F4CD}" type="datetimeFigureOut">
               <a:rPr lang="es-HN" smtClean="0"/>
-              <a:t>5/11/2016</a:t>
+              <a:t>8/11/2016</a:t>
             </a:fld>
             <a:endParaRPr lang="es-HN"/>
           </a:p>
@@ -2352,7 +2790,7 @@
           <a:p>
             <a:fld id="{2ED90B40-CE33-4CFC-B1B9-E881A0D2F4CD}" type="datetimeFigureOut">
               <a:rPr lang="es-HN" smtClean="0"/>
-              <a:t>5/11/2016</a:t>
+              <a:t>8/11/2016</a:t>
             </a:fld>
             <a:endParaRPr lang="es-HN"/>
           </a:p>
@@ -2565,7 +3003,7 @@
           <a:p>
             <a:fld id="{2ED90B40-CE33-4CFC-B1B9-E881A0D2F4CD}" type="datetimeFigureOut">
               <a:rPr lang="es-HN" smtClean="0"/>
-              <a:t>5/11/2016</a:t>
+              <a:t>8/11/2016</a:t>
             </a:fld>
             <a:endParaRPr lang="es-HN"/>
           </a:p>
@@ -4270,14 +4708,44 @@
       </p:grpSpPr>
       <p:sp>
         <p:nvSpPr>
-          <p:cNvPr id="2" name="Rectángulo 1"/>
+          <p:cNvPr id="9" name="CuadroTexto 8"/>
+          <p:cNvSpPr txBox="1"/>
+          <p:nvPr/>
+        </p:nvSpPr>
+        <p:spPr>
+          <a:xfrm>
+            <a:off x="0" y="-21511"/>
+            <a:ext cx="6225903" cy="830997"/>
+          </a:xfrm>
+          <a:prstGeom prst="rect">
+            <a:avLst/>
+          </a:prstGeom>
+          <a:noFill/>
+        </p:spPr>
+        <p:txBody>
+          <a:bodyPr wrap="square" rtlCol="0">
+            <a:spAutoFit/>
+          </a:bodyPr>
+          <a:lstStyle/>
+          <a:p>
+            <a:pPr algn="ctr"/>
+            <a:r>
+              <a:rPr lang="es-HN" sz="4800" dirty="0" smtClean="0"/>
+              <a:t>PARA EL ENTREGABLE 2</a:t>
+            </a:r>
+          </a:p>
+        </p:txBody>
+      </p:sp>
+      <p:sp>
+        <p:nvSpPr>
+          <p:cNvPr id="10" name="Rectángulo 9"/>
           <p:cNvSpPr/>
           <p:nvPr/>
         </p:nvSpPr>
         <p:spPr>
           <a:xfrm>
-            <a:off x="0" y="2603500"/>
-            <a:ext cx="12103100" cy="1485900"/>
+            <a:off x="3594100" y="711200"/>
+            <a:ext cx="8064500" cy="5168900"/>
           </a:xfrm>
           <a:prstGeom prst="rect">
             <a:avLst/>
@@ -4287,17 +4755,19 @@
           </a:ln>
         </p:spPr>
         <p:style>
-          <a:lnRef idx="1">
-            <a:schemeClr val="accent3"/>
+          <a:lnRef idx="2">
+            <a:schemeClr val="accent5">
+              <a:shade val="50000"/>
+            </a:schemeClr>
           </a:lnRef>
-          <a:fillRef idx="2">
-            <a:schemeClr val="accent3"/>
+          <a:fillRef idx="1">
+            <a:schemeClr val="accent5"/>
           </a:fillRef>
-          <a:effectRef idx="1">
-            <a:schemeClr val="accent3"/>
+          <a:effectRef idx="0">
+            <a:schemeClr val="accent5"/>
           </a:effectRef>
           <a:fontRef idx="minor">
-            <a:schemeClr val="dk1"/>
+            <a:schemeClr val="lt1"/>
           </a:fontRef>
         </p:style>
         <p:txBody>
@@ -4311,21 +4781,97 @@
       </p:sp>
       <p:sp>
         <p:nvSpPr>
-          <p:cNvPr id="3" name="Rectángulo 2"/>
+          <p:cNvPr id="12" name="CuadroTexto 11"/>
+          <p:cNvSpPr txBox="1"/>
+          <p:nvPr/>
+        </p:nvSpPr>
+        <p:spPr>
+          <a:xfrm>
+            <a:off x="3790950" y="711200"/>
+            <a:ext cx="3835400" cy="646331"/>
+          </a:xfrm>
+          <a:prstGeom prst="rect">
+            <a:avLst/>
+          </a:prstGeom>
+          <a:noFill/>
+        </p:spPr>
+        <p:txBody>
+          <a:bodyPr wrap="square" rtlCol="0">
+            <a:spAutoFit/>
+          </a:bodyPr>
+          <a:lstStyle/>
+          <a:p>
+            <a:r>
+              <a:rPr lang="es-HN" sz="3600" b="1" dirty="0" smtClean="0">
+                <a:solidFill>
+                  <a:schemeClr val="bg1"/>
+                </a:solidFill>
+              </a:rPr>
+              <a:t>BLOQUE</a:t>
+            </a:r>
+            <a:endParaRPr lang="es-HN" sz="3600" b="1" dirty="0">
+              <a:solidFill>
+                <a:schemeClr val="bg1"/>
+              </a:solidFill>
+            </a:endParaRPr>
+          </a:p>
+        </p:txBody>
+      </p:sp>
+      <p:sp>
+        <p:nvSpPr>
+          <p:cNvPr id="13" name="Rectángulo 12"/>
           <p:cNvSpPr/>
           <p:nvPr/>
         </p:nvSpPr>
         <p:spPr>
           <a:xfrm>
-            <a:off x="406400" y="2324100"/>
-            <a:ext cx="2273300" cy="2044700"/>
+            <a:off x="3594100" y="1357531"/>
+            <a:ext cx="8064500" cy="5335369"/>
           </a:xfrm>
           <a:prstGeom prst="rect">
             <a:avLst/>
           </a:prstGeom>
-          <a:ln>
+        </p:spPr>
+        <p:style>
+          <a:lnRef idx="1">
+            <a:schemeClr val="accent6"/>
+          </a:lnRef>
+          <a:fillRef idx="3">
+            <a:schemeClr val="accent6"/>
+          </a:fillRef>
+          <a:effectRef idx="2">
+            <a:schemeClr val="accent6"/>
+          </a:effectRef>
+          <a:fontRef idx="minor">
+            <a:schemeClr val="lt1"/>
+          </a:fontRef>
+        </p:style>
+        <p:txBody>
+          <a:bodyPr rtlCol="0" anchor="ctr"/>
+          <a:lstStyle/>
+          <a:p>
+            <a:pPr algn="ctr"/>
+            <a:endParaRPr lang="es-HN"/>
+          </a:p>
+        </p:txBody>
+      </p:sp>
+      <p:sp>
+        <p:nvSpPr>
+          <p:cNvPr id="14" name="Rectángulo 13"/>
+          <p:cNvSpPr/>
+          <p:nvPr/>
+        </p:nvSpPr>
+        <p:spPr>
+          <a:xfrm>
+            <a:off x="3594100" y="1357531"/>
+            <a:ext cx="2501900" cy="1245969"/>
+          </a:xfrm>
+          <a:prstGeom prst="rect">
+            <a:avLst/>
+          </a:prstGeom>
+          <a:ln w="57150">
             <a:solidFill>
-              <a:schemeClr val="tx1"/>
+              <a:srgbClr val="FF0000"/>
             </a:solidFill>
           </a:ln>
         </p:spPr>
@@ -4348,27 +4894,42 @@
           <a:lstStyle/>
           <a:p>
             <a:pPr algn="ctr"/>
-            <a:endParaRPr lang="es-HN"/>
-          </a:p>
-        </p:txBody>
-      </p:sp>
-      <p:sp>
-        <p:nvSpPr>
-          <p:cNvPr id="4" name="Rectángulo 3"/>
+            <a:r>
+              <a:rPr lang="es-HN" sz="2800" b="1" dirty="0" err="1" smtClean="0"/>
+              <a:t>Int</a:t>
+            </a:r>
+            <a:r>
+              <a:rPr lang="es-HN" sz="2800" b="1" dirty="0" smtClean="0"/>
+              <a:t> </a:t>
+            </a:r>
+          </a:p>
+          <a:p>
+            <a:pPr algn="ctr"/>
+            <a:r>
+              <a:rPr lang="es-HN" sz="2800" b="1" dirty="0" smtClean="0"/>
+              <a:t>anterior</a:t>
+            </a:r>
+            <a:endParaRPr lang="es-HN" sz="2800" b="1" dirty="0"/>
+          </a:p>
+        </p:txBody>
+      </p:sp>
+      <p:sp>
+        <p:nvSpPr>
+          <p:cNvPr id="15" name="Rectángulo 14"/>
           <p:cNvSpPr/>
           <p:nvPr/>
         </p:nvSpPr>
         <p:spPr>
           <a:xfrm>
-            <a:off x="2679700" y="2324100"/>
-            <a:ext cx="2273300" cy="2044700"/>
+            <a:off x="6096000" y="1357531"/>
+            <a:ext cx="3060700" cy="1245969"/>
           </a:xfrm>
           <a:prstGeom prst="rect">
             <a:avLst/>
           </a:prstGeom>
-          <a:ln>
+          <a:ln w="57150">
             <a:solidFill>
-              <a:schemeClr val="tx1"/>
+              <a:srgbClr val="FF0000"/>
             </a:solidFill>
           </a:ln>
         </p:spPr>
@@ -4391,27 +4952,46 @@
           <a:lstStyle/>
           <a:p>
             <a:pPr algn="ctr"/>
-            <a:endParaRPr lang="es-HN"/>
-          </a:p>
-        </p:txBody>
-      </p:sp>
-      <p:sp>
-        <p:nvSpPr>
-          <p:cNvPr id="5" name="Rectángulo 4"/>
+            <a:r>
+              <a:rPr lang="es-HN" sz="2800" b="1" dirty="0" err="1"/>
+              <a:t>Int</a:t>
+            </a:r>
+            <a:r>
+              <a:rPr lang="es-HN" sz="2800" b="1" dirty="0"/>
+              <a:t> </a:t>
+            </a:r>
+          </a:p>
+          <a:p>
+            <a:pPr algn="ctr"/>
+            <a:r>
+              <a:rPr lang="es-HN" sz="2800" b="1" dirty="0" smtClean="0"/>
+              <a:t>siguiente</a:t>
+            </a:r>
+            <a:endParaRPr lang="es-HN" sz="2800" b="1" dirty="0"/>
+          </a:p>
+          <a:p>
+            <a:pPr algn="ctr"/>
+            <a:endParaRPr lang="es-HN" dirty="0"/>
+          </a:p>
+        </p:txBody>
+      </p:sp>
+      <p:sp>
+        <p:nvSpPr>
+          <p:cNvPr id="16" name="Rectángulo 15"/>
           <p:cNvSpPr/>
           <p:nvPr/>
         </p:nvSpPr>
         <p:spPr>
           <a:xfrm>
-            <a:off x="4953000" y="2324100"/>
-            <a:ext cx="2273300" cy="2044700"/>
+            <a:off x="9156700" y="1357531"/>
+            <a:ext cx="2501900" cy="1245969"/>
           </a:xfrm>
           <a:prstGeom prst="rect">
             <a:avLst/>
           </a:prstGeom>
-          <a:ln>
+          <a:ln w="57150">
             <a:solidFill>
-              <a:schemeClr val="tx1"/>
+              <a:srgbClr val="FF0000"/>
             </a:solidFill>
           </a:ln>
         </p:spPr>
@@ -4434,39 +5014,68 @@
           <a:lstStyle/>
           <a:p>
             <a:pPr algn="ctr"/>
-            <a:endParaRPr lang="es-HN"/>
-          </a:p>
-        </p:txBody>
-      </p:sp>
-      <p:sp>
-        <p:nvSpPr>
-          <p:cNvPr id="6" name="Rectángulo 5"/>
+            <a:r>
+              <a:rPr lang="es-HN" sz="2000" b="1" dirty="0" err="1"/>
+              <a:t>Int</a:t>
+            </a:r>
+            <a:r>
+              <a:rPr lang="es-HN" sz="2000" b="1" dirty="0"/>
+              <a:t> </a:t>
+            </a:r>
+          </a:p>
+          <a:p>
+            <a:pPr algn="ctr"/>
+            <a:r>
+              <a:rPr lang="es-HN" sz="2000" b="1" dirty="0" smtClean="0"/>
+              <a:t>Cantidad de Tablas</a:t>
+            </a:r>
+            <a:endParaRPr lang="es-HN" sz="2000" b="1" dirty="0"/>
+          </a:p>
+          <a:p>
+            <a:pPr algn="ctr"/>
+            <a:endParaRPr lang="es-HN" dirty="0"/>
+          </a:p>
+        </p:txBody>
+      </p:sp>
+      <p:sp>
+        <p:nvSpPr>
+          <p:cNvPr id="17" name="Rectángulo 16"/>
           <p:cNvSpPr/>
           <p:nvPr/>
         </p:nvSpPr>
         <p:spPr>
           <a:xfrm>
-            <a:off x="7226300" y="2324100"/>
-            <a:ext cx="2273300" cy="2044700"/>
+            <a:off x="3594100" y="2603500"/>
+            <a:ext cx="8064500" cy="1346200"/>
           </a:xfrm>
           <a:prstGeom prst="rect">
             <a:avLst/>
           </a:prstGeom>
-          <a:ln>
+          <a:solidFill>
+            <a:schemeClr val="accent6">
+              <a:lumMod val="60000"/>
+              <a:lumOff val="40000"/>
+            </a:schemeClr>
+          </a:solidFill>
+          <a:ln w="76200">
             <a:solidFill>
-              <a:schemeClr val="tx1"/>
+              <a:schemeClr val="accent2">
+                <a:lumMod val="50000"/>
+              </a:schemeClr>
             </a:solidFill>
           </a:ln>
         </p:spPr>
         <p:style>
-          <a:lnRef idx="1">
-            <a:schemeClr val="accent2"/>
+          <a:lnRef idx="2">
+            <a:schemeClr val="accent1">
+              <a:shade val="50000"/>
+            </a:schemeClr>
           </a:lnRef>
-          <a:fillRef idx="3">
-            <a:schemeClr val="accent2"/>
+          <a:fillRef idx="1">
+            <a:schemeClr val="accent1"/>
           </a:fillRef>
-          <a:effectRef idx="2">
-            <a:schemeClr val="accent2"/>
+          <a:effectRef idx="0">
+            <a:schemeClr val="accent1"/>
           </a:effectRef>
           <a:fontRef idx="minor">
             <a:schemeClr val="lt1"/>
@@ -4483,33 +5092,43 @@
       </p:sp>
       <p:sp>
         <p:nvSpPr>
-          <p:cNvPr id="7" name="Rectángulo 6"/>
+          <p:cNvPr id="18" name="Rectángulo 17"/>
           <p:cNvSpPr/>
           <p:nvPr/>
         </p:nvSpPr>
         <p:spPr>
           <a:xfrm>
-            <a:off x="9499600" y="2324100"/>
-            <a:ext cx="2273300" cy="2044700"/>
+            <a:off x="3594100" y="3949700"/>
+            <a:ext cx="8064500" cy="1346200"/>
           </a:xfrm>
           <a:prstGeom prst="rect">
             <a:avLst/>
           </a:prstGeom>
-          <a:ln>
+          <a:solidFill>
+            <a:schemeClr val="accent6">
+              <a:lumMod val="60000"/>
+              <a:lumOff val="40000"/>
+            </a:schemeClr>
+          </a:solidFill>
+          <a:ln w="76200">
             <a:solidFill>
-              <a:schemeClr val="tx1"/>
+              <a:schemeClr val="accent2">
+                <a:lumMod val="50000"/>
+              </a:schemeClr>
             </a:solidFill>
           </a:ln>
         </p:spPr>
         <p:style>
-          <a:lnRef idx="1">
-            <a:schemeClr val="accent2"/>
+          <a:lnRef idx="2">
+            <a:schemeClr val="accent1">
+              <a:shade val="50000"/>
+            </a:schemeClr>
           </a:lnRef>
-          <a:fillRef idx="3">
-            <a:schemeClr val="accent2"/>
+          <a:fillRef idx="1">
+            <a:schemeClr val="accent1"/>
           </a:fillRef>
-          <a:effectRef idx="2">
-            <a:schemeClr val="accent2"/>
+          <a:effectRef idx="0">
+            <a:schemeClr val="accent1"/>
           </a:effectRef>
           <a:fontRef idx="minor">
             <a:schemeClr val="lt1"/>
@@ -4526,62 +5145,43 @@
       </p:sp>
       <p:sp>
         <p:nvSpPr>
-          <p:cNvPr id="8" name="CuadroTexto 7"/>
-          <p:cNvSpPr txBox="1"/>
-          <p:nvPr/>
-        </p:nvSpPr>
-        <p:spPr>
-          <a:xfrm>
-            <a:off x="717550" y="3048000"/>
-            <a:ext cx="1778000" cy="461665"/>
-          </a:xfrm>
-          <a:prstGeom prst="rect">
-            <a:avLst/>
-          </a:prstGeom>
-          <a:noFill/>
-        </p:spPr>
-        <p:txBody>
-          <a:bodyPr wrap="square" rtlCol="0">
-            <a:spAutoFit/>
-          </a:bodyPr>
-          <a:lstStyle/>
-          <a:p>
-            <a:r>
-              <a:rPr lang="es-HN" sz="2400" b="1" dirty="0" smtClean="0"/>
-              <a:t>BLOQUE MD</a:t>
-            </a:r>
-          </a:p>
-        </p:txBody>
-      </p:sp>
-      <p:sp>
-        <p:nvSpPr>
-          <p:cNvPr id="11" name="Rectángulo 10"/>
+          <p:cNvPr id="19" name="Rectángulo 18"/>
           <p:cNvSpPr/>
           <p:nvPr/>
         </p:nvSpPr>
         <p:spPr>
           <a:xfrm>
-            <a:off x="2679700" y="2324100"/>
-            <a:ext cx="2273300" cy="469900"/>
+            <a:off x="3594100" y="5295900"/>
+            <a:ext cx="8064500" cy="1346200"/>
           </a:xfrm>
           <a:prstGeom prst="rect">
             <a:avLst/>
           </a:prstGeom>
-          <a:ln>
+          <a:solidFill>
+            <a:schemeClr val="accent6">
+              <a:lumMod val="60000"/>
+              <a:lumOff val="40000"/>
+            </a:schemeClr>
+          </a:solidFill>
+          <a:ln w="76200">
             <a:solidFill>
-              <a:schemeClr val="tx1"/>
+              <a:schemeClr val="accent2">
+                <a:lumMod val="50000"/>
+              </a:schemeClr>
             </a:solidFill>
           </a:ln>
         </p:spPr>
         <p:style>
-          <a:lnRef idx="1">
-            <a:schemeClr val="accent5"/>
+          <a:lnRef idx="2">
+            <a:schemeClr val="accent1">
+              <a:shade val="50000"/>
+            </a:schemeClr>
           </a:lnRef>
-          <a:fillRef idx="3">
-            <a:schemeClr val="accent5"/>
+          <a:fillRef idx="1">
+            <a:schemeClr val="accent1"/>
           </a:fillRef>
-          <a:effectRef idx="2">
-            <a:schemeClr val="accent5"/>
+          <a:effectRef idx="0">
+            <a:schemeClr val="accent1"/>
           </a:effectRef>
           <a:fontRef idx="minor">
             <a:schemeClr val="lt1"/>
@@ -4596,10 +5196,914 @@
           </a:p>
         </p:txBody>
       </p:sp>
+      <p:sp>
+        <p:nvSpPr>
+          <p:cNvPr id="20" name="Rectángulo 19"/>
+          <p:cNvSpPr/>
+          <p:nvPr/>
+        </p:nvSpPr>
+        <p:spPr>
+          <a:xfrm>
+            <a:off x="8813800" y="2628900"/>
+            <a:ext cx="1422400" cy="1320800"/>
+          </a:xfrm>
+          <a:prstGeom prst="rect">
+            <a:avLst/>
+          </a:prstGeom>
+          <a:solidFill>
+            <a:schemeClr val="accent1">
+              <a:lumMod val="75000"/>
+            </a:schemeClr>
+          </a:solidFill>
+          <a:ln w="57150">
+            <a:solidFill>
+              <a:schemeClr val="accent4">
+                <a:lumMod val="60000"/>
+                <a:lumOff val="40000"/>
+              </a:schemeClr>
+            </a:solidFill>
+          </a:ln>
+        </p:spPr>
+        <p:style>
+          <a:lnRef idx="2">
+            <a:schemeClr val="accent1">
+              <a:shade val="50000"/>
+            </a:schemeClr>
+          </a:lnRef>
+          <a:fillRef idx="1">
+            <a:schemeClr val="accent1"/>
+          </a:fillRef>
+          <a:effectRef idx="0">
+            <a:schemeClr val="accent1"/>
+          </a:effectRef>
+          <a:fontRef idx="minor">
+            <a:schemeClr val="lt1"/>
+          </a:fontRef>
+        </p:style>
+        <p:txBody>
+          <a:bodyPr rtlCol="0" anchor="ctr"/>
+          <a:lstStyle/>
+          <a:p>
+            <a:pPr algn="ctr"/>
+            <a:endParaRPr lang="es-HN"/>
+          </a:p>
+        </p:txBody>
+      </p:sp>
+      <p:sp>
+        <p:nvSpPr>
+          <p:cNvPr id="21" name="Rectángulo 20"/>
+          <p:cNvSpPr/>
+          <p:nvPr/>
+        </p:nvSpPr>
+        <p:spPr>
+          <a:xfrm>
+            <a:off x="10236200" y="2622550"/>
+            <a:ext cx="1422400" cy="1320800"/>
+          </a:xfrm>
+          <a:prstGeom prst="rect">
+            <a:avLst/>
+          </a:prstGeom>
+          <a:solidFill>
+            <a:schemeClr val="accent1">
+              <a:lumMod val="75000"/>
+            </a:schemeClr>
+          </a:solidFill>
+          <a:ln w="57150">
+            <a:solidFill>
+              <a:schemeClr val="accent4">
+                <a:lumMod val="60000"/>
+                <a:lumOff val="40000"/>
+              </a:schemeClr>
+            </a:solidFill>
+          </a:ln>
+        </p:spPr>
+        <p:style>
+          <a:lnRef idx="2">
+            <a:schemeClr val="accent1">
+              <a:shade val="50000"/>
+            </a:schemeClr>
+          </a:lnRef>
+          <a:fillRef idx="1">
+            <a:schemeClr val="accent1"/>
+          </a:fillRef>
+          <a:effectRef idx="0">
+            <a:schemeClr val="accent1"/>
+          </a:effectRef>
+          <a:fontRef idx="minor">
+            <a:schemeClr val="lt1"/>
+          </a:fontRef>
+        </p:style>
+        <p:txBody>
+          <a:bodyPr rtlCol="0" anchor="ctr"/>
+          <a:lstStyle/>
+          <a:p>
+            <a:pPr algn="ctr"/>
+            <a:endParaRPr lang="es-HN"/>
+          </a:p>
+        </p:txBody>
+      </p:sp>
+      <p:sp>
+        <p:nvSpPr>
+          <p:cNvPr id="22" name="Rectángulo 21"/>
+          <p:cNvSpPr/>
+          <p:nvPr/>
+        </p:nvSpPr>
+        <p:spPr>
+          <a:xfrm>
+            <a:off x="8813800" y="3987800"/>
+            <a:ext cx="1422400" cy="1320800"/>
+          </a:xfrm>
+          <a:prstGeom prst="rect">
+            <a:avLst/>
+          </a:prstGeom>
+          <a:solidFill>
+            <a:schemeClr val="accent1">
+              <a:lumMod val="75000"/>
+            </a:schemeClr>
+          </a:solidFill>
+          <a:ln w="57150">
+            <a:solidFill>
+              <a:schemeClr val="accent4">
+                <a:lumMod val="60000"/>
+                <a:lumOff val="40000"/>
+              </a:schemeClr>
+            </a:solidFill>
+          </a:ln>
+        </p:spPr>
+        <p:style>
+          <a:lnRef idx="2">
+            <a:schemeClr val="accent1">
+              <a:shade val="50000"/>
+            </a:schemeClr>
+          </a:lnRef>
+          <a:fillRef idx="1">
+            <a:schemeClr val="accent1"/>
+          </a:fillRef>
+          <a:effectRef idx="0">
+            <a:schemeClr val="accent1"/>
+          </a:effectRef>
+          <a:fontRef idx="minor">
+            <a:schemeClr val="lt1"/>
+          </a:fontRef>
+        </p:style>
+        <p:txBody>
+          <a:bodyPr rtlCol="0" anchor="ctr"/>
+          <a:lstStyle/>
+          <a:p>
+            <a:pPr algn="ctr"/>
+            <a:endParaRPr lang="es-HN"/>
+          </a:p>
+        </p:txBody>
+      </p:sp>
+      <p:sp>
+        <p:nvSpPr>
+          <p:cNvPr id="23" name="Rectángulo 22"/>
+          <p:cNvSpPr/>
+          <p:nvPr/>
+        </p:nvSpPr>
+        <p:spPr>
+          <a:xfrm>
+            <a:off x="10236200" y="3981450"/>
+            <a:ext cx="1422400" cy="1320800"/>
+          </a:xfrm>
+          <a:prstGeom prst="rect">
+            <a:avLst/>
+          </a:prstGeom>
+          <a:solidFill>
+            <a:schemeClr val="accent1">
+              <a:lumMod val="75000"/>
+            </a:schemeClr>
+          </a:solidFill>
+          <a:ln w="57150">
+            <a:solidFill>
+              <a:schemeClr val="accent4">
+                <a:lumMod val="60000"/>
+                <a:lumOff val="40000"/>
+              </a:schemeClr>
+            </a:solidFill>
+          </a:ln>
+        </p:spPr>
+        <p:style>
+          <a:lnRef idx="2">
+            <a:schemeClr val="accent1">
+              <a:shade val="50000"/>
+            </a:schemeClr>
+          </a:lnRef>
+          <a:fillRef idx="1">
+            <a:schemeClr val="accent1"/>
+          </a:fillRef>
+          <a:effectRef idx="0">
+            <a:schemeClr val="accent1"/>
+          </a:effectRef>
+          <a:fontRef idx="minor">
+            <a:schemeClr val="lt1"/>
+          </a:fontRef>
+        </p:style>
+        <p:txBody>
+          <a:bodyPr rtlCol="0" anchor="ctr"/>
+          <a:lstStyle/>
+          <a:p>
+            <a:pPr algn="ctr"/>
+            <a:endParaRPr lang="es-HN"/>
+          </a:p>
+        </p:txBody>
+      </p:sp>
+      <p:sp>
+        <p:nvSpPr>
+          <p:cNvPr id="24" name="Rectángulo 23"/>
+          <p:cNvSpPr/>
+          <p:nvPr/>
+        </p:nvSpPr>
+        <p:spPr>
+          <a:xfrm>
+            <a:off x="8813800" y="5321300"/>
+            <a:ext cx="1422400" cy="1320800"/>
+          </a:xfrm>
+          <a:prstGeom prst="rect">
+            <a:avLst/>
+          </a:prstGeom>
+          <a:solidFill>
+            <a:schemeClr val="accent1">
+              <a:lumMod val="75000"/>
+            </a:schemeClr>
+          </a:solidFill>
+          <a:ln w="57150">
+            <a:solidFill>
+              <a:schemeClr val="accent4">
+                <a:lumMod val="60000"/>
+                <a:lumOff val="40000"/>
+              </a:schemeClr>
+            </a:solidFill>
+          </a:ln>
+        </p:spPr>
+        <p:style>
+          <a:lnRef idx="2">
+            <a:schemeClr val="accent1">
+              <a:shade val="50000"/>
+            </a:schemeClr>
+          </a:lnRef>
+          <a:fillRef idx="1">
+            <a:schemeClr val="accent1"/>
+          </a:fillRef>
+          <a:effectRef idx="0">
+            <a:schemeClr val="accent1"/>
+          </a:effectRef>
+          <a:fontRef idx="minor">
+            <a:schemeClr val="lt1"/>
+          </a:fontRef>
+        </p:style>
+        <p:txBody>
+          <a:bodyPr rtlCol="0" anchor="ctr"/>
+          <a:lstStyle/>
+          <a:p>
+            <a:pPr algn="ctr"/>
+            <a:endParaRPr lang="es-HN"/>
+          </a:p>
+        </p:txBody>
+      </p:sp>
+      <p:sp>
+        <p:nvSpPr>
+          <p:cNvPr id="25" name="Rectángulo 24"/>
+          <p:cNvSpPr/>
+          <p:nvPr/>
+        </p:nvSpPr>
+        <p:spPr>
+          <a:xfrm>
+            <a:off x="10236200" y="5314950"/>
+            <a:ext cx="1422400" cy="1320800"/>
+          </a:xfrm>
+          <a:prstGeom prst="rect">
+            <a:avLst/>
+          </a:prstGeom>
+          <a:solidFill>
+            <a:schemeClr val="accent1">
+              <a:lumMod val="75000"/>
+            </a:schemeClr>
+          </a:solidFill>
+          <a:ln w="57150">
+            <a:solidFill>
+              <a:schemeClr val="accent4">
+                <a:lumMod val="60000"/>
+                <a:lumOff val="40000"/>
+              </a:schemeClr>
+            </a:solidFill>
+          </a:ln>
+        </p:spPr>
+        <p:style>
+          <a:lnRef idx="2">
+            <a:schemeClr val="accent1">
+              <a:shade val="50000"/>
+            </a:schemeClr>
+          </a:lnRef>
+          <a:fillRef idx="1">
+            <a:schemeClr val="accent1"/>
+          </a:fillRef>
+          <a:effectRef idx="0">
+            <a:schemeClr val="accent1"/>
+          </a:effectRef>
+          <a:fontRef idx="minor">
+            <a:schemeClr val="lt1"/>
+          </a:fontRef>
+        </p:style>
+        <p:txBody>
+          <a:bodyPr rtlCol="0" anchor="ctr"/>
+          <a:lstStyle/>
+          <a:p>
+            <a:pPr algn="ctr"/>
+            <a:endParaRPr lang="es-HN"/>
+          </a:p>
+        </p:txBody>
+      </p:sp>
+      <p:sp>
+        <p:nvSpPr>
+          <p:cNvPr id="26" name="CuadroTexto 25"/>
+          <p:cNvSpPr txBox="1"/>
+          <p:nvPr/>
+        </p:nvSpPr>
+        <p:spPr>
+          <a:xfrm>
+            <a:off x="4699000" y="2984500"/>
+            <a:ext cx="3048000" cy="584775"/>
+          </a:xfrm>
+          <a:prstGeom prst="rect">
+            <a:avLst/>
+          </a:prstGeom>
+          <a:noFill/>
+        </p:spPr>
+        <p:txBody>
+          <a:bodyPr wrap="square" rtlCol="0">
+            <a:spAutoFit/>
+          </a:bodyPr>
+          <a:lstStyle/>
+          <a:p>
+            <a:r>
+              <a:rPr lang="es-HN" sz="3200" b="1" dirty="0" smtClean="0">
+                <a:solidFill>
+                  <a:srgbClr val="FF0000"/>
+                </a:solidFill>
+              </a:rPr>
+              <a:t>NOMBRE TABLA</a:t>
+            </a:r>
+            <a:endParaRPr lang="es-HN" sz="3200" b="1" dirty="0">
+              <a:solidFill>
+                <a:srgbClr val="FF0000"/>
+              </a:solidFill>
+            </a:endParaRPr>
+          </a:p>
+        </p:txBody>
+      </p:sp>
+      <p:sp>
+        <p:nvSpPr>
+          <p:cNvPr id="27" name="CuadroTexto 26"/>
+          <p:cNvSpPr txBox="1"/>
+          <p:nvPr/>
+        </p:nvSpPr>
+        <p:spPr>
+          <a:xfrm>
+            <a:off x="4679950" y="4266913"/>
+            <a:ext cx="3048000" cy="584775"/>
+          </a:xfrm>
+          <a:prstGeom prst="rect">
+            <a:avLst/>
+          </a:prstGeom>
+          <a:noFill/>
+        </p:spPr>
+        <p:txBody>
+          <a:bodyPr wrap="square" rtlCol="0">
+            <a:spAutoFit/>
+          </a:bodyPr>
+          <a:lstStyle/>
+          <a:p>
+            <a:r>
+              <a:rPr lang="es-HN" sz="3200" b="1" dirty="0" smtClean="0">
+                <a:solidFill>
+                  <a:srgbClr val="FF0000"/>
+                </a:solidFill>
+              </a:rPr>
+              <a:t>NOMBRE TABLA</a:t>
+            </a:r>
+            <a:endParaRPr lang="es-HN" sz="3200" b="1" dirty="0">
+              <a:solidFill>
+                <a:srgbClr val="FF0000"/>
+              </a:solidFill>
+            </a:endParaRPr>
+          </a:p>
+        </p:txBody>
+      </p:sp>
+      <p:sp>
+        <p:nvSpPr>
+          <p:cNvPr id="28" name="CuadroTexto 27"/>
+          <p:cNvSpPr txBox="1"/>
+          <p:nvPr/>
+        </p:nvSpPr>
+        <p:spPr>
+          <a:xfrm>
+            <a:off x="4699000" y="5575013"/>
+            <a:ext cx="3048000" cy="584775"/>
+          </a:xfrm>
+          <a:prstGeom prst="rect">
+            <a:avLst/>
+          </a:prstGeom>
+          <a:noFill/>
+        </p:spPr>
+        <p:txBody>
+          <a:bodyPr wrap="square" rtlCol="0">
+            <a:spAutoFit/>
+          </a:bodyPr>
+          <a:lstStyle/>
+          <a:p>
+            <a:r>
+              <a:rPr lang="es-HN" sz="3200" b="1" dirty="0" smtClean="0">
+                <a:solidFill>
+                  <a:srgbClr val="FF0000"/>
+                </a:solidFill>
+              </a:rPr>
+              <a:t>NOMBRE TABLA</a:t>
+            </a:r>
+            <a:endParaRPr lang="es-HN" sz="3200" b="1" dirty="0">
+              <a:solidFill>
+                <a:srgbClr val="FF0000"/>
+              </a:solidFill>
+            </a:endParaRPr>
+          </a:p>
+        </p:txBody>
+      </p:sp>
+      <p:sp>
+        <p:nvSpPr>
+          <p:cNvPr id="29" name="CuadroTexto 28"/>
+          <p:cNvSpPr txBox="1"/>
+          <p:nvPr/>
+        </p:nvSpPr>
+        <p:spPr>
+          <a:xfrm>
+            <a:off x="8851900" y="2717621"/>
+            <a:ext cx="1231900" cy="1200329"/>
+          </a:xfrm>
+          <a:prstGeom prst="rect">
+            <a:avLst/>
+          </a:prstGeom>
+          <a:noFill/>
+        </p:spPr>
+        <p:txBody>
+          <a:bodyPr wrap="square" rtlCol="0">
+            <a:spAutoFit/>
+          </a:bodyPr>
+          <a:lstStyle/>
+          <a:p>
+            <a:r>
+              <a:rPr lang="es-HN" b="1" dirty="0" err="1" smtClean="0">
+                <a:solidFill>
+                  <a:schemeClr val="bg1"/>
+                </a:solidFill>
+              </a:rPr>
+              <a:t>Int</a:t>
+            </a:r>
+            <a:endParaRPr lang="es-HN" b="1" dirty="0">
+              <a:solidFill>
+                <a:schemeClr val="bg1"/>
+              </a:solidFill>
+            </a:endParaRPr>
+          </a:p>
+          <a:p>
+            <a:r>
+              <a:rPr lang="es-HN" b="1" dirty="0" smtClean="0">
+                <a:solidFill>
+                  <a:schemeClr val="bg1"/>
+                </a:solidFill>
+              </a:rPr>
+              <a:t>Primer lista de campos</a:t>
+            </a:r>
+            <a:endParaRPr lang="es-HN" b="1" dirty="0">
+              <a:solidFill>
+                <a:schemeClr val="bg1"/>
+              </a:solidFill>
+            </a:endParaRPr>
+          </a:p>
+        </p:txBody>
+      </p:sp>
+      <p:sp>
+        <p:nvSpPr>
+          <p:cNvPr id="30" name="CuadroTexto 29"/>
+          <p:cNvSpPr txBox="1"/>
+          <p:nvPr/>
+        </p:nvSpPr>
+        <p:spPr>
+          <a:xfrm>
+            <a:off x="10236200" y="2676435"/>
+            <a:ext cx="1231900" cy="1200329"/>
+          </a:xfrm>
+          <a:prstGeom prst="rect">
+            <a:avLst/>
+          </a:prstGeom>
+          <a:noFill/>
+        </p:spPr>
+        <p:txBody>
+          <a:bodyPr wrap="square" rtlCol="0">
+            <a:spAutoFit/>
+          </a:bodyPr>
+          <a:lstStyle/>
+          <a:p>
+            <a:r>
+              <a:rPr lang="es-HN" b="1" dirty="0" err="1" smtClean="0">
+                <a:solidFill>
+                  <a:schemeClr val="bg1"/>
+                </a:solidFill>
+              </a:rPr>
+              <a:t>Int</a:t>
+            </a:r>
+            <a:endParaRPr lang="es-HN" b="1" dirty="0">
+              <a:solidFill>
+                <a:schemeClr val="bg1"/>
+              </a:solidFill>
+            </a:endParaRPr>
+          </a:p>
+          <a:p>
+            <a:r>
+              <a:rPr lang="es-HN" b="1" dirty="0" smtClean="0">
+                <a:solidFill>
+                  <a:schemeClr val="bg1"/>
+                </a:solidFill>
+              </a:rPr>
+              <a:t>Primer lista de registros</a:t>
+            </a:r>
+            <a:endParaRPr lang="es-HN" b="1" dirty="0">
+              <a:solidFill>
+                <a:schemeClr val="bg1"/>
+              </a:solidFill>
+            </a:endParaRPr>
+          </a:p>
+        </p:txBody>
+      </p:sp>
+      <p:sp>
+        <p:nvSpPr>
+          <p:cNvPr id="31" name="CuadroTexto 30"/>
+          <p:cNvSpPr txBox="1"/>
+          <p:nvPr/>
+        </p:nvSpPr>
+        <p:spPr>
+          <a:xfrm>
+            <a:off x="9004300" y="4025542"/>
+            <a:ext cx="1231900" cy="1200329"/>
+          </a:xfrm>
+          <a:prstGeom prst="rect">
+            <a:avLst/>
+          </a:prstGeom>
+          <a:noFill/>
+        </p:spPr>
+        <p:txBody>
+          <a:bodyPr wrap="square" rtlCol="0">
+            <a:spAutoFit/>
+          </a:bodyPr>
+          <a:lstStyle/>
+          <a:p>
+            <a:r>
+              <a:rPr lang="es-HN" b="1" dirty="0" err="1" smtClean="0">
+                <a:solidFill>
+                  <a:schemeClr val="bg1"/>
+                </a:solidFill>
+              </a:rPr>
+              <a:t>Int</a:t>
+            </a:r>
+            <a:endParaRPr lang="es-HN" b="1" dirty="0">
+              <a:solidFill>
+                <a:schemeClr val="bg1"/>
+              </a:solidFill>
+            </a:endParaRPr>
+          </a:p>
+          <a:p>
+            <a:r>
+              <a:rPr lang="es-HN" b="1" dirty="0" smtClean="0">
+                <a:solidFill>
+                  <a:schemeClr val="bg1"/>
+                </a:solidFill>
+              </a:rPr>
+              <a:t>Primer lista de campos</a:t>
+            </a:r>
+            <a:endParaRPr lang="es-HN" b="1" dirty="0">
+              <a:solidFill>
+                <a:schemeClr val="bg1"/>
+              </a:solidFill>
+            </a:endParaRPr>
+          </a:p>
+        </p:txBody>
+      </p:sp>
+      <p:sp>
+        <p:nvSpPr>
+          <p:cNvPr id="32" name="CuadroTexto 31"/>
+          <p:cNvSpPr txBox="1"/>
+          <p:nvPr/>
+        </p:nvSpPr>
+        <p:spPr>
+          <a:xfrm>
+            <a:off x="10388600" y="3984356"/>
+            <a:ext cx="1231900" cy="1200329"/>
+          </a:xfrm>
+          <a:prstGeom prst="rect">
+            <a:avLst/>
+          </a:prstGeom>
+          <a:noFill/>
+        </p:spPr>
+        <p:txBody>
+          <a:bodyPr wrap="square" rtlCol="0">
+            <a:spAutoFit/>
+          </a:bodyPr>
+          <a:lstStyle/>
+          <a:p>
+            <a:r>
+              <a:rPr lang="es-HN" b="1" dirty="0" err="1" smtClean="0">
+                <a:solidFill>
+                  <a:schemeClr val="bg1"/>
+                </a:solidFill>
+              </a:rPr>
+              <a:t>Int</a:t>
+            </a:r>
+            <a:endParaRPr lang="es-HN" b="1" dirty="0">
+              <a:solidFill>
+                <a:schemeClr val="bg1"/>
+              </a:solidFill>
+            </a:endParaRPr>
+          </a:p>
+          <a:p>
+            <a:r>
+              <a:rPr lang="es-HN" b="1" dirty="0" smtClean="0">
+                <a:solidFill>
+                  <a:schemeClr val="bg1"/>
+                </a:solidFill>
+              </a:rPr>
+              <a:t>Primer lista de registros</a:t>
+            </a:r>
+            <a:endParaRPr lang="es-HN" b="1" dirty="0">
+              <a:solidFill>
+                <a:schemeClr val="bg1"/>
+              </a:solidFill>
+            </a:endParaRPr>
+          </a:p>
+        </p:txBody>
+      </p:sp>
+      <p:sp>
+        <p:nvSpPr>
+          <p:cNvPr id="33" name="CuadroTexto 32"/>
+          <p:cNvSpPr txBox="1"/>
+          <p:nvPr/>
+        </p:nvSpPr>
+        <p:spPr>
+          <a:xfrm>
+            <a:off x="9023350" y="5371742"/>
+            <a:ext cx="1231900" cy="1200329"/>
+          </a:xfrm>
+          <a:prstGeom prst="rect">
+            <a:avLst/>
+          </a:prstGeom>
+          <a:noFill/>
+        </p:spPr>
+        <p:txBody>
+          <a:bodyPr wrap="square" rtlCol="0">
+            <a:spAutoFit/>
+          </a:bodyPr>
+          <a:lstStyle/>
+          <a:p>
+            <a:r>
+              <a:rPr lang="es-HN" b="1" dirty="0" err="1" smtClean="0">
+                <a:solidFill>
+                  <a:schemeClr val="bg1"/>
+                </a:solidFill>
+              </a:rPr>
+              <a:t>Int</a:t>
+            </a:r>
+            <a:endParaRPr lang="es-HN" b="1" dirty="0">
+              <a:solidFill>
+                <a:schemeClr val="bg1"/>
+              </a:solidFill>
+            </a:endParaRPr>
+          </a:p>
+          <a:p>
+            <a:r>
+              <a:rPr lang="es-HN" b="1" dirty="0" smtClean="0">
+                <a:solidFill>
+                  <a:schemeClr val="bg1"/>
+                </a:solidFill>
+              </a:rPr>
+              <a:t>Primer lista de campos</a:t>
+            </a:r>
+            <a:endParaRPr lang="es-HN" b="1" dirty="0">
+              <a:solidFill>
+                <a:schemeClr val="bg1"/>
+              </a:solidFill>
+            </a:endParaRPr>
+          </a:p>
+        </p:txBody>
+      </p:sp>
+      <p:sp>
+        <p:nvSpPr>
+          <p:cNvPr id="34" name="CuadroTexto 33"/>
+          <p:cNvSpPr txBox="1"/>
+          <p:nvPr/>
+        </p:nvSpPr>
+        <p:spPr>
+          <a:xfrm>
+            <a:off x="10407650" y="5330556"/>
+            <a:ext cx="1231900" cy="1200329"/>
+          </a:xfrm>
+          <a:prstGeom prst="rect">
+            <a:avLst/>
+          </a:prstGeom>
+          <a:noFill/>
+        </p:spPr>
+        <p:txBody>
+          <a:bodyPr wrap="square" rtlCol="0">
+            <a:spAutoFit/>
+          </a:bodyPr>
+          <a:lstStyle/>
+          <a:p>
+            <a:r>
+              <a:rPr lang="es-HN" b="1" dirty="0" err="1" smtClean="0">
+                <a:solidFill>
+                  <a:schemeClr val="bg1"/>
+                </a:solidFill>
+              </a:rPr>
+              <a:t>Int</a:t>
+            </a:r>
+            <a:endParaRPr lang="es-HN" b="1" dirty="0">
+              <a:solidFill>
+                <a:schemeClr val="bg1"/>
+              </a:solidFill>
+            </a:endParaRPr>
+          </a:p>
+          <a:p>
+            <a:r>
+              <a:rPr lang="es-HN" b="1" dirty="0" smtClean="0">
+                <a:solidFill>
+                  <a:schemeClr val="bg1"/>
+                </a:solidFill>
+              </a:rPr>
+              <a:t>Primer lista de registros</a:t>
+            </a:r>
+            <a:endParaRPr lang="es-HN" b="1" dirty="0">
+              <a:solidFill>
+                <a:schemeClr val="bg1"/>
+              </a:solidFill>
+            </a:endParaRPr>
+          </a:p>
+        </p:txBody>
+      </p:sp>
     </p:spTree>
     <p:extLst>
       <p:ext uri="{BB962C8B-B14F-4D97-AF65-F5344CB8AC3E}">
         <p14:creationId xmlns:p14="http://schemas.microsoft.com/office/powerpoint/2010/main" val="3938377580"/>
+      </p:ext>
+    </p:extLst>
+  </p:cSld>
+  <p:clrMapOvr>
+    <a:masterClrMapping/>
+  </p:clrMapOvr>
+</p:sld>
+</file>
+
+<file path=ppt/slides/slide3.xml><?xml version="1.0" encoding="utf-8"?>
+<p:sld xmlns:a="http://schemas.openxmlformats.org/drawingml/2006/main" xmlns:r="http://schemas.openxmlformats.org/officeDocument/2006/relationships" xmlns:p="http://schemas.openxmlformats.org/presentationml/2006/main">
+  <p:cSld>
+    <p:spTree>
+      <p:nvGrpSpPr>
+        <p:cNvPr id="1" name=""/>
+        <p:cNvGrpSpPr/>
+        <p:nvPr/>
+      </p:nvGrpSpPr>
+      <p:grpSpPr>
+        <a:xfrm>
+          <a:off x="0" y="0"/>
+          <a:ext cx="0" cy="0"/>
+          <a:chOff x="0" y="0"/>
+          <a:chExt cx="0" cy="0"/>
+        </a:xfrm>
+      </p:grpSpPr>
+      <p:pic>
+        <p:nvPicPr>
+          <p:cNvPr id="4" name="Imagen 3"/>
+          <p:cNvPicPr>
+            <a:picLocks noChangeAspect="1"/>
+          </p:cNvPicPr>
+          <p:nvPr/>
+        </p:nvPicPr>
+        <p:blipFill rotWithShape="1">
+          <a:blip r:embed="rId2"/>
+          <a:srcRect l="12323" t="36979" r="61030" b="39958"/>
+          <a:stretch/>
+        </p:blipFill>
+        <p:spPr>
+          <a:xfrm>
+            <a:off x="2451100" y="177799"/>
+            <a:ext cx="7023100" cy="3417492"/>
+          </a:xfrm>
+          <a:prstGeom prst="rect">
+            <a:avLst/>
+          </a:prstGeom>
+        </p:spPr>
+      </p:pic>
+      <p:sp>
+        <p:nvSpPr>
+          <p:cNvPr id="5" name="CuadroTexto 4"/>
+          <p:cNvSpPr txBox="1"/>
+          <p:nvPr/>
+        </p:nvSpPr>
+        <p:spPr>
+          <a:xfrm>
+            <a:off x="558800" y="3949700"/>
+            <a:ext cx="10998200" cy="2308324"/>
+          </a:xfrm>
+          <a:prstGeom prst="rect">
+            <a:avLst/>
+          </a:prstGeom>
+          <a:noFill/>
+        </p:spPr>
+        <p:txBody>
+          <a:bodyPr wrap="square" rtlCol="0">
+            <a:spAutoFit/>
+          </a:bodyPr>
+          <a:lstStyle/>
+          <a:p>
+            <a:r>
+              <a:rPr lang="es-HN" dirty="0" smtClean="0"/>
+              <a:t>El primer -1 ----------</a:t>
+            </a:r>
+            <a:r>
+              <a:rPr lang="es-HN" dirty="0" smtClean="0">
+                <a:sym typeface="Wingdings" panose="05000000000000000000" pitchFamily="2" charset="2"/>
+              </a:rPr>
+              <a:t> pertenece al bloque anterior</a:t>
+            </a:r>
+          </a:p>
+          <a:p>
+            <a:r>
+              <a:rPr lang="es-HN" dirty="0" smtClean="0">
+                <a:sym typeface="Wingdings" panose="05000000000000000000" pitchFamily="2" charset="2"/>
+              </a:rPr>
+              <a:t>El segundo -1--------- pertenece al bloque siguiente</a:t>
+            </a:r>
+          </a:p>
+          <a:p>
+            <a:r>
+              <a:rPr lang="es-HN" dirty="0" smtClean="0">
+                <a:sym typeface="Wingdings" panose="05000000000000000000" pitchFamily="2" charset="2"/>
+              </a:rPr>
+              <a:t>El 4 ---------------------- pertenece a la cantidad de tablas que soporta ese bloque</a:t>
+            </a:r>
+          </a:p>
+          <a:p>
+            <a:r>
+              <a:rPr lang="es-HN" dirty="0" smtClean="0">
+                <a:sym typeface="Wingdings" panose="05000000000000000000" pitchFamily="2" charset="2"/>
+              </a:rPr>
+              <a:t>El nombre es obvio</a:t>
+            </a:r>
+          </a:p>
+          <a:p>
+            <a:r>
+              <a:rPr lang="es-HN" dirty="0" smtClean="0">
+                <a:sym typeface="Wingdings" panose="05000000000000000000" pitchFamily="2" charset="2"/>
+              </a:rPr>
+              <a:t>El -1 después del nombre ------ pertenece a la primera lista de campos</a:t>
+            </a:r>
+          </a:p>
+          <a:p>
+            <a:r>
+              <a:rPr lang="es-HN" dirty="0" smtClean="0">
+                <a:sym typeface="Wingdings" panose="05000000000000000000" pitchFamily="2" charset="2"/>
+              </a:rPr>
+              <a:t>El segundo -1 después del nombre----- pertenece a la primera lista de registros</a:t>
+            </a:r>
+          </a:p>
+          <a:p>
+            <a:r>
+              <a:rPr lang="es-HN" dirty="0" smtClean="0">
+                <a:sym typeface="Wingdings" panose="05000000000000000000" pitchFamily="2" charset="2"/>
+              </a:rPr>
+              <a:t>Lo demás es sucesivo, si ves en el código no sigue guardando después que la lista de tablas es mayor a cuatro </a:t>
+            </a:r>
+            <a:r>
+              <a:rPr lang="es-HN" dirty="0" err="1" smtClean="0">
+                <a:sym typeface="Wingdings" panose="05000000000000000000" pitchFamily="2" charset="2"/>
+              </a:rPr>
+              <a:t>xq</a:t>
+            </a:r>
+            <a:r>
+              <a:rPr lang="es-HN" dirty="0" smtClean="0">
+                <a:sym typeface="Wingdings" panose="05000000000000000000" pitchFamily="2" charset="2"/>
+              </a:rPr>
+              <a:t> eso ya </a:t>
+            </a:r>
+            <a:r>
+              <a:rPr lang="es-HN" smtClean="0">
+                <a:sym typeface="Wingdings" panose="05000000000000000000" pitchFamily="2" charset="2"/>
+              </a:rPr>
+              <a:t>esta  validado.</a:t>
+            </a:r>
+          </a:p>
+        </p:txBody>
+      </p:sp>
+    </p:spTree>
+    <p:extLst>
+      <p:ext uri="{BB962C8B-B14F-4D97-AF65-F5344CB8AC3E}">
+        <p14:creationId xmlns:p14="http://schemas.microsoft.com/office/powerpoint/2010/main" val="1838404376"/>
       </p:ext>
     </p:extLst>
   </p:cSld>
@@ -4868,4 +6372,265 @@
     </a:ext>
   </a:extLst>
 </a:theme>
+</file>
+
+<file path=ppt/theme/theme2.xml><?xml version="1.0" encoding="utf-8"?>
+<a:theme xmlns:a="http://schemas.openxmlformats.org/drawingml/2006/main" name="Tema de Office">
+  <a:themeElements>
+    <a:clrScheme name="Office">
+      <a:dk1>
+        <a:sysClr val="windowText" lastClr="000000"/>
+      </a:dk1>
+      <a:lt1>
+        <a:sysClr val="window" lastClr="FFFFFF"/>
+      </a:lt1>
+      <a:dk2>
+        <a:srgbClr val="44546A"/>
+      </a:dk2>
+      <a:lt2>
+        <a:srgbClr val="E7E6E6"/>
+      </a:lt2>
+      <a:accent1>
+        <a:srgbClr val="5B9BD5"/>
+      </a:accent1>
+      <a:accent2>
+        <a:srgbClr val="ED7D31"/>
+      </a:accent2>
+      <a:accent3>
+        <a:srgbClr val="A5A5A5"/>
+      </a:accent3>
+      <a:accent4>
+        <a:srgbClr val="FFC000"/>
+      </a:accent4>
+      <a:accent5>
+        <a:srgbClr val="4472C4"/>
+      </a:accent5>
+      <a:accent6>
+        <a:srgbClr val="70AD47"/>
+      </a:accent6>
+      <a:hlink>
+        <a:srgbClr val="0563C1"/>
+      </a:hlink>
+      <a:folHlink>
+        <a:srgbClr val="954F72"/>
+      </a:folHlink>
+    </a:clrScheme>
+    <a:fontScheme name="Office">
+      <a:majorFont>
+        <a:latin typeface="Calibri Light" panose="020F0302020204030204"/>
+        <a:ea typeface=""/>
+        <a:cs typeface=""/>
+        <a:font script="Jpan" typeface="ＭＳ Ｐゴシック"/>
+        <a:font script="Hang" typeface="맑은 고딕"/>
+        <a:font script="Hans" typeface="宋体"/>
+        <a:font script="Hant" typeface="新細明體"/>
+        <a:font script="Arab" typeface="Times New Roman"/>
+        <a:font script="Hebr" typeface="Times New Roman"/>
+        <a:font script="Thai" typeface="Angsana New"/>
+        <a:font script="Ethi" typeface="Nyala"/>
+        <a:font script="Beng" typeface="Vrinda"/>
+        <a:font script="Gujr" typeface="Shruti"/>
+        <a:font script="Khmr" typeface="MoolBoran"/>
+        <a:font script="Knda" typeface="Tunga"/>
+        <a:font script="Guru" typeface="Raavi"/>
+        <a:font script="Cans" typeface="Euphemia"/>
+        <a:font script="Cher" typeface="Plantagenet Cherokee"/>
+        <a:font script="Yiii" typeface="Microsoft Yi Baiti"/>
+        <a:font script="Tibt" typeface="Microsoft Himalaya"/>
+        <a:font script="Thaa" typeface="MV Boli"/>
+        <a:font script="Deva" typeface="Mangal"/>
+        <a:font script="Telu" typeface="Gautami"/>
+        <a:font script="Taml" typeface="Latha"/>
+        <a:font script="Syrc" typeface="Estrangelo Edessa"/>
+        <a:font script="Orya" typeface="Kalinga"/>
+        <a:font script="Mlym" typeface="Kartika"/>
+        <a:font script="Laoo" typeface="DokChampa"/>
+        <a:font script="Sinh" typeface="Iskoola Pota"/>
+        <a:font script="Mong" typeface="Mongolian Baiti"/>
+        <a:font script="Viet" typeface="Times New Roman"/>
+        <a:font script="Uigh" typeface="Microsoft Uighur"/>
+        <a:font script="Geor" typeface="Sylfaen"/>
+      </a:majorFont>
+      <a:minorFont>
+        <a:latin typeface="Calibri" panose="020F0502020204030204"/>
+        <a:ea typeface=""/>
+        <a:cs typeface=""/>
+        <a:font script="Jpan" typeface="ＭＳ Ｐゴシック"/>
+        <a:font script="Hang" typeface="맑은 고딕"/>
+        <a:font script="Hans" typeface="宋体"/>
+        <a:font script="Hant" typeface="新細明體"/>
+        <a:font script="Arab" typeface="Arial"/>
+        <a:font script="Hebr" typeface="Arial"/>
+        <a:font script="Thai" typeface="Cordia New"/>
+        <a:font script="Ethi" typeface="Nyala"/>
+        <a:font script="Beng" typeface="Vrinda"/>
+        <a:font script="Gujr" typeface="Shruti"/>
+        <a:font script="Khmr" typeface="DaunPenh"/>
+        <a:font script="Knda" typeface="Tunga"/>
+        <a:font script="Guru" typeface="Raavi"/>
+        <a:font script="Cans" typeface="Euphemia"/>
+        <a:font script="Cher" typeface="Plantagenet Cherokee"/>
+        <a:font script="Yiii" typeface="Microsoft Yi Baiti"/>
+        <a:font script="Tibt" typeface="Microsoft Himalaya"/>
+        <a:font script="Thaa" typeface="MV Boli"/>
+        <a:font script="Deva" typeface="Mangal"/>
+        <a:font script="Telu" typeface="Gautami"/>
+        <a:font script="Taml" typeface="Latha"/>
+        <a:font script="Syrc" typeface="Estrangelo Edessa"/>
+        <a:font script="Orya" typeface="Kalinga"/>
+        <a:font script="Mlym" typeface="Kartika"/>
+        <a:font script="Laoo" typeface="DokChampa"/>
+        <a:font script="Sinh" typeface="Iskoola Pota"/>
+        <a:font script="Mong" typeface="Mongolian Baiti"/>
+        <a:font script="Viet" typeface="Arial"/>
+        <a:font script="Uigh" typeface="Microsoft Uighur"/>
+        <a:font script="Geor" typeface="Sylfaen"/>
+      </a:minorFont>
+    </a:fontScheme>
+    <a:fmtScheme name="Office">
+      <a:fillStyleLst>
+        <a:solidFill>
+          <a:schemeClr val="phClr"/>
+        </a:solidFill>
+        <a:gradFill rotWithShape="1">
+          <a:gsLst>
+            <a:gs pos="0">
+              <a:schemeClr val="phClr">
+                <a:lumMod val="110000"/>
+                <a:satMod val="105000"/>
+                <a:tint val="67000"/>
+              </a:schemeClr>
+            </a:gs>
+            <a:gs pos="50000">
+              <a:schemeClr val="phClr">
+                <a:lumMod val="105000"/>
+                <a:satMod val="103000"/>
+                <a:tint val="73000"/>
+              </a:schemeClr>
+            </a:gs>
+            <a:gs pos="100000">
+              <a:schemeClr val="phClr">
+                <a:lumMod val="105000"/>
+                <a:satMod val="109000"/>
+                <a:tint val="81000"/>
+              </a:schemeClr>
+            </a:gs>
+          </a:gsLst>
+          <a:lin ang="5400000" scaled="0"/>
+        </a:gradFill>
+        <a:gradFill rotWithShape="1">
+          <a:gsLst>
+            <a:gs pos="0">
+              <a:schemeClr val="phClr">
+                <a:satMod val="103000"/>
+                <a:lumMod val="102000"/>
+                <a:tint val="94000"/>
+              </a:schemeClr>
+            </a:gs>
+            <a:gs pos="50000">
+              <a:schemeClr val="phClr">
+                <a:satMod val="110000"/>
+                <a:lumMod val="100000"/>
+                <a:shade val="100000"/>
+              </a:schemeClr>
+            </a:gs>
+            <a:gs pos="100000">
+              <a:schemeClr val="phClr">
+                <a:lumMod val="99000"/>
+                <a:satMod val="120000"/>
+                <a:shade val="78000"/>
+              </a:schemeClr>
+            </a:gs>
+          </a:gsLst>
+          <a:lin ang="5400000" scaled="0"/>
+        </a:gradFill>
+      </a:fillStyleLst>
+      <a:lnStyleLst>
+        <a:ln w="6350" cap="flat" cmpd="sng" algn="ctr">
+          <a:solidFill>
+            <a:schemeClr val="phClr"/>
+          </a:solidFill>
+          <a:prstDash val="solid"/>
+          <a:miter lim="800000"/>
+        </a:ln>
+        <a:ln w="12700" cap="flat" cmpd="sng" algn="ctr">
+          <a:solidFill>
+            <a:schemeClr val="phClr"/>
+          </a:solidFill>
+          <a:prstDash val="solid"/>
+          <a:miter lim="800000"/>
+        </a:ln>
+        <a:ln w="19050" cap="flat" cmpd="sng" algn="ctr">
+          <a:solidFill>
+            <a:schemeClr val="phClr"/>
+          </a:solidFill>
+          <a:prstDash val="solid"/>
+          <a:miter lim="800000"/>
+        </a:ln>
+      </a:lnStyleLst>
+      <a:effectStyleLst>
+        <a:effectStyle>
+          <a:effectLst/>
+        </a:effectStyle>
+        <a:effectStyle>
+          <a:effectLst/>
+        </a:effectStyle>
+        <a:effectStyle>
+          <a:effectLst>
+            <a:outerShdw blurRad="57150" dist="19050" dir="5400000" algn="ctr" rotWithShape="0">
+              <a:srgbClr val="000000">
+                <a:alpha val="63000"/>
+              </a:srgbClr>
+            </a:outerShdw>
+          </a:effectLst>
+        </a:effectStyle>
+      </a:effectStyleLst>
+      <a:bgFillStyleLst>
+        <a:solidFill>
+          <a:schemeClr val="phClr"/>
+        </a:solidFill>
+        <a:solidFill>
+          <a:schemeClr val="phClr">
+            <a:tint val="95000"/>
+            <a:satMod val="170000"/>
+          </a:schemeClr>
+        </a:solidFill>
+        <a:gradFill rotWithShape="1">
+          <a:gsLst>
+            <a:gs pos="0">
+              <a:schemeClr val="phClr">
+                <a:tint val="93000"/>
+                <a:satMod val="150000"/>
+                <a:shade val="98000"/>
+                <a:lumMod val="102000"/>
+              </a:schemeClr>
+            </a:gs>
+            <a:gs pos="50000">
+              <a:schemeClr val="phClr">
+                <a:tint val="98000"/>
+                <a:satMod val="130000"/>
+                <a:shade val="90000"/>
+                <a:lumMod val="103000"/>
+              </a:schemeClr>
+            </a:gs>
+            <a:gs pos="100000">
+              <a:schemeClr val="phClr">
+                <a:shade val="63000"/>
+                <a:satMod val="120000"/>
+              </a:schemeClr>
+            </a:gs>
+          </a:gsLst>
+          <a:lin ang="5400000" scaled="0"/>
+        </a:gradFill>
+      </a:bgFillStyleLst>
+    </a:fmtScheme>
+  </a:themeElements>
+  <a:objectDefaults/>
+  <a:extraClrSchemeLst/>
+  <a:extLst>
+    <a:ext uri="{05A4C25C-085E-4340-85A3-A5531E510DB2}">
+      <thm15:themeFamily xmlns:thm15="http://schemas.microsoft.com/office/thememl/2012/main" name="Office Theme" id="{62F939B6-93AF-4DB8-9C6B-D6C7DFDC589F}" vid="{4A3C46E8-61CC-4603-A589-7422A47A8E4A}"/>
+    </a:ext>
+  </a:extLst>
+</a:theme>
 </file>
</xml_diff>